<commit_message>
fix/013: Fixed information bot
</commit_message>
<xml_diff>
--- a/project_telegram_bot.pptx
+++ b/project_telegram_bot.pptx
@@ -45,7 +45,7 @@
       </p:grpSpPr>
       <p:sp>
         <p:nvSpPr>
-          <p:cNvPr id="4" name="PlaceHolder 1"/>
+          <p:cNvPr id="6" name="PlaceHolder 1"/>
           <p:cNvSpPr>
             <a:spLocks noGrp="1"/>
           </p:cNvSpPr>
@@ -73,26 +73,30 @@
           <a:p>
             <a:pPr algn="ctr"/>
             <a:r>
-              <a:rPr b="0" lang="ru-RU" sz="4400" spc="-1" strike="noStrike">
-                <a:solidFill>
-                  <a:srgbClr val="000000"/>
-                </a:solidFill>
+              <a:rPr b="0" lang="en-US" sz="4400" strike="noStrike" u="none">
+                <a:solidFill>
+                  <a:srgbClr val="000000"/>
+                </a:solidFill>
+                <a:effectLst/>
+                <a:uFillTx/>
                 <a:latin typeface="Arial"/>
               </a:rPr>
-              <a:t>Для перемещения страницы щёлкните мышью</a:t>
+              <a:t>Click to move the slide</a:t>
             </a:r>
-            <a:endParaRPr b="0" lang="ru-RU" sz="4400" spc="-1" strike="noStrike">
-              <a:solidFill>
-                <a:srgbClr val="000000"/>
-              </a:solidFill>
-              <a:latin typeface="Arial"/>
-            </a:endParaRPr>
-          </a:p>
-        </p:txBody>
-      </p:sp>
-      <p:sp>
-        <p:nvSpPr>
-          <p:cNvPr id="5" name="PlaceHolder 2"/>
+            <a:endParaRPr b="0" lang="en-US" sz="4400" strike="noStrike" u="none">
+              <a:solidFill>
+                <a:srgbClr val="000000"/>
+              </a:solidFill>
+              <a:effectLst/>
+              <a:uFillTx/>
+              <a:latin typeface="Arial"/>
+            </a:endParaRPr>
+          </a:p>
+        </p:txBody>
+      </p:sp>
+      <p:sp>
+        <p:nvSpPr>
+          <p:cNvPr id="7" name="PlaceHolder 2"/>
           <p:cNvSpPr>
             <a:spLocks noGrp="1"/>
           </p:cNvSpPr>
@@ -118,30 +122,34 @@
             <a:noAutofit/>
           </a:bodyPr>
           <a:p>
-            <a:pPr marL="216000" indent="-216000">
+            <a:pPr indent="0">
               <a:buNone/>
             </a:pPr>
             <a:r>
-              <a:rPr b="0" lang="ru-RU" sz="2000" spc="-1" strike="noStrike">
-                <a:solidFill>
-                  <a:srgbClr val="000000"/>
-                </a:solidFill>
+              <a:rPr b="0" lang="en-US" sz="2000" strike="noStrike" u="none">
+                <a:solidFill>
+                  <a:srgbClr val="000000"/>
+                </a:solidFill>
+                <a:effectLst/>
+                <a:uFillTx/>
                 <a:latin typeface="Arial"/>
               </a:rPr>
-              <a:t>Для правки формата примечаний щёлкните мышью</a:t>
+              <a:t>Click to edit the notes format</a:t>
             </a:r>
-            <a:endParaRPr b="0" lang="ru-RU" sz="2000" spc="-1" strike="noStrike">
-              <a:solidFill>
-                <a:srgbClr val="000000"/>
-              </a:solidFill>
-              <a:latin typeface="Arial"/>
-            </a:endParaRPr>
-          </a:p>
-        </p:txBody>
-      </p:sp>
-      <p:sp>
-        <p:nvSpPr>
-          <p:cNvPr id="6" name="PlaceHolder 3"/>
+            <a:endParaRPr b="0" lang="en-US" sz="2000" strike="noStrike" u="none">
+              <a:solidFill>
+                <a:srgbClr val="000000"/>
+              </a:solidFill>
+              <a:effectLst/>
+              <a:uFillTx/>
+              <a:latin typeface="Arial"/>
+            </a:endParaRPr>
+          </a:p>
+        </p:txBody>
+      </p:sp>
+      <p:sp>
+        <p:nvSpPr>
+          <p:cNvPr id="8" name="PlaceHolder 3"/>
           <p:cNvSpPr>
             <a:spLocks noGrp="1"/>
           </p:cNvSpPr>
@@ -171,18 +179,22 @@
               <a:buNone/>
             </a:pPr>
             <a:r>
-              <a:rPr b="0" lang="ru-RU" sz="1400" spc="-1" strike="noStrike">
-                <a:solidFill>
-                  <a:srgbClr val="000000"/>
-                </a:solidFill>
+              <a:rPr b="0" lang="en-US" sz="1400" strike="noStrike" u="none">
+                <a:solidFill>
+                  <a:srgbClr val="000000"/>
+                </a:solidFill>
+                <a:effectLst/>
+                <a:uFillTx/>
                 <a:latin typeface="Times New Roman"/>
               </a:rPr>
-              <a:t>&lt;верхний колонтитул&gt;</a:t>
+              <a:t>&lt;header&gt;</a:t>
             </a:r>
-            <a:endParaRPr b="0" lang="ru-RU" sz="1400" spc="-1" strike="noStrike">
-              <a:solidFill>
-                <a:srgbClr val="000000"/>
-              </a:solidFill>
+            <a:endParaRPr b="0" lang="en-US" sz="1400" strike="noStrike" u="none">
+              <a:solidFill>
+                <a:srgbClr val="000000"/>
+              </a:solidFill>
+              <a:effectLst/>
+              <a:uFillTx/>
               <a:latin typeface="Times New Roman"/>
             </a:endParaRPr>
           </a:p>
@@ -190,7 +202,7 @@
       </p:sp>
       <p:sp>
         <p:nvSpPr>
-          <p:cNvPr id="7" name="PlaceHolder 4"/>
+          <p:cNvPr id="9" name="PlaceHolder 4"/>
           <p:cNvSpPr>
             <a:spLocks noGrp="1"/>
           </p:cNvSpPr>
@@ -218,10 +230,12 @@
           <a:lstStyle>
             <a:lvl1pPr indent="0" algn="r">
               <a:buNone/>
-              <a:defRPr b="0" lang="ru-RU" sz="1400" spc="-1" strike="noStrike">
-                <a:solidFill>
-                  <a:srgbClr val="000000"/>
-                </a:solidFill>
+              <a:defRPr b="0" lang="en-US" sz="1400" strike="noStrike" u="none">
+                <a:solidFill>
+                  <a:srgbClr val="000000"/>
+                </a:solidFill>
+                <a:effectLst/>
+                <a:uFillTx/>
                 <a:latin typeface="Times New Roman"/>
               </a:defRPr>
             </a:lvl1pPr>
@@ -231,18 +245,22 @@
               <a:buNone/>
             </a:pPr>
             <a:r>
-              <a:rPr b="0" lang="ru-RU" sz="1400" spc="-1" strike="noStrike">
-                <a:solidFill>
-                  <a:srgbClr val="000000"/>
-                </a:solidFill>
+              <a:rPr b="0" lang="en-US" sz="1400" strike="noStrike" u="none">
+                <a:solidFill>
+                  <a:srgbClr val="000000"/>
+                </a:solidFill>
+                <a:effectLst/>
+                <a:uFillTx/>
                 <a:latin typeface="Times New Roman"/>
               </a:rPr>
-              <a:t>&lt;дата/время&gt;</a:t>
+              <a:t>&lt;date/time&gt;</a:t>
             </a:r>
-            <a:endParaRPr b="0" lang="ru-RU" sz="1400" spc="-1" strike="noStrike">
-              <a:solidFill>
-                <a:srgbClr val="000000"/>
-              </a:solidFill>
+            <a:endParaRPr b="0" lang="en-US" sz="1400" strike="noStrike" u="none">
+              <a:solidFill>
+                <a:srgbClr val="000000"/>
+              </a:solidFill>
+              <a:effectLst/>
+              <a:uFillTx/>
               <a:latin typeface="Times New Roman"/>
             </a:endParaRPr>
           </a:p>
@@ -250,7 +268,7 @@
       </p:sp>
       <p:sp>
         <p:nvSpPr>
-          <p:cNvPr id="8" name="PlaceHolder 5"/>
+          <p:cNvPr id="10" name="PlaceHolder 5"/>
           <p:cNvSpPr>
             <a:spLocks noGrp="1"/>
           </p:cNvSpPr>
@@ -278,10 +296,12 @@
           <a:lstStyle>
             <a:lvl1pPr indent="0">
               <a:buNone/>
-              <a:defRPr b="0" lang="ru-RU" sz="1400" spc="-1" strike="noStrike">
-                <a:solidFill>
-                  <a:srgbClr val="000000"/>
-                </a:solidFill>
+              <a:defRPr b="0" lang="en-US" sz="1400" strike="noStrike" u="none">
+                <a:solidFill>
+                  <a:srgbClr val="000000"/>
+                </a:solidFill>
+                <a:effectLst/>
+                <a:uFillTx/>
                 <a:latin typeface="Times New Roman"/>
               </a:defRPr>
             </a:lvl1pPr>
@@ -291,18 +311,22 @@
               <a:buNone/>
             </a:pPr>
             <a:r>
-              <a:rPr b="0" lang="ru-RU" sz="1400" spc="-1" strike="noStrike">
-                <a:solidFill>
-                  <a:srgbClr val="000000"/>
-                </a:solidFill>
+              <a:rPr b="0" lang="en-US" sz="1400" strike="noStrike" u="none">
+                <a:solidFill>
+                  <a:srgbClr val="000000"/>
+                </a:solidFill>
+                <a:effectLst/>
+                <a:uFillTx/>
                 <a:latin typeface="Times New Roman"/>
               </a:rPr>
-              <a:t>&lt;нижний колонтитул&gt;</a:t>
+              <a:t>&lt;footer&gt;</a:t>
             </a:r>
-            <a:endParaRPr b="0" lang="ru-RU" sz="1400" spc="-1" strike="noStrike">
-              <a:solidFill>
-                <a:srgbClr val="000000"/>
-              </a:solidFill>
+            <a:endParaRPr b="0" lang="en-US" sz="1400" strike="noStrike" u="none">
+              <a:solidFill>
+                <a:srgbClr val="000000"/>
+              </a:solidFill>
+              <a:effectLst/>
+              <a:uFillTx/>
               <a:latin typeface="Times New Roman"/>
             </a:endParaRPr>
           </a:p>
@@ -310,7 +334,7 @@
       </p:sp>
       <p:sp>
         <p:nvSpPr>
-          <p:cNvPr id="9" name="PlaceHolder 6"/>
+          <p:cNvPr id="11" name="PlaceHolder 6"/>
           <p:cNvSpPr>
             <a:spLocks noGrp="1"/>
           </p:cNvSpPr>
@@ -338,10 +362,12 @@
           <a:lstStyle>
             <a:lvl1pPr indent="0" algn="r">
               <a:buNone/>
-              <a:defRPr b="0" lang="ru-RU" sz="1400" spc="-1" strike="noStrike">
-                <a:solidFill>
-                  <a:srgbClr val="000000"/>
-                </a:solidFill>
+              <a:defRPr b="0" lang="en-US" sz="1400" strike="noStrike" u="none">
+                <a:solidFill>
+                  <a:srgbClr val="000000"/>
+                </a:solidFill>
+                <a:effectLst/>
+                <a:uFillTx/>
                 <a:latin typeface="Times New Roman"/>
               </a:defRPr>
             </a:lvl1pPr>
@@ -350,19 +376,23 @@
             <a:pPr indent="0" algn="r">
               <a:buNone/>
             </a:pPr>
-            <a:fld id="{9462C449-09E9-4AFA-8F68-EEC5987875D6}" type="slidenum">
-              <a:rPr b="0" lang="ru-RU" sz="1400" spc="-1" strike="noStrike">
-                <a:solidFill>
-                  <a:srgbClr val="000000"/>
-                </a:solidFill>
+            <a:fld id="{9C9440B4-58AF-4641-845D-F076EC485E8C}" type="slidenum">
+              <a:rPr b="0" lang="en-US" sz="1400" strike="noStrike" u="none">
+                <a:solidFill>
+                  <a:srgbClr val="000000"/>
+                </a:solidFill>
+                <a:effectLst/>
+                <a:uFillTx/>
                 <a:latin typeface="Times New Roman"/>
               </a:rPr>
-              <a:t>&lt;номер&gt;</a:t>
+              <a:t>&lt;number&gt;</a:t>
             </a:fld>
-            <a:endParaRPr b="0" lang="ru-RU" sz="1400" spc="-1" strike="noStrike">
-              <a:solidFill>
-                <a:srgbClr val="000000"/>
-              </a:solidFill>
+            <a:endParaRPr b="0" lang="en-US" sz="1400" strike="noStrike" u="none">
+              <a:solidFill>
+                <a:srgbClr val="000000"/>
+              </a:solidFill>
+              <a:effectLst/>
+              <a:uFillTx/>
               <a:latin typeface="Times New Roman"/>
             </a:endParaRPr>
           </a:p>
@@ -393,7 +423,7 @@
       </p:grpSpPr>
       <p:sp>
         <p:nvSpPr>
-          <p:cNvPr id="81" name="PlaceHolder 1"/>
+          <p:cNvPr id="83" name="PlaceHolder 1"/>
           <p:cNvSpPr>
             <a:spLocks noGrp="1"/>
           </p:cNvSpPr>
@@ -404,19 +434,19 @@
         <p:spPr>
           <a:xfrm>
             <a:off x="685800" y="1143000"/>
-            <a:ext cx="5485680" cy="3085560"/>
-          </a:xfrm>
-          <a:prstGeom prst="rect">
-            <a:avLst/>
-          </a:prstGeom>
-          <a:ln w="0">
-            <a:noFill/>
-          </a:ln>
-        </p:spPr>
-      </p:sp>
-      <p:sp>
-        <p:nvSpPr>
-          <p:cNvPr id="82" name="PlaceHolder 2"/>
+            <a:ext cx="5485320" cy="3085200"/>
+          </a:xfrm>
+          <a:prstGeom prst="rect">
+            <a:avLst/>
+          </a:prstGeom>
+          <a:ln w="0">
+            <a:noFill/>
+          </a:ln>
+        </p:spPr>
+      </p:sp>
+      <p:sp>
+        <p:nvSpPr>
+          <p:cNvPr id="84" name="PlaceHolder 2"/>
           <p:cNvSpPr>
             <a:spLocks noGrp="1"/>
           </p:cNvSpPr>
@@ -427,7 +457,7 @@
         <p:spPr>
           <a:xfrm>
             <a:off x="685800" y="4400640"/>
-            <a:ext cx="5485680" cy="3599640"/>
+            <a:ext cx="5485320" cy="3599280"/>
           </a:xfrm>
           <a:prstGeom prst="rect">
             <a:avLst/>
@@ -442,21 +472,23 @@
             <a:noAutofit/>
           </a:bodyPr>
           <a:p>
-            <a:pPr marL="216000" indent="-216000">
+            <a:pPr indent="0">
               <a:buNone/>
             </a:pPr>
-            <a:endParaRPr b="0" lang="ru-RU" sz="1800" spc="-1" strike="noStrike">
-              <a:solidFill>
-                <a:srgbClr val="000000"/>
-              </a:solidFill>
-              <a:latin typeface="Arial"/>
-            </a:endParaRPr>
-          </a:p>
-        </p:txBody>
-      </p:sp>
-      <p:sp>
-        <p:nvSpPr>
-          <p:cNvPr id="83" name="PlaceHolder 3"/>
+            <a:endParaRPr b="0" lang="en-US" sz="1800" strike="noStrike" u="none">
+              <a:solidFill>
+                <a:srgbClr val="000000"/>
+              </a:solidFill>
+              <a:effectLst/>
+              <a:uFillTx/>
+              <a:latin typeface="Arial"/>
+            </a:endParaRPr>
+          </a:p>
+        </p:txBody>
+      </p:sp>
+      <p:sp>
+        <p:nvSpPr>
+          <p:cNvPr id="85" name="PlaceHolder 3"/>
           <p:cNvSpPr>
             <a:spLocks noGrp="1"/>
           </p:cNvSpPr>
@@ -467,7 +499,7 @@
         <p:spPr>
           <a:xfrm>
             <a:off x="3884760" y="8685360"/>
-            <a:ext cx="2971080" cy="457920"/>
+            <a:ext cx="2970720" cy="457560"/>
           </a:xfrm>
           <a:prstGeom prst="rect">
             <a:avLst/>
@@ -490,10 +522,12 @@
               <a:tabLst>
                 <a:tab algn="l" pos="0"/>
               </a:tabLst>
-              <a:defRPr b="0" lang="en-US" sz="1200" spc="-1" strike="noStrike">
+              <a:defRPr b="0" lang="en-US" sz="1200" strike="noStrike" u="none">
                 <a:solidFill>
                   <a:schemeClr val="dk1"/>
                 </a:solidFill>
+                <a:effectLst/>
+                <a:uFillTx/>
                 <a:latin typeface="+mn-lt"/>
                 <a:ea typeface="+mn-ea"/>
               </a:defRPr>
@@ -509,20 +543,24 @@
                 <a:tab algn="l" pos="0"/>
               </a:tabLst>
             </a:pPr>
-            <a:fld id="{28E97F11-9271-4967-996E-3B476CB81109}" type="slidenum">
-              <a:rPr b="0" lang="en-US" sz="1200" spc="-1" strike="noStrike">
+            <a:fld id="{57547114-9431-4222-AFA4-0AF0C087ACAB}" type="slidenum">
+              <a:rPr b="0" lang="en-US" sz="1200" strike="noStrike" u="none">
                 <a:solidFill>
                   <a:schemeClr val="dk1"/>
                 </a:solidFill>
+                <a:effectLst/>
+                <a:uFillTx/>
                 <a:latin typeface="+mn-lt"/>
                 <a:ea typeface="+mn-ea"/>
               </a:rPr>
-              <a:t>&lt;номер&gt;</a:t>
+              <a:t>&lt;number&gt;</a:t>
             </a:fld>
-            <a:endParaRPr b="0" lang="ru-RU" sz="1200" spc="-1" strike="noStrike">
-              <a:solidFill>
-                <a:srgbClr val="000000"/>
-              </a:solidFill>
+            <a:endParaRPr b="0" lang="en-US" sz="1200" strike="noStrike" u="none">
+              <a:solidFill>
+                <a:srgbClr val="000000"/>
+              </a:solidFill>
+              <a:effectLst/>
+              <a:uFillTx/>
               <a:latin typeface="Times New Roman"/>
             </a:endParaRPr>
           </a:p>
@@ -552,7 +590,7 @@
       </p:grpSpPr>
       <p:sp>
         <p:nvSpPr>
-          <p:cNvPr id="84" name="PlaceHolder 1"/>
+          <p:cNvPr id="86" name="PlaceHolder 1"/>
           <p:cNvSpPr>
             <a:spLocks noGrp="1"/>
           </p:cNvSpPr>
@@ -563,19 +601,19 @@
         <p:spPr>
           <a:xfrm>
             <a:off x="685800" y="1143000"/>
-            <a:ext cx="5485680" cy="3085560"/>
-          </a:xfrm>
-          <a:prstGeom prst="rect">
-            <a:avLst/>
-          </a:prstGeom>
-          <a:ln w="0">
-            <a:noFill/>
-          </a:ln>
-        </p:spPr>
-      </p:sp>
-      <p:sp>
-        <p:nvSpPr>
-          <p:cNvPr id="85" name="PlaceHolder 2"/>
+            <a:ext cx="5485320" cy="3085200"/>
+          </a:xfrm>
+          <a:prstGeom prst="rect">
+            <a:avLst/>
+          </a:prstGeom>
+          <a:ln w="0">
+            <a:noFill/>
+          </a:ln>
+        </p:spPr>
+      </p:sp>
+      <p:sp>
+        <p:nvSpPr>
+          <p:cNvPr id="87" name="PlaceHolder 2"/>
           <p:cNvSpPr>
             <a:spLocks noGrp="1"/>
           </p:cNvSpPr>
@@ -586,7 +624,7 @@
         <p:spPr>
           <a:xfrm>
             <a:off x="685800" y="4400640"/>
-            <a:ext cx="5485680" cy="3599640"/>
+            <a:ext cx="5485320" cy="3599280"/>
           </a:xfrm>
           <a:prstGeom prst="rect">
             <a:avLst/>
@@ -601,21 +639,23 @@
             <a:noAutofit/>
           </a:bodyPr>
           <a:p>
-            <a:pPr marL="216000" indent="-216000">
+            <a:pPr indent="0">
               <a:buNone/>
             </a:pPr>
-            <a:endParaRPr b="0" lang="ru-RU" sz="1800" spc="-1" strike="noStrike">
-              <a:solidFill>
-                <a:srgbClr val="000000"/>
-              </a:solidFill>
-              <a:latin typeface="Arial"/>
-            </a:endParaRPr>
-          </a:p>
-        </p:txBody>
-      </p:sp>
-      <p:sp>
-        <p:nvSpPr>
-          <p:cNvPr id="86" name="PlaceHolder 3"/>
+            <a:endParaRPr b="0" lang="en-US" sz="1800" strike="noStrike" u="none">
+              <a:solidFill>
+                <a:srgbClr val="000000"/>
+              </a:solidFill>
+              <a:effectLst/>
+              <a:uFillTx/>
+              <a:latin typeface="Arial"/>
+            </a:endParaRPr>
+          </a:p>
+        </p:txBody>
+      </p:sp>
+      <p:sp>
+        <p:nvSpPr>
+          <p:cNvPr id="88" name="PlaceHolder 3"/>
           <p:cNvSpPr>
             <a:spLocks noGrp="1"/>
           </p:cNvSpPr>
@@ -626,7 +666,7 @@
         <p:spPr>
           <a:xfrm>
             <a:off x="3884760" y="8685360"/>
-            <a:ext cx="2971080" cy="457920"/>
+            <a:ext cx="2970720" cy="457560"/>
           </a:xfrm>
           <a:prstGeom prst="rect">
             <a:avLst/>
@@ -649,10 +689,12 @@
               <a:tabLst>
                 <a:tab algn="l" pos="0"/>
               </a:tabLst>
-              <a:defRPr b="0" lang="en-US" sz="1200" spc="-1" strike="noStrike">
+              <a:defRPr b="0" lang="en-US" sz="1200" strike="noStrike" u="none">
                 <a:solidFill>
                   <a:schemeClr val="dk1"/>
                 </a:solidFill>
+                <a:effectLst/>
+                <a:uFillTx/>
                 <a:latin typeface="+mn-lt"/>
                 <a:ea typeface="+mn-ea"/>
               </a:defRPr>
@@ -668,20 +710,24 @@
                 <a:tab algn="l" pos="0"/>
               </a:tabLst>
             </a:pPr>
-            <a:fld id="{92D8468C-91E3-4D8A-81DD-E610218F680D}" type="slidenum">
-              <a:rPr b="0" lang="en-US" sz="1200" spc="-1" strike="noStrike">
+            <a:fld id="{84E5E8D2-8C37-499B-9ED7-C92DDB556C1E}" type="slidenum">
+              <a:rPr b="0" lang="en-US" sz="1200" strike="noStrike" u="none">
                 <a:solidFill>
                   <a:schemeClr val="dk1"/>
                 </a:solidFill>
+                <a:effectLst/>
+                <a:uFillTx/>
                 <a:latin typeface="+mn-lt"/>
                 <a:ea typeface="+mn-ea"/>
               </a:rPr>
-              <a:t>&lt;номер&gt;</a:t>
+              <a:t>&lt;number&gt;</a:t>
             </a:fld>
-            <a:endParaRPr b="0" lang="ru-RU" sz="1200" spc="-1" strike="noStrike">
-              <a:solidFill>
-                <a:srgbClr val="000000"/>
-              </a:solidFill>
+            <a:endParaRPr b="0" lang="en-US" sz="1200" strike="noStrike" u="none">
+              <a:solidFill>
+                <a:srgbClr val="000000"/>
+              </a:solidFill>
+              <a:effectLst/>
+              <a:uFillTx/>
               <a:latin typeface="Times New Roman"/>
             </a:endParaRPr>
           </a:p>
@@ -711,7 +757,7 @@
       </p:grpSpPr>
       <p:sp>
         <p:nvSpPr>
-          <p:cNvPr id="87" name="PlaceHolder 1"/>
+          <p:cNvPr id="89" name="PlaceHolder 1"/>
           <p:cNvSpPr>
             <a:spLocks noGrp="1"/>
           </p:cNvSpPr>
@@ -722,19 +768,19 @@
         <p:spPr>
           <a:xfrm>
             <a:off x="685800" y="1143000"/>
-            <a:ext cx="5485680" cy="3085560"/>
-          </a:xfrm>
-          <a:prstGeom prst="rect">
-            <a:avLst/>
-          </a:prstGeom>
-          <a:ln w="0">
-            <a:noFill/>
-          </a:ln>
-        </p:spPr>
-      </p:sp>
-      <p:sp>
-        <p:nvSpPr>
-          <p:cNvPr id="88" name="PlaceHolder 2"/>
+            <a:ext cx="5485320" cy="3085200"/>
+          </a:xfrm>
+          <a:prstGeom prst="rect">
+            <a:avLst/>
+          </a:prstGeom>
+          <a:ln w="0">
+            <a:noFill/>
+          </a:ln>
+        </p:spPr>
+      </p:sp>
+      <p:sp>
+        <p:nvSpPr>
+          <p:cNvPr id="90" name="PlaceHolder 2"/>
           <p:cNvSpPr>
             <a:spLocks noGrp="1"/>
           </p:cNvSpPr>
@@ -745,7 +791,7 @@
         <p:spPr>
           <a:xfrm>
             <a:off x="685800" y="4400640"/>
-            <a:ext cx="5485680" cy="3599640"/>
+            <a:ext cx="5485320" cy="3599280"/>
           </a:xfrm>
           <a:prstGeom prst="rect">
             <a:avLst/>
@@ -760,21 +806,23 @@
             <a:noAutofit/>
           </a:bodyPr>
           <a:p>
-            <a:pPr marL="216000" indent="-216000">
+            <a:pPr indent="0">
               <a:buNone/>
             </a:pPr>
-            <a:endParaRPr b="0" lang="ru-RU" sz="1800" spc="-1" strike="noStrike">
-              <a:solidFill>
-                <a:srgbClr val="000000"/>
-              </a:solidFill>
-              <a:latin typeface="Arial"/>
-            </a:endParaRPr>
-          </a:p>
-        </p:txBody>
-      </p:sp>
-      <p:sp>
-        <p:nvSpPr>
-          <p:cNvPr id="89" name="PlaceHolder 3"/>
+            <a:endParaRPr b="0" lang="en-US" sz="1800" strike="noStrike" u="none">
+              <a:solidFill>
+                <a:srgbClr val="000000"/>
+              </a:solidFill>
+              <a:effectLst/>
+              <a:uFillTx/>
+              <a:latin typeface="Arial"/>
+            </a:endParaRPr>
+          </a:p>
+        </p:txBody>
+      </p:sp>
+      <p:sp>
+        <p:nvSpPr>
+          <p:cNvPr id="91" name="PlaceHolder 3"/>
           <p:cNvSpPr>
             <a:spLocks noGrp="1"/>
           </p:cNvSpPr>
@@ -785,7 +833,7 @@
         <p:spPr>
           <a:xfrm>
             <a:off x="3884760" y="8685360"/>
-            <a:ext cx="2971080" cy="457920"/>
+            <a:ext cx="2970720" cy="457560"/>
           </a:xfrm>
           <a:prstGeom prst="rect">
             <a:avLst/>
@@ -808,10 +856,12 @@
               <a:tabLst>
                 <a:tab algn="l" pos="0"/>
               </a:tabLst>
-              <a:defRPr b="0" lang="en-US" sz="1200" spc="-1" strike="noStrike">
+              <a:defRPr b="0" lang="en-US" sz="1200" strike="noStrike" u="none">
                 <a:solidFill>
                   <a:schemeClr val="dk1"/>
                 </a:solidFill>
+                <a:effectLst/>
+                <a:uFillTx/>
                 <a:latin typeface="+mn-lt"/>
                 <a:ea typeface="+mn-ea"/>
               </a:defRPr>
@@ -827,20 +877,24 @@
                 <a:tab algn="l" pos="0"/>
               </a:tabLst>
             </a:pPr>
-            <a:fld id="{5335244A-088F-454A-A077-B9B4AE51C566}" type="slidenum">
-              <a:rPr b="0" lang="en-US" sz="1200" spc="-1" strike="noStrike">
+            <a:fld id="{F3E41F84-E231-4D2B-9BCD-74B2E8E80681}" type="slidenum">
+              <a:rPr b="0" lang="en-US" sz="1200" strike="noStrike" u="none">
                 <a:solidFill>
                   <a:schemeClr val="dk1"/>
                 </a:solidFill>
+                <a:effectLst/>
+                <a:uFillTx/>
                 <a:latin typeface="+mn-lt"/>
                 <a:ea typeface="+mn-ea"/>
               </a:rPr>
-              <a:t>&lt;номер&gt;</a:t>
+              <a:t>&lt;number&gt;</a:t>
             </a:fld>
-            <a:endParaRPr b="0" lang="ru-RU" sz="1200" spc="-1" strike="noStrike">
-              <a:solidFill>
-                <a:srgbClr val="000000"/>
-              </a:solidFill>
+            <a:endParaRPr b="0" lang="en-US" sz="1200" strike="noStrike" u="none">
+              <a:solidFill>
+                <a:srgbClr val="000000"/>
+              </a:solidFill>
+              <a:effectLst/>
+              <a:uFillTx/>
               <a:latin typeface="Times New Roman"/>
             </a:endParaRPr>
           </a:p>
@@ -870,7 +924,7 @@
       </p:grpSpPr>
       <p:sp>
         <p:nvSpPr>
-          <p:cNvPr id="57" name="PlaceHolder 1"/>
+          <p:cNvPr id="59" name="PlaceHolder 1"/>
           <p:cNvSpPr>
             <a:spLocks noGrp="1"/>
           </p:cNvSpPr>
@@ -881,19 +935,19 @@
         <p:spPr>
           <a:xfrm>
             <a:off x="685800" y="1143000"/>
-            <a:ext cx="5485680" cy="3085560"/>
-          </a:xfrm>
-          <a:prstGeom prst="rect">
-            <a:avLst/>
-          </a:prstGeom>
-          <a:ln w="0">
-            <a:noFill/>
-          </a:ln>
-        </p:spPr>
-      </p:sp>
-      <p:sp>
-        <p:nvSpPr>
-          <p:cNvPr id="58" name="PlaceHolder 2"/>
+            <a:ext cx="5485320" cy="3085200"/>
+          </a:xfrm>
+          <a:prstGeom prst="rect">
+            <a:avLst/>
+          </a:prstGeom>
+          <a:ln w="0">
+            <a:noFill/>
+          </a:ln>
+        </p:spPr>
+      </p:sp>
+      <p:sp>
+        <p:nvSpPr>
+          <p:cNvPr id="60" name="PlaceHolder 2"/>
           <p:cNvSpPr>
             <a:spLocks noGrp="1"/>
           </p:cNvSpPr>
@@ -904,7 +958,7 @@
         <p:spPr>
           <a:xfrm>
             <a:off x="685800" y="4400640"/>
-            <a:ext cx="5485680" cy="3599640"/>
+            <a:ext cx="5485320" cy="3599280"/>
           </a:xfrm>
           <a:prstGeom prst="rect">
             <a:avLst/>
@@ -919,21 +973,23 @@
             <a:noAutofit/>
           </a:bodyPr>
           <a:p>
-            <a:pPr marL="216000" indent="-216000">
+            <a:pPr indent="0">
               <a:buNone/>
             </a:pPr>
-            <a:endParaRPr b="0" lang="ru-RU" sz="1800" spc="-1" strike="noStrike">
-              <a:solidFill>
-                <a:srgbClr val="000000"/>
-              </a:solidFill>
-              <a:latin typeface="Arial"/>
-            </a:endParaRPr>
-          </a:p>
-        </p:txBody>
-      </p:sp>
-      <p:sp>
-        <p:nvSpPr>
-          <p:cNvPr id="59" name="PlaceHolder 3"/>
+            <a:endParaRPr b="0" lang="en-US" sz="1800" strike="noStrike" u="none">
+              <a:solidFill>
+                <a:srgbClr val="000000"/>
+              </a:solidFill>
+              <a:effectLst/>
+              <a:uFillTx/>
+              <a:latin typeface="Arial"/>
+            </a:endParaRPr>
+          </a:p>
+        </p:txBody>
+      </p:sp>
+      <p:sp>
+        <p:nvSpPr>
+          <p:cNvPr id="61" name="PlaceHolder 3"/>
           <p:cNvSpPr>
             <a:spLocks noGrp="1"/>
           </p:cNvSpPr>
@@ -944,7 +1000,7 @@
         <p:spPr>
           <a:xfrm>
             <a:off x="3884760" y="8685360"/>
-            <a:ext cx="2971080" cy="457920"/>
+            <a:ext cx="2970720" cy="457560"/>
           </a:xfrm>
           <a:prstGeom prst="rect">
             <a:avLst/>
@@ -967,10 +1023,12 @@
               <a:tabLst>
                 <a:tab algn="l" pos="0"/>
               </a:tabLst>
-              <a:defRPr b="0" lang="en-US" sz="1200" spc="-1" strike="noStrike">
+              <a:defRPr b="0" lang="en-US" sz="1200" strike="noStrike" u="none">
                 <a:solidFill>
                   <a:schemeClr val="dk1"/>
                 </a:solidFill>
+                <a:effectLst/>
+                <a:uFillTx/>
                 <a:latin typeface="+mn-lt"/>
                 <a:ea typeface="+mn-ea"/>
               </a:defRPr>
@@ -986,20 +1044,24 @@
                 <a:tab algn="l" pos="0"/>
               </a:tabLst>
             </a:pPr>
-            <a:fld id="{4D6F04D3-4812-487A-9906-90BA3B6B719C}" type="slidenum">
-              <a:rPr b="0" lang="en-US" sz="1200" spc="-1" strike="noStrike">
+            <a:fld id="{893F54A9-8656-4E38-AC86-DF94D520CC35}" type="slidenum">
+              <a:rPr b="0" lang="en-US" sz="1200" strike="noStrike" u="none">
                 <a:solidFill>
                   <a:schemeClr val="dk1"/>
                 </a:solidFill>
+                <a:effectLst/>
+                <a:uFillTx/>
                 <a:latin typeface="+mn-lt"/>
                 <a:ea typeface="+mn-ea"/>
               </a:rPr>
-              <a:t>&lt;номер&gt;</a:t>
+              <a:t>&lt;number&gt;</a:t>
             </a:fld>
-            <a:endParaRPr b="0" lang="ru-RU" sz="1200" spc="-1" strike="noStrike">
-              <a:solidFill>
-                <a:srgbClr val="000000"/>
-              </a:solidFill>
+            <a:endParaRPr b="0" lang="en-US" sz="1200" strike="noStrike" u="none">
+              <a:solidFill>
+                <a:srgbClr val="000000"/>
+              </a:solidFill>
+              <a:effectLst/>
+              <a:uFillTx/>
               <a:latin typeface="Times New Roman"/>
             </a:endParaRPr>
           </a:p>
@@ -1029,7 +1091,7 @@
       </p:grpSpPr>
       <p:sp>
         <p:nvSpPr>
-          <p:cNvPr id="60" name="PlaceHolder 1"/>
+          <p:cNvPr id="62" name="PlaceHolder 1"/>
           <p:cNvSpPr>
             <a:spLocks noGrp="1"/>
           </p:cNvSpPr>
@@ -1040,19 +1102,19 @@
         <p:spPr>
           <a:xfrm>
             <a:off x="685800" y="1143000"/>
-            <a:ext cx="5485680" cy="3085560"/>
-          </a:xfrm>
-          <a:prstGeom prst="rect">
-            <a:avLst/>
-          </a:prstGeom>
-          <a:ln w="0">
-            <a:noFill/>
-          </a:ln>
-        </p:spPr>
-      </p:sp>
-      <p:sp>
-        <p:nvSpPr>
-          <p:cNvPr id="61" name="PlaceHolder 2"/>
+            <a:ext cx="5485320" cy="3085200"/>
+          </a:xfrm>
+          <a:prstGeom prst="rect">
+            <a:avLst/>
+          </a:prstGeom>
+          <a:ln w="0">
+            <a:noFill/>
+          </a:ln>
+        </p:spPr>
+      </p:sp>
+      <p:sp>
+        <p:nvSpPr>
+          <p:cNvPr id="63" name="PlaceHolder 2"/>
           <p:cNvSpPr>
             <a:spLocks noGrp="1"/>
           </p:cNvSpPr>
@@ -1063,7 +1125,7 @@
         <p:spPr>
           <a:xfrm>
             <a:off x="685800" y="4400640"/>
-            <a:ext cx="5485680" cy="3599640"/>
+            <a:ext cx="5485320" cy="3599280"/>
           </a:xfrm>
           <a:prstGeom prst="rect">
             <a:avLst/>
@@ -1078,21 +1140,23 @@
             <a:noAutofit/>
           </a:bodyPr>
           <a:p>
-            <a:pPr marL="216000" indent="-216000">
+            <a:pPr indent="0">
               <a:buNone/>
             </a:pPr>
-            <a:endParaRPr b="0" lang="ru-RU" sz="1800" spc="-1" strike="noStrike">
-              <a:solidFill>
-                <a:srgbClr val="000000"/>
-              </a:solidFill>
-              <a:latin typeface="Arial"/>
-            </a:endParaRPr>
-          </a:p>
-        </p:txBody>
-      </p:sp>
-      <p:sp>
-        <p:nvSpPr>
-          <p:cNvPr id="62" name="PlaceHolder 3"/>
+            <a:endParaRPr b="0" lang="en-US" sz="1800" strike="noStrike" u="none">
+              <a:solidFill>
+                <a:srgbClr val="000000"/>
+              </a:solidFill>
+              <a:effectLst/>
+              <a:uFillTx/>
+              <a:latin typeface="Arial"/>
+            </a:endParaRPr>
+          </a:p>
+        </p:txBody>
+      </p:sp>
+      <p:sp>
+        <p:nvSpPr>
+          <p:cNvPr id="64" name="PlaceHolder 3"/>
           <p:cNvSpPr>
             <a:spLocks noGrp="1"/>
           </p:cNvSpPr>
@@ -1103,7 +1167,7 @@
         <p:spPr>
           <a:xfrm>
             <a:off x="3884760" y="8685360"/>
-            <a:ext cx="2971080" cy="457920"/>
+            <a:ext cx="2970720" cy="457560"/>
           </a:xfrm>
           <a:prstGeom prst="rect">
             <a:avLst/>
@@ -1126,10 +1190,12 @@
               <a:tabLst>
                 <a:tab algn="l" pos="0"/>
               </a:tabLst>
-              <a:defRPr b="0" lang="en-US" sz="1200" spc="-1" strike="noStrike">
+              <a:defRPr b="0" lang="en-US" sz="1200" strike="noStrike" u="none">
                 <a:solidFill>
                   <a:schemeClr val="dk1"/>
                 </a:solidFill>
+                <a:effectLst/>
+                <a:uFillTx/>
                 <a:latin typeface="+mn-lt"/>
                 <a:ea typeface="+mn-ea"/>
               </a:defRPr>
@@ -1145,20 +1211,24 @@
                 <a:tab algn="l" pos="0"/>
               </a:tabLst>
             </a:pPr>
-            <a:fld id="{E25A4045-3F15-4EB3-9AD8-7AE1F4961511}" type="slidenum">
-              <a:rPr b="0" lang="en-US" sz="1200" spc="-1" strike="noStrike">
+            <a:fld id="{32F2DBE6-BE28-48D7-A09B-D09E81E6538F}" type="slidenum">
+              <a:rPr b="0" lang="en-US" sz="1200" strike="noStrike" u="none">
                 <a:solidFill>
                   <a:schemeClr val="dk1"/>
                 </a:solidFill>
+                <a:effectLst/>
+                <a:uFillTx/>
                 <a:latin typeface="+mn-lt"/>
                 <a:ea typeface="+mn-ea"/>
               </a:rPr>
-              <a:t>&lt;номер&gt;</a:t>
+              <a:t>&lt;number&gt;</a:t>
             </a:fld>
-            <a:endParaRPr b="0" lang="ru-RU" sz="1200" spc="-1" strike="noStrike">
-              <a:solidFill>
-                <a:srgbClr val="000000"/>
-              </a:solidFill>
+            <a:endParaRPr b="0" lang="en-US" sz="1200" strike="noStrike" u="none">
+              <a:solidFill>
+                <a:srgbClr val="000000"/>
+              </a:solidFill>
+              <a:effectLst/>
+              <a:uFillTx/>
               <a:latin typeface="Times New Roman"/>
             </a:endParaRPr>
           </a:p>
@@ -1188,7 +1258,7 @@
       </p:grpSpPr>
       <p:sp>
         <p:nvSpPr>
-          <p:cNvPr id="63" name="PlaceHolder 1"/>
+          <p:cNvPr id="65" name="PlaceHolder 1"/>
           <p:cNvSpPr>
             <a:spLocks noGrp="1"/>
           </p:cNvSpPr>
@@ -1199,19 +1269,19 @@
         <p:spPr>
           <a:xfrm>
             <a:off x="685800" y="1143000"/>
-            <a:ext cx="5485680" cy="3085560"/>
-          </a:xfrm>
-          <a:prstGeom prst="rect">
-            <a:avLst/>
-          </a:prstGeom>
-          <a:ln w="0">
-            <a:noFill/>
-          </a:ln>
-        </p:spPr>
-      </p:sp>
-      <p:sp>
-        <p:nvSpPr>
-          <p:cNvPr id="64" name="PlaceHolder 2"/>
+            <a:ext cx="5485320" cy="3085200"/>
+          </a:xfrm>
+          <a:prstGeom prst="rect">
+            <a:avLst/>
+          </a:prstGeom>
+          <a:ln w="0">
+            <a:noFill/>
+          </a:ln>
+        </p:spPr>
+      </p:sp>
+      <p:sp>
+        <p:nvSpPr>
+          <p:cNvPr id="66" name="PlaceHolder 2"/>
           <p:cNvSpPr>
             <a:spLocks noGrp="1"/>
           </p:cNvSpPr>
@@ -1222,7 +1292,7 @@
         <p:spPr>
           <a:xfrm>
             <a:off x="685800" y="4400640"/>
-            <a:ext cx="5485680" cy="3599640"/>
+            <a:ext cx="5485320" cy="3599280"/>
           </a:xfrm>
           <a:prstGeom prst="rect">
             <a:avLst/>
@@ -1237,21 +1307,23 @@
             <a:noAutofit/>
           </a:bodyPr>
           <a:p>
-            <a:pPr marL="216000" indent="-216000">
+            <a:pPr indent="0">
               <a:buNone/>
             </a:pPr>
-            <a:endParaRPr b="0" lang="ru-RU" sz="1800" spc="-1" strike="noStrike">
-              <a:solidFill>
-                <a:srgbClr val="000000"/>
-              </a:solidFill>
-              <a:latin typeface="Arial"/>
-            </a:endParaRPr>
-          </a:p>
-        </p:txBody>
-      </p:sp>
-      <p:sp>
-        <p:nvSpPr>
-          <p:cNvPr id="65" name="PlaceHolder 3"/>
+            <a:endParaRPr b="0" lang="en-US" sz="1800" strike="noStrike" u="none">
+              <a:solidFill>
+                <a:srgbClr val="000000"/>
+              </a:solidFill>
+              <a:effectLst/>
+              <a:uFillTx/>
+              <a:latin typeface="Arial"/>
+            </a:endParaRPr>
+          </a:p>
+        </p:txBody>
+      </p:sp>
+      <p:sp>
+        <p:nvSpPr>
+          <p:cNvPr id="67" name="PlaceHolder 3"/>
           <p:cNvSpPr>
             <a:spLocks noGrp="1"/>
           </p:cNvSpPr>
@@ -1262,7 +1334,7 @@
         <p:spPr>
           <a:xfrm>
             <a:off x="3884760" y="8685360"/>
-            <a:ext cx="2971080" cy="457920"/>
+            <a:ext cx="2970720" cy="457560"/>
           </a:xfrm>
           <a:prstGeom prst="rect">
             <a:avLst/>
@@ -1285,10 +1357,12 @@
               <a:tabLst>
                 <a:tab algn="l" pos="0"/>
               </a:tabLst>
-              <a:defRPr b="0" lang="en-US" sz="1200" spc="-1" strike="noStrike">
+              <a:defRPr b="0" lang="en-US" sz="1200" strike="noStrike" u="none">
                 <a:solidFill>
                   <a:schemeClr val="dk1"/>
                 </a:solidFill>
+                <a:effectLst/>
+                <a:uFillTx/>
                 <a:latin typeface="+mn-lt"/>
                 <a:ea typeface="+mn-ea"/>
               </a:defRPr>
@@ -1304,20 +1378,24 @@
                 <a:tab algn="l" pos="0"/>
               </a:tabLst>
             </a:pPr>
-            <a:fld id="{358258D2-44CC-4E9D-8165-E63C2E87B89F}" type="slidenum">
-              <a:rPr b="0" lang="en-US" sz="1200" spc="-1" strike="noStrike">
+            <a:fld id="{70EA9421-E2B7-4AEF-9774-81F0543348C8}" type="slidenum">
+              <a:rPr b="0" lang="en-US" sz="1200" strike="noStrike" u="none">
                 <a:solidFill>
                   <a:schemeClr val="dk1"/>
                 </a:solidFill>
+                <a:effectLst/>
+                <a:uFillTx/>
                 <a:latin typeface="+mn-lt"/>
                 <a:ea typeface="+mn-ea"/>
               </a:rPr>
-              <a:t>&lt;номер&gt;</a:t>
+              <a:t>&lt;number&gt;</a:t>
             </a:fld>
-            <a:endParaRPr b="0" lang="ru-RU" sz="1200" spc="-1" strike="noStrike">
-              <a:solidFill>
-                <a:srgbClr val="000000"/>
-              </a:solidFill>
+            <a:endParaRPr b="0" lang="en-US" sz="1200" strike="noStrike" u="none">
+              <a:solidFill>
+                <a:srgbClr val="000000"/>
+              </a:solidFill>
+              <a:effectLst/>
+              <a:uFillTx/>
               <a:latin typeface="Times New Roman"/>
             </a:endParaRPr>
           </a:p>
@@ -1347,7 +1425,7 @@
       </p:grpSpPr>
       <p:sp>
         <p:nvSpPr>
-          <p:cNvPr id="66" name="PlaceHolder 1"/>
+          <p:cNvPr id="68" name="PlaceHolder 1"/>
           <p:cNvSpPr>
             <a:spLocks noGrp="1"/>
           </p:cNvSpPr>
@@ -1358,19 +1436,19 @@
         <p:spPr>
           <a:xfrm>
             <a:off x="685800" y="1143000"/>
-            <a:ext cx="5485680" cy="3085560"/>
-          </a:xfrm>
-          <a:prstGeom prst="rect">
-            <a:avLst/>
-          </a:prstGeom>
-          <a:ln w="0">
-            <a:noFill/>
-          </a:ln>
-        </p:spPr>
-      </p:sp>
-      <p:sp>
-        <p:nvSpPr>
-          <p:cNvPr id="67" name="PlaceHolder 2"/>
+            <a:ext cx="5485320" cy="3085200"/>
+          </a:xfrm>
+          <a:prstGeom prst="rect">
+            <a:avLst/>
+          </a:prstGeom>
+          <a:ln w="0">
+            <a:noFill/>
+          </a:ln>
+        </p:spPr>
+      </p:sp>
+      <p:sp>
+        <p:nvSpPr>
+          <p:cNvPr id="69" name="PlaceHolder 2"/>
           <p:cNvSpPr>
             <a:spLocks noGrp="1"/>
           </p:cNvSpPr>
@@ -1381,7 +1459,7 @@
         <p:spPr>
           <a:xfrm>
             <a:off x="685800" y="4400640"/>
-            <a:ext cx="5485680" cy="3599640"/>
+            <a:ext cx="5485320" cy="3599280"/>
           </a:xfrm>
           <a:prstGeom prst="rect">
             <a:avLst/>
@@ -1396,21 +1474,23 @@
             <a:noAutofit/>
           </a:bodyPr>
           <a:p>
-            <a:pPr marL="216000" indent="-216000">
+            <a:pPr indent="0">
               <a:buNone/>
             </a:pPr>
-            <a:endParaRPr b="0" lang="ru-RU" sz="1800" spc="-1" strike="noStrike">
-              <a:solidFill>
-                <a:srgbClr val="000000"/>
-              </a:solidFill>
-              <a:latin typeface="Arial"/>
-            </a:endParaRPr>
-          </a:p>
-        </p:txBody>
-      </p:sp>
-      <p:sp>
-        <p:nvSpPr>
-          <p:cNvPr id="68" name="PlaceHolder 3"/>
+            <a:endParaRPr b="0" lang="en-US" sz="1800" strike="noStrike" u="none">
+              <a:solidFill>
+                <a:srgbClr val="000000"/>
+              </a:solidFill>
+              <a:effectLst/>
+              <a:uFillTx/>
+              <a:latin typeface="Arial"/>
+            </a:endParaRPr>
+          </a:p>
+        </p:txBody>
+      </p:sp>
+      <p:sp>
+        <p:nvSpPr>
+          <p:cNvPr id="70" name="PlaceHolder 3"/>
           <p:cNvSpPr>
             <a:spLocks noGrp="1"/>
           </p:cNvSpPr>
@@ -1421,7 +1501,7 @@
         <p:spPr>
           <a:xfrm>
             <a:off x="3884760" y="8685360"/>
-            <a:ext cx="2971080" cy="457920"/>
+            <a:ext cx="2970720" cy="457560"/>
           </a:xfrm>
           <a:prstGeom prst="rect">
             <a:avLst/>
@@ -1444,10 +1524,12 @@
               <a:tabLst>
                 <a:tab algn="l" pos="0"/>
               </a:tabLst>
-              <a:defRPr b="0" lang="en-US" sz="1200" spc="-1" strike="noStrike">
+              <a:defRPr b="0" lang="en-US" sz="1200" strike="noStrike" u="none">
                 <a:solidFill>
                   <a:schemeClr val="dk1"/>
                 </a:solidFill>
+                <a:effectLst/>
+                <a:uFillTx/>
                 <a:latin typeface="+mn-lt"/>
                 <a:ea typeface="+mn-ea"/>
               </a:defRPr>
@@ -1463,20 +1545,24 @@
                 <a:tab algn="l" pos="0"/>
               </a:tabLst>
             </a:pPr>
-            <a:fld id="{33C33EE0-096C-46BA-B345-A52BDE9C8231}" type="slidenum">
-              <a:rPr b="0" lang="en-US" sz="1200" spc="-1" strike="noStrike">
+            <a:fld id="{144AC486-9056-45C8-8AEE-AF952DA87AB5}" type="slidenum">
+              <a:rPr b="0" lang="en-US" sz="1200" strike="noStrike" u="none">
                 <a:solidFill>
                   <a:schemeClr val="dk1"/>
                 </a:solidFill>
+                <a:effectLst/>
+                <a:uFillTx/>
                 <a:latin typeface="+mn-lt"/>
                 <a:ea typeface="+mn-ea"/>
               </a:rPr>
-              <a:t>&lt;номер&gt;</a:t>
+              <a:t>&lt;number&gt;</a:t>
             </a:fld>
-            <a:endParaRPr b="0" lang="ru-RU" sz="1200" spc="-1" strike="noStrike">
-              <a:solidFill>
-                <a:srgbClr val="000000"/>
-              </a:solidFill>
+            <a:endParaRPr b="0" lang="en-US" sz="1200" strike="noStrike" u="none">
+              <a:solidFill>
+                <a:srgbClr val="000000"/>
+              </a:solidFill>
+              <a:effectLst/>
+              <a:uFillTx/>
               <a:latin typeface="Times New Roman"/>
             </a:endParaRPr>
           </a:p>
@@ -1506,7 +1592,7 @@
       </p:grpSpPr>
       <p:sp>
         <p:nvSpPr>
-          <p:cNvPr id="69" name="PlaceHolder 1"/>
+          <p:cNvPr id="71" name="PlaceHolder 1"/>
           <p:cNvSpPr>
             <a:spLocks noGrp="1"/>
           </p:cNvSpPr>
@@ -1517,19 +1603,19 @@
         <p:spPr>
           <a:xfrm>
             <a:off x="685800" y="1143000"/>
-            <a:ext cx="5485680" cy="3085560"/>
-          </a:xfrm>
-          <a:prstGeom prst="rect">
-            <a:avLst/>
-          </a:prstGeom>
-          <a:ln w="0">
-            <a:noFill/>
-          </a:ln>
-        </p:spPr>
-      </p:sp>
-      <p:sp>
-        <p:nvSpPr>
-          <p:cNvPr id="70" name="PlaceHolder 2"/>
+            <a:ext cx="5485320" cy="3085200"/>
+          </a:xfrm>
+          <a:prstGeom prst="rect">
+            <a:avLst/>
+          </a:prstGeom>
+          <a:ln w="0">
+            <a:noFill/>
+          </a:ln>
+        </p:spPr>
+      </p:sp>
+      <p:sp>
+        <p:nvSpPr>
+          <p:cNvPr id="72" name="PlaceHolder 2"/>
           <p:cNvSpPr>
             <a:spLocks noGrp="1"/>
           </p:cNvSpPr>
@@ -1540,7 +1626,7 @@
         <p:spPr>
           <a:xfrm>
             <a:off x="685800" y="4400640"/>
-            <a:ext cx="5485680" cy="3599640"/>
+            <a:ext cx="5485320" cy="3599280"/>
           </a:xfrm>
           <a:prstGeom prst="rect">
             <a:avLst/>
@@ -1555,21 +1641,23 @@
             <a:noAutofit/>
           </a:bodyPr>
           <a:p>
-            <a:pPr marL="216000" indent="-216000">
+            <a:pPr indent="0">
               <a:buNone/>
             </a:pPr>
-            <a:endParaRPr b="0" lang="ru-RU" sz="1800" spc="-1" strike="noStrike">
-              <a:solidFill>
-                <a:srgbClr val="000000"/>
-              </a:solidFill>
-              <a:latin typeface="Arial"/>
-            </a:endParaRPr>
-          </a:p>
-        </p:txBody>
-      </p:sp>
-      <p:sp>
-        <p:nvSpPr>
-          <p:cNvPr id="71" name="PlaceHolder 3"/>
+            <a:endParaRPr b="0" lang="en-US" sz="1800" strike="noStrike" u="none">
+              <a:solidFill>
+                <a:srgbClr val="000000"/>
+              </a:solidFill>
+              <a:effectLst/>
+              <a:uFillTx/>
+              <a:latin typeface="Arial"/>
+            </a:endParaRPr>
+          </a:p>
+        </p:txBody>
+      </p:sp>
+      <p:sp>
+        <p:nvSpPr>
+          <p:cNvPr id="73" name="PlaceHolder 3"/>
           <p:cNvSpPr>
             <a:spLocks noGrp="1"/>
           </p:cNvSpPr>
@@ -1580,7 +1668,7 @@
         <p:spPr>
           <a:xfrm>
             <a:off x="3884760" y="8685360"/>
-            <a:ext cx="2971080" cy="457920"/>
+            <a:ext cx="2970720" cy="457560"/>
           </a:xfrm>
           <a:prstGeom prst="rect">
             <a:avLst/>
@@ -1603,10 +1691,12 @@
               <a:tabLst>
                 <a:tab algn="l" pos="0"/>
               </a:tabLst>
-              <a:defRPr b="0" lang="en-US" sz="1200" spc="-1" strike="noStrike">
+              <a:defRPr b="0" lang="en-US" sz="1200" strike="noStrike" u="none">
                 <a:solidFill>
                   <a:schemeClr val="dk1"/>
                 </a:solidFill>
+                <a:effectLst/>
+                <a:uFillTx/>
                 <a:latin typeface="+mn-lt"/>
                 <a:ea typeface="+mn-ea"/>
               </a:defRPr>
@@ -1622,20 +1712,24 @@
                 <a:tab algn="l" pos="0"/>
               </a:tabLst>
             </a:pPr>
-            <a:fld id="{B82E0067-E9D2-4A4E-8543-6C949871AC8A}" type="slidenum">
-              <a:rPr b="0" lang="en-US" sz="1200" spc="-1" strike="noStrike">
+            <a:fld id="{F6E4B865-35C8-4996-9D2C-AA5F5F0E0A09}" type="slidenum">
+              <a:rPr b="0" lang="en-US" sz="1200" strike="noStrike" u="none">
                 <a:solidFill>
                   <a:schemeClr val="dk1"/>
                 </a:solidFill>
+                <a:effectLst/>
+                <a:uFillTx/>
                 <a:latin typeface="+mn-lt"/>
                 <a:ea typeface="+mn-ea"/>
               </a:rPr>
-              <a:t>&lt;номер&gt;</a:t>
+              <a:t>&lt;number&gt;</a:t>
             </a:fld>
-            <a:endParaRPr b="0" lang="ru-RU" sz="1200" spc="-1" strike="noStrike">
-              <a:solidFill>
-                <a:srgbClr val="000000"/>
-              </a:solidFill>
+            <a:endParaRPr b="0" lang="en-US" sz="1200" strike="noStrike" u="none">
+              <a:solidFill>
+                <a:srgbClr val="000000"/>
+              </a:solidFill>
+              <a:effectLst/>
+              <a:uFillTx/>
               <a:latin typeface="Times New Roman"/>
             </a:endParaRPr>
           </a:p>
@@ -1665,7 +1759,7 @@
       </p:grpSpPr>
       <p:sp>
         <p:nvSpPr>
-          <p:cNvPr id="72" name="PlaceHolder 1"/>
+          <p:cNvPr id="74" name="PlaceHolder 1"/>
           <p:cNvSpPr>
             <a:spLocks noGrp="1"/>
           </p:cNvSpPr>
@@ -1676,19 +1770,19 @@
         <p:spPr>
           <a:xfrm>
             <a:off x="685800" y="1143000"/>
-            <a:ext cx="5485680" cy="3085560"/>
-          </a:xfrm>
-          <a:prstGeom prst="rect">
-            <a:avLst/>
-          </a:prstGeom>
-          <a:ln w="0">
-            <a:noFill/>
-          </a:ln>
-        </p:spPr>
-      </p:sp>
-      <p:sp>
-        <p:nvSpPr>
-          <p:cNvPr id="73" name="PlaceHolder 2"/>
+            <a:ext cx="5485320" cy="3085200"/>
+          </a:xfrm>
+          <a:prstGeom prst="rect">
+            <a:avLst/>
+          </a:prstGeom>
+          <a:ln w="0">
+            <a:noFill/>
+          </a:ln>
+        </p:spPr>
+      </p:sp>
+      <p:sp>
+        <p:nvSpPr>
+          <p:cNvPr id="75" name="PlaceHolder 2"/>
           <p:cNvSpPr>
             <a:spLocks noGrp="1"/>
           </p:cNvSpPr>
@@ -1699,7 +1793,7 @@
         <p:spPr>
           <a:xfrm>
             <a:off x="685800" y="4400640"/>
-            <a:ext cx="5485680" cy="3599640"/>
+            <a:ext cx="5485320" cy="3599280"/>
           </a:xfrm>
           <a:prstGeom prst="rect">
             <a:avLst/>
@@ -1714,21 +1808,23 @@
             <a:noAutofit/>
           </a:bodyPr>
           <a:p>
-            <a:pPr marL="216000" indent="-216000">
+            <a:pPr indent="0">
               <a:buNone/>
             </a:pPr>
-            <a:endParaRPr b="0" lang="ru-RU" sz="1800" spc="-1" strike="noStrike">
-              <a:solidFill>
-                <a:srgbClr val="000000"/>
-              </a:solidFill>
-              <a:latin typeface="Arial"/>
-            </a:endParaRPr>
-          </a:p>
-        </p:txBody>
-      </p:sp>
-      <p:sp>
-        <p:nvSpPr>
-          <p:cNvPr id="74" name="PlaceHolder 3"/>
+            <a:endParaRPr b="0" lang="en-US" sz="1800" strike="noStrike" u="none">
+              <a:solidFill>
+                <a:srgbClr val="000000"/>
+              </a:solidFill>
+              <a:effectLst/>
+              <a:uFillTx/>
+              <a:latin typeface="Arial"/>
+            </a:endParaRPr>
+          </a:p>
+        </p:txBody>
+      </p:sp>
+      <p:sp>
+        <p:nvSpPr>
+          <p:cNvPr id="76" name="PlaceHolder 3"/>
           <p:cNvSpPr>
             <a:spLocks noGrp="1"/>
           </p:cNvSpPr>
@@ -1739,7 +1835,7 @@
         <p:spPr>
           <a:xfrm>
             <a:off x="3884760" y="8685360"/>
-            <a:ext cx="2971080" cy="457920"/>
+            <a:ext cx="2970720" cy="457560"/>
           </a:xfrm>
           <a:prstGeom prst="rect">
             <a:avLst/>
@@ -1762,10 +1858,12 @@
               <a:tabLst>
                 <a:tab algn="l" pos="0"/>
               </a:tabLst>
-              <a:defRPr b="0" lang="en-US" sz="1200" spc="-1" strike="noStrike">
+              <a:defRPr b="0" lang="en-US" sz="1200" strike="noStrike" u="none">
                 <a:solidFill>
                   <a:schemeClr val="dk1"/>
                 </a:solidFill>
+                <a:effectLst/>
+                <a:uFillTx/>
                 <a:latin typeface="+mn-lt"/>
                 <a:ea typeface="+mn-ea"/>
               </a:defRPr>
@@ -1781,20 +1879,24 @@
                 <a:tab algn="l" pos="0"/>
               </a:tabLst>
             </a:pPr>
-            <a:fld id="{B1CDEEC5-A4A9-4BDE-8409-532C992B6139}" type="slidenum">
-              <a:rPr b="0" lang="en-US" sz="1200" spc="-1" strike="noStrike">
+            <a:fld id="{443F9FF4-36FF-4BC6-BDD3-CEFE9E844009}" type="slidenum">
+              <a:rPr b="0" lang="en-US" sz="1200" strike="noStrike" u="none">
                 <a:solidFill>
                   <a:schemeClr val="dk1"/>
                 </a:solidFill>
+                <a:effectLst/>
+                <a:uFillTx/>
                 <a:latin typeface="+mn-lt"/>
                 <a:ea typeface="+mn-ea"/>
               </a:rPr>
-              <a:t>&lt;номер&gt;</a:t>
+              <a:t>&lt;number&gt;</a:t>
             </a:fld>
-            <a:endParaRPr b="0" lang="ru-RU" sz="1200" spc="-1" strike="noStrike">
-              <a:solidFill>
-                <a:srgbClr val="000000"/>
-              </a:solidFill>
+            <a:endParaRPr b="0" lang="en-US" sz="1200" strike="noStrike" u="none">
+              <a:solidFill>
+                <a:srgbClr val="000000"/>
+              </a:solidFill>
+              <a:effectLst/>
+              <a:uFillTx/>
               <a:latin typeface="Times New Roman"/>
             </a:endParaRPr>
           </a:p>
@@ -1824,7 +1926,7 @@
       </p:grpSpPr>
       <p:sp>
         <p:nvSpPr>
-          <p:cNvPr id="75" name="PlaceHolder 1"/>
+          <p:cNvPr id="77" name="PlaceHolder 1"/>
           <p:cNvSpPr>
             <a:spLocks noGrp="1"/>
           </p:cNvSpPr>
@@ -1835,19 +1937,19 @@
         <p:spPr>
           <a:xfrm>
             <a:off x="685800" y="1143000"/>
-            <a:ext cx="5485680" cy="3085560"/>
-          </a:xfrm>
-          <a:prstGeom prst="rect">
-            <a:avLst/>
-          </a:prstGeom>
-          <a:ln w="0">
-            <a:noFill/>
-          </a:ln>
-        </p:spPr>
-      </p:sp>
-      <p:sp>
-        <p:nvSpPr>
-          <p:cNvPr id="76" name="PlaceHolder 2"/>
+            <a:ext cx="5485320" cy="3085200"/>
+          </a:xfrm>
+          <a:prstGeom prst="rect">
+            <a:avLst/>
+          </a:prstGeom>
+          <a:ln w="0">
+            <a:noFill/>
+          </a:ln>
+        </p:spPr>
+      </p:sp>
+      <p:sp>
+        <p:nvSpPr>
+          <p:cNvPr id="78" name="PlaceHolder 2"/>
           <p:cNvSpPr>
             <a:spLocks noGrp="1"/>
           </p:cNvSpPr>
@@ -1858,7 +1960,7 @@
         <p:spPr>
           <a:xfrm>
             <a:off x="685800" y="4400640"/>
-            <a:ext cx="5485680" cy="3599640"/>
+            <a:ext cx="5485320" cy="3599280"/>
           </a:xfrm>
           <a:prstGeom prst="rect">
             <a:avLst/>
@@ -1873,21 +1975,23 @@
             <a:noAutofit/>
           </a:bodyPr>
           <a:p>
-            <a:pPr marL="216000" indent="-216000">
+            <a:pPr indent="0">
               <a:buNone/>
             </a:pPr>
-            <a:endParaRPr b="0" lang="ru-RU" sz="1800" spc="-1" strike="noStrike">
-              <a:solidFill>
-                <a:srgbClr val="000000"/>
-              </a:solidFill>
-              <a:latin typeface="Arial"/>
-            </a:endParaRPr>
-          </a:p>
-        </p:txBody>
-      </p:sp>
-      <p:sp>
-        <p:nvSpPr>
-          <p:cNvPr id="77" name="PlaceHolder 3"/>
+            <a:endParaRPr b="0" lang="en-US" sz="1800" strike="noStrike" u="none">
+              <a:solidFill>
+                <a:srgbClr val="000000"/>
+              </a:solidFill>
+              <a:effectLst/>
+              <a:uFillTx/>
+              <a:latin typeface="Arial"/>
+            </a:endParaRPr>
+          </a:p>
+        </p:txBody>
+      </p:sp>
+      <p:sp>
+        <p:nvSpPr>
+          <p:cNvPr id="79" name="PlaceHolder 3"/>
           <p:cNvSpPr>
             <a:spLocks noGrp="1"/>
           </p:cNvSpPr>
@@ -1898,7 +2002,7 @@
         <p:spPr>
           <a:xfrm>
             <a:off x="3884760" y="8685360"/>
-            <a:ext cx="2971080" cy="457920"/>
+            <a:ext cx="2970720" cy="457560"/>
           </a:xfrm>
           <a:prstGeom prst="rect">
             <a:avLst/>
@@ -1921,10 +2025,12 @@
               <a:tabLst>
                 <a:tab algn="l" pos="0"/>
               </a:tabLst>
-              <a:defRPr b="0" lang="en-US" sz="1200" spc="-1" strike="noStrike">
+              <a:defRPr b="0" lang="en-US" sz="1200" strike="noStrike" u="none">
                 <a:solidFill>
                   <a:schemeClr val="dk1"/>
                 </a:solidFill>
+                <a:effectLst/>
+                <a:uFillTx/>
                 <a:latin typeface="+mn-lt"/>
                 <a:ea typeface="+mn-ea"/>
               </a:defRPr>
@@ -1940,20 +2046,24 @@
                 <a:tab algn="l" pos="0"/>
               </a:tabLst>
             </a:pPr>
-            <a:fld id="{C5A4D919-510F-463B-8035-01A8262BD469}" type="slidenum">
-              <a:rPr b="0" lang="en-US" sz="1200" spc="-1" strike="noStrike">
+            <a:fld id="{8C542693-0494-4C80-973E-1013ADCE8DFF}" type="slidenum">
+              <a:rPr b="0" lang="en-US" sz="1200" strike="noStrike" u="none">
                 <a:solidFill>
                   <a:schemeClr val="dk1"/>
                 </a:solidFill>
+                <a:effectLst/>
+                <a:uFillTx/>
                 <a:latin typeface="+mn-lt"/>
                 <a:ea typeface="+mn-ea"/>
               </a:rPr>
-              <a:t>&lt;номер&gt;</a:t>
+              <a:t>&lt;number&gt;</a:t>
             </a:fld>
-            <a:endParaRPr b="0" lang="ru-RU" sz="1200" spc="-1" strike="noStrike">
-              <a:solidFill>
-                <a:srgbClr val="000000"/>
-              </a:solidFill>
+            <a:endParaRPr b="0" lang="en-US" sz="1200" strike="noStrike" u="none">
+              <a:solidFill>
+                <a:srgbClr val="000000"/>
+              </a:solidFill>
+              <a:effectLst/>
+              <a:uFillTx/>
               <a:latin typeface="Times New Roman"/>
             </a:endParaRPr>
           </a:p>
@@ -1983,7 +2093,7 @@
       </p:grpSpPr>
       <p:sp>
         <p:nvSpPr>
-          <p:cNvPr id="78" name="PlaceHolder 1"/>
+          <p:cNvPr id="80" name="PlaceHolder 1"/>
           <p:cNvSpPr>
             <a:spLocks noGrp="1"/>
           </p:cNvSpPr>
@@ -1994,19 +2104,19 @@
         <p:spPr>
           <a:xfrm>
             <a:off x="685800" y="1143000"/>
-            <a:ext cx="5485680" cy="3085560"/>
-          </a:xfrm>
-          <a:prstGeom prst="rect">
-            <a:avLst/>
-          </a:prstGeom>
-          <a:ln w="0">
-            <a:noFill/>
-          </a:ln>
-        </p:spPr>
-      </p:sp>
-      <p:sp>
-        <p:nvSpPr>
-          <p:cNvPr id="79" name="PlaceHolder 2"/>
+            <a:ext cx="5485320" cy="3085200"/>
+          </a:xfrm>
+          <a:prstGeom prst="rect">
+            <a:avLst/>
+          </a:prstGeom>
+          <a:ln w="0">
+            <a:noFill/>
+          </a:ln>
+        </p:spPr>
+      </p:sp>
+      <p:sp>
+        <p:nvSpPr>
+          <p:cNvPr id="81" name="PlaceHolder 2"/>
           <p:cNvSpPr>
             <a:spLocks noGrp="1"/>
           </p:cNvSpPr>
@@ -2017,7 +2127,7 @@
         <p:spPr>
           <a:xfrm>
             <a:off x="685800" y="4400640"/>
-            <a:ext cx="5485680" cy="3599640"/>
+            <a:ext cx="5485320" cy="3599280"/>
           </a:xfrm>
           <a:prstGeom prst="rect">
             <a:avLst/>
@@ -2032,21 +2142,23 @@
             <a:noAutofit/>
           </a:bodyPr>
           <a:p>
-            <a:pPr marL="216000" indent="-216000">
+            <a:pPr indent="0">
               <a:buNone/>
             </a:pPr>
-            <a:endParaRPr b="0" lang="ru-RU" sz="1800" spc="-1" strike="noStrike">
-              <a:solidFill>
-                <a:srgbClr val="000000"/>
-              </a:solidFill>
-              <a:latin typeface="Arial"/>
-            </a:endParaRPr>
-          </a:p>
-        </p:txBody>
-      </p:sp>
-      <p:sp>
-        <p:nvSpPr>
-          <p:cNvPr id="80" name="PlaceHolder 3"/>
+            <a:endParaRPr b="0" lang="en-US" sz="1800" strike="noStrike" u="none">
+              <a:solidFill>
+                <a:srgbClr val="000000"/>
+              </a:solidFill>
+              <a:effectLst/>
+              <a:uFillTx/>
+              <a:latin typeface="Arial"/>
+            </a:endParaRPr>
+          </a:p>
+        </p:txBody>
+      </p:sp>
+      <p:sp>
+        <p:nvSpPr>
+          <p:cNvPr id="82" name="PlaceHolder 3"/>
           <p:cNvSpPr>
             <a:spLocks noGrp="1"/>
           </p:cNvSpPr>
@@ -2057,7 +2169,7 @@
         <p:spPr>
           <a:xfrm>
             <a:off x="3884760" y="8685360"/>
-            <a:ext cx="2971080" cy="457920"/>
+            <a:ext cx="2970720" cy="457560"/>
           </a:xfrm>
           <a:prstGeom prst="rect">
             <a:avLst/>
@@ -2080,10 +2192,12 @@
               <a:tabLst>
                 <a:tab algn="l" pos="0"/>
               </a:tabLst>
-              <a:defRPr b="0" lang="en-US" sz="1200" spc="-1" strike="noStrike">
+              <a:defRPr b="0" lang="en-US" sz="1200" strike="noStrike" u="none">
                 <a:solidFill>
                   <a:schemeClr val="dk1"/>
                 </a:solidFill>
+                <a:effectLst/>
+                <a:uFillTx/>
                 <a:latin typeface="+mn-lt"/>
                 <a:ea typeface="+mn-ea"/>
               </a:defRPr>
@@ -2099,20 +2213,24 @@
                 <a:tab algn="l" pos="0"/>
               </a:tabLst>
             </a:pPr>
-            <a:fld id="{07BBD2B2-DAC5-49BB-88AB-F77A031B3806}" type="slidenum">
-              <a:rPr b="0" lang="en-US" sz="1200" spc="-1" strike="noStrike">
+            <a:fld id="{815891F7-0999-406E-BE31-FFDE76C63E59}" type="slidenum">
+              <a:rPr b="0" lang="en-US" sz="1200" strike="noStrike" u="none">
                 <a:solidFill>
                   <a:schemeClr val="dk1"/>
                 </a:solidFill>
+                <a:effectLst/>
+                <a:uFillTx/>
                 <a:latin typeface="+mn-lt"/>
                 <a:ea typeface="+mn-ea"/>
               </a:rPr>
-              <a:t>&lt;номер&gt;</a:t>
+              <a:t>&lt;number&gt;</a:t>
             </a:fld>
-            <a:endParaRPr b="0" lang="ru-RU" sz="1200" spc="-1" strike="noStrike">
-              <a:solidFill>
-                <a:srgbClr val="000000"/>
-              </a:solidFill>
+            <a:endParaRPr b="0" lang="en-US" sz="1200" strike="noStrike" u="none">
+              <a:solidFill>
+                <a:srgbClr val="000000"/>
+              </a:solidFill>
+              <a:effectLst/>
+              <a:uFillTx/>
               <a:latin typeface="Times New Roman"/>
             </a:endParaRPr>
           </a:p>
@@ -2126,130 +2244,6 @@
 <file path=ppt/slideLayouts/slideLayout1.xml><?xml version="1.0" encoding="utf-8"?>
 <p:sldLayout xmlns:a="http://schemas.openxmlformats.org/drawingml/2006/main" xmlns:p="http://schemas.openxmlformats.org/presentationml/2006/main" xmlns:r="http://schemas.openxmlformats.org/officeDocument/2006/relationships" xmlns:p14="http://schemas.microsoft.com/office/powerpoint/2010/main" xmlns:p15="http://schemas.microsoft.com/office/powerpoint/2012/main" xmlns:mc="http://schemas.openxmlformats.org/markup-compatibility/2006" type="title" preserve="1">
   <p:cSld name="DEFAULT">
-    <p:spTree>
-      <p:nvGrpSpPr>
-        <p:cNvPr id="1" name=""/>
-        <p:cNvGrpSpPr/>
-        <p:nvPr/>
-      </p:nvGrpSpPr>
-      <p:grpSpPr>
-        <a:xfrm>
-          <a:off x="0" y="0"/>
-          <a:ext cx="0" cy="0"/>
-          <a:chOff x="0" y="0"/>
-          <a:chExt cx="0" cy="0"/>
-        </a:xfrm>
-      </p:grpSpPr>
-      <p:sp>
-        <p:nvSpPr>
-          <p:cNvPr id="2" name="PlaceHolder 1"/>
-          <p:cNvSpPr>
-            <a:spLocks noGrp="1"/>
-          </p:cNvSpPr>
-          <p:nvPr>
-            <p:ph type="title"/>
-          </p:nvPr>
-        </p:nvSpPr>
-        <p:spPr>
-          <a:xfrm>
-            <a:off x="609480" y="221040"/>
-            <a:ext cx="10972440" cy="1250280"/>
-          </a:xfrm>
-          <a:prstGeom prst="rect">
-            <a:avLst/>
-          </a:prstGeom>
-          <a:noFill/>
-          <a:ln w="0">
-            <a:noFill/>
-          </a:ln>
-        </p:spPr>
-        <p:txBody>
-          <a:bodyPr lIns="0" rIns="0" tIns="0" bIns="0" anchor="ctr">
-            <a:noAutofit/>
-          </a:bodyPr>
-          <a:p>
-            <a:pPr indent="0" algn="ctr">
-              <a:buNone/>
-            </a:pPr>
-            <a:endParaRPr b="0" lang="ru-RU" sz="4400" spc="-1" strike="noStrike">
-              <a:solidFill>
-                <a:srgbClr val="000000"/>
-              </a:solidFill>
-              <a:latin typeface="Arial"/>
-            </a:endParaRPr>
-          </a:p>
-        </p:txBody>
-      </p:sp>
-      <p:sp>
-        <p:nvSpPr>
-          <p:cNvPr id="3" name="PlaceHolder 2"/>
-          <p:cNvSpPr>
-            <a:spLocks noGrp="1"/>
-          </p:cNvSpPr>
-          <p:nvPr>
-            <p:ph type="subTitle"/>
-          </p:nvPr>
-        </p:nvSpPr>
-        <p:spPr>
-          <a:xfrm>
-            <a:off x="609480" y="1604520"/>
-            <a:ext cx="10972440" cy="3977280"/>
-          </a:xfrm>
-          <a:prstGeom prst="rect">
-            <a:avLst/>
-          </a:prstGeom>
-          <a:noFill/>
-          <a:ln w="0">
-            <a:noFill/>
-          </a:ln>
-        </p:spPr>
-        <p:txBody>
-          <a:bodyPr lIns="0" rIns="0" tIns="0" bIns="0" anchor="ctr">
-            <a:noAutofit/>
-          </a:bodyPr>
-          <a:p>
-            <a:pPr indent="0" algn="ctr">
-              <a:buNone/>
-            </a:pPr>
-            <a:endParaRPr b="0" lang="ru-RU" sz="3200" spc="-1" strike="noStrike">
-              <a:solidFill>
-                <a:srgbClr val="000000"/>
-              </a:solidFill>
-              <a:latin typeface="Arial"/>
-            </a:endParaRPr>
-          </a:p>
-        </p:txBody>
-      </p:sp>
-    </p:spTree>
-  </p:cSld>
-</p:sldLayout>
-</file>
-
-<file path=ppt/slideLayouts/slideLayout2.xml><?xml version="1.0" encoding="utf-8"?>
-<p:sldLayout xmlns:a="http://schemas.openxmlformats.org/drawingml/2006/main" xmlns:p="http://schemas.openxmlformats.org/presentationml/2006/main" xmlns:r="http://schemas.openxmlformats.org/officeDocument/2006/relationships" xmlns:p14="http://schemas.microsoft.com/office/powerpoint/2010/main" xmlns:p15="http://schemas.microsoft.com/office/powerpoint/2012/main" xmlns:mc="http://schemas.openxmlformats.org/markup-compatibility/2006" type="blank" preserve="1">
-  <p:cSld name="DEFAULT">
-    <p:spTree>
-      <p:nvGrpSpPr>
-        <p:cNvPr id="1" name=""/>
-        <p:cNvGrpSpPr/>
-        <p:nvPr/>
-      </p:nvGrpSpPr>
-      <p:grpSpPr>
-        <a:xfrm>
-          <a:off x="0" y="0"/>
-          <a:ext cx="0" cy="0"/>
-          <a:chOff x="0" y="0"/>
-          <a:chExt cx="0" cy="0"/>
-        </a:xfrm>
-      </p:grpSpPr>
-    </p:spTree>
-  </p:cSld>
-</p:sldLayout>
-</file>
-
-<file path=ppt/slideMasters/slideMaster1.xml><?xml version="1.0" encoding="utf-8"?>
-<p:sldMaster xmlns:a="http://schemas.openxmlformats.org/drawingml/2006/main" xmlns:p="http://schemas.openxmlformats.org/presentationml/2006/main" xmlns:r="http://schemas.openxmlformats.org/officeDocument/2006/relationships" xmlns:p14="http://schemas.microsoft.com/office/powerpoint/2010/main" xmlns:p15="http://schemas.microsoft.com/office/powerpoint/2012/main" xmlns:mc="http://schemas.openxmlformats.org/markup-compatibility/2006">
-  <p:cSld>
     <p:bg>
       <p:bgPr>
         <a:solidFill>
@@ -2273,7 +2267,7 @@
       </p:grpSpPr>
       <p:sp>
         <p:nvSpPr>
-          <p:cNvPr id="0" name="PlaceHolder 1"/>
+          <p:cNvPr id="2" name="PlaceHolder 1"/>
           <p:cNvSpPr>
             <a:spLocks noGrp="1"/>
           </p:cNvSpPr>
@@ -2283,8 +2277,8 @@
         </p:nvSpPr>
         <p:spPr>
           <a:xfrm>
-            <a:off x="609480" y="273600"/>
-            <a:ext cx="10972440" cy="1144800"/>
+            <a:off x="609480" y="221040"/>
+            <a:ext cx="10972080" cy="1249920"/>
           </a:xfrm>
           <a:prstGeom prst="rect">
             <a:avLst/>
@@ -2299,39 +2293,34 @@
             <a:noAutofit/>
           </a:bodyPr>
           <a:p>
-            <a:pPr indent="0" algn="ctr">
+            <a:pPr indent="0">
               <a:buNone/>
             </a:pPr>
             <a:r>
-              <a:rPr b="0" lang="ru-RU" sz="4400" spc="-1" strike="noStrike">
-                <a:solidFill>
-                  <a:srgbClr val="000000"/>
-                </a:solidFill>
+              <a:rPr b="0" lang="en-US" sz="1800" strike="noStrike" u="none">
+                <a:solidFill>
+                  <a:srgbClr val="000000"/>
+                </a:solidFill>
+                <a:effectLst/>
+                <a:uFillTx/>
                 <a:latin typeface="Arial"/>
               </a:rPr>
-              <a:t>Для правки текста заглавия щёлкните </a:t>
+              <a:t>Click to edit the title text format</a:t>
             </a:r>
-            <a:r>
-              <a:rPr b="0" lang="ru-RU" sz="4400" spc="-1" strike="noStrike">
-                <a:solidFill>
-                  <a:srgbClr val="000000"/>
-                </a:solidFill>
-                <a:latin typeface="Arial"/>
-              </a:rPr>
-              <a:t>мышью</a:t>
-            </a:r>
-            <a:endParaRPr b="0" lang="ru-RU" sz="4400" spc="-1" strike="noStrike">
-              <a:solidFill>
-                <a:srgbClr val="000000"/>
-              </a:solidFill>
-              <a:latin typeface="Arial"/>
-            </a:endParaRPr>
-          </a:p>
-        </p:txBody>
-      </p:sp>
-      <p:sp>
-        <p:nvSpPr>
-          <p:cNvPr id="1" name="PlaceHolder 2"/>
+            <a:endParaRPr b="0" lang="en-US" sz="1800" strike="noStrike" u="none">
+              <a:solidFill>
+                <a:srgbClr val="000000"/>
+              </a:solidFill>
+              <a:effectLst/>
+              <a:uFillTx/>
+              <a:latin typeface="Arial"/>
+            </a:endParaRPr>
+          </a:p>
+        </p:txBody>
+      </p:sp>
+      <p:sp>
+        <p:nvSpPr>
+          <p:cNvPr id="3" name="PlaceHolder 2"/>
           <p:cNvSpPr>
             <a:spLocks noGrp="1"/>
           </p:cNvSpPr>
@@ -2369,18 +2358,22 @@
               <a:buChar char=""/>
             </a:pPr>
             <a:r>
-              <a:rPr b="0" lang="ru-RU" sz="3200" spc="-1" strike="noStrike">
-                <a:solidFill>
-                  <a:srgbClr val="000000"/>
-                </a:solidFill>
+              <a:rPr b="0" lang="en-US" sz="3200" strike="noStrike" u="none">
+                <a:solidFill>
+                  <a:srgbClr val="000000"/>
+                </a:solidFill>
+                <a:effectLst/>
+                <a:uFillTx/>
                 <a:latin typeface="Arial"/>
               </a:rPr>
-              <a:t>Для правки структуры щёлкните мышью</a:t>
+              <a:t>Click to edit the outline text format</a:t>
             </a:r>
-            <a:endParaRPr b="0" lang="ru-RU" sz="3200" spc="-1" strike="noStrike">
-              <a:solidFill>
-                <a:srgbClr val="000000"/>
-              </a:solidFill>
+            <a:endParaRPr b="0" lang="en-US" sz="3200" strike="noStrike" u="none">
+              <a:solidFill>
+                <a:srgbClr val="000000"/>
+              </a:solidFill>
+              <a:effectLst/>
+              <a:uFillTx/>
               <a:latin typeface="Arial"/>
             </a:endParaRPr>
           </a:p>
@@ -2397,18 +2390,22 @@
               <a:buChar char=""/>
             </a:pPr>
             <a:r>
-              <a:rPr b="0" lang="ru-RU" sz="2800" spc="-1" strike="noStrike">
-                <a:solidFill>
-                  <a:srgbClr val="000000"/>
-                </a:solidFill>
+              <a:rPr b="0" lang="en-US" sz="2800" strike="noStrike" u="none">
+                <a:solidFill>
+                  <a:srgbClr val="000000"/>
+                </a:solidFill>
+                <a:effectLst/>
+                <a:uFillTx/>
                 <a:latin typeface="Arial"/>
               </a:rPr>
-              <a:t>Второй уровень структуры</a:t>
+              <a:t>Second Outline Level</a:t>
             </a:r>
-            <a:endParaRPr b="0" lang="ru-RU" sz="2800" spc="-1" strike="noStrike">
-              <a:solidFill>
-                <a:srgbClr val="000000"/>
-              </a:solidFill>
+            <a:endParaRPr b="0" lang="en-US" sz="2800" strike="noStrike" u="none">
+              <a:solidFill>
+                <a:srgbClr val="000000"/>
+              </a:solidFill>
+              <a:effectLst/>
+              <a:uFillTx/>
               <a:latin typeface="Arial"/>
             </a:endParaRPr>
           </a:p>
@@ -2425,18 +2422,22 @@
               <a:buChar char=""/>
             </a:pPr>
             <a:r>
-              <a:rPr b="0" lang="ru-RU" sz="2400" spc="-1" strike="noStrike">
-                <a:solidFill>
-                  <a:srgbClr val="000000"/>
-                </a:solidFill>
+              <a:rPr b="0" lang="en-US" sz="2400" strike="noStrike" u="none">
+                <a:solidFill>
+                  <a:srgbClr val="000000"/>
+                </a:solidFill>
+                <a:effectLst/>
+                <a:uFillTx/>
                 <a:latin typeface="Arial"/>
               </a:rPr>
-              <a:t>Третий уровень структуры</a:t>
+              <a:t>Third Outline Level</a:t>
             </a:r>
-            <a:endParaRPr b="0" lang="ru-RU" sz="2400" spc="-1" strike="noStrike">
-              <a:solidFill>
-                <a:srgbClr val="000000"/>
-              </a:solidFill>
+            <a:endParaRPr b="0" lang="en-US" sz="2400" strike="noStrike" u="none">
+              <a:solidFill>
+                <a:srgbClr val="000000"/>
+              </a:solidFill>
+              <a:effectLst/>
+              <a:uFillTx/>
               <a:latin typeface="Arial"/>
             </a:endParaRPr>
           </a:p>
@@ -2453,18 +2454,22 @@
               <a:buChar char=""/>
             </a:pPr>
             <a:r>
-              <a:rPr b="0" lang="ru-RU" sz="2000" spc="-1" strike="noStrike">
-                <a:solidFill>
-                  <a:srgbClr val="000000"/>
-                </a:solidFill>
+              <a:rPr b="0" lang="en-US" sz="2000" strike="noStrike" u="none">
+                <a:solidFill>
+                  <a:srgbClr val="000000"/>
+                </a:solidFill>
+                <a:effectLst/>
+                <a:uFillTx/>
                 <a:latin typeface="Arial"/>
               </a:rPr>
-              <a:t>Четвёртый уровень структуры</a:t>
+              <a:t>Fourth Outline Level</a:t>
             </a:r>
-            <a:endParaRPr b="0" lang="ru-RU" sz="2000" spc="-1" strike="noStrike">
-              <a:solidFill>
-                <a:srgbClr val="000000"/>
-              </a:solidFill>
+            <a:endParaRPr b="0" lang="en-US" sz="2000" strike="noStrike" u="none">
+              <a:solidFill>
+                <a:srgbClr val="000000"/>
+              </a:solidFill>
+              <a:effectLst/>
+              <a:uFillTx/>
               <a:latin typeface="Arial"/>
             </a:endParaRPr>
           </a:p>
@@ -2481,18 +2486,22 @@
               <a:buChar char=""/>
             </a:pPr>
             <a:r>
-              <a:rPr b="0" lang="ru-RU" sz="2000" spc="-1" strike="noStrike">
-                <a:solidFill>
-                  <a:srgbClr val="000000"/>
-                </a:solidFill>
+              <a:rPr b="0" lang="en-US" sz="2000" strike="noStrike" u="none">
+                <a:solidFill>
+                  <a:srgbClr val="000000"/>
+                </a:solidFill>
+                <a:effectLst/>
+                <a:uFillTx/>
                 <a:latin typeface="Arial"/>
               </a:rPr>
-              <a:t>Пятый уровень структуры</a:t>
+              <a:t>Fifth Outline Level</a:t>
             </a:r>
-            <a:endParaRPr b="0" lang="ru-RU" sz="2000" spc="-1" strike="noStrike">
-              <a:solidFill>
-                <a:srgbClr val="000000"/>
-              </a:solidFill>
+            <a:endParaRPr b="0" lang="en-US" sz="2000" strike="noStrike" u="none">
+              <a:solidFill>
+                <a:srgbClr val="000000"/>
+              </a:solidFill>
+              <a:effectLst/>
+              <a:uFillTx/>
               <a:latin typeface="Arial"/>
             </a:endParaRPr>
           </a:p>
@@ -2509,18 +2518,22 @@
               <a:buChar char=""/>
             </a:pPr>
             <a:r>
-              <a:rPr b="0" lang="ru-RU" sz="2000" spc="-1" strike="noStrike">
-                <a:solidFill>
-                  <a:srgbClr val="000000"/>
-                </a:solidFill>
+              <a:rPr b="0" lang="en-US" sz="2000" strike="noStrike" u="none">
+                <a:solidFill>
+                  <a:srgbClr val="000000"/>
+                </a:solidFill>
+                <a:effectLst/>
+                <a:uFillTx/>
                 <a:latin typeface="Arial"/>
               </a:rPr>
-              <a:t>Шестой уровень структуры</a:t>
+              <a:t>Sixth Outline Level</a:t>
             </a:r>
-            <a:endParaRPr b="0" lang="ru-RU" sz="2000" spc="-1" strike="noStrike">
-              <a:solidFill>
-                <a:srgbClr val="000000"/>
-              </a:solidFill>
+            <a:endParaRPr b="0" lang="en-US" sz="2000" strike="noStrike" u="none">
+              <a:solidFill>
+                <a:srgbClr val="000000"/>
+              </a:solidFill>
+              <a:effectLst/>
+              <a:uFillTx/>
               <a:latin typeface="Arial"/>
             </a:endParaRPr>
           </a:p>
@@ -2537,18 +2550,22 @@
               <a:buChar char=""/>
             </a:pPr>
             <a:r>
-              <a:rPr b="0" lang="ru-RU" sz="2000" spc="-1" strike="noStrike">
-                <a:solidFill>
-                  <a:srgbClr val="000000"/>
-                </a:solidFill>
+              <a:rPr b="0" lang="en-US" sz="2000" strike="noStrike" u="none">
+                <a:solidFill>
+                  <a:srgbClr val="000000"/>
+                </a:solidFill>
+                <a:effectLst/>
+                <a:uFillTx/>
                 <a:latin typeface="Arial"/>
               </a:rPr>
-              <a:t>Седьмой уровень структуры</a:t>
+              <a:t>Seventh Outline Level</a:t>
             </a:r>
-            <a:endParaRPr b="0" lang="ru-RU" sz="2000" spc="-1" strike="noStrike">
-              <a:solidFill>
-                <a:srgbClr val="000000"/>
-              </a:solidFill>
+            <a:endParaRPr b="0" lang="en-US" sz="2000" strike="noStrike" u="none">
+              <a:solidFill>
+                <a:srgbClr val="000000"/>
+              </a:solidFill>
+              <a:effectLst/>
+              <a:uFillTx/>
               <a:latin typeface="Arial"/>
             </a:endParaRPr>
           </a:p>
@@ -2556,7 +2573,364 @@
       </p:sp>
     </p:spTree>
   </p:cSld>
-  <p:clrMap bg1="lt1" bg2="lt2" tx1="dk1" tx2="dk2" accent1="accent1" accent2="accent2" accent3="accent3" accent4="accent4" accent5="accent5" accent6="accent6" hlink="hlink" folHlink="folHlink"/>
+</p:sldLayout>
+</file>
+
+<file path=ppt/slideLayouts/slideLayout2.xml><?xml version="1.0" encoding="utf-8"?>
+<p:sldLayout xmlns:a="http://schemas.openxmlformats.org/drawingml/2006/main" xmlns:p="http://schemas.openxmlformats.org/presentationml/2006/main" xmlns:r="http://schemas.openxmlformats.org/officeDocument/2006/relationships" xmlns:p14="http://schemas.microsoft.com/office/powerpoint/2010/main" xmlns:p15="http://schemas.microsoft.com/office/powerpoint/2012/main" xmlns:mc="http://schemas.openxmlformats.org/markup-compatibility/2006" type="blank" preserve="1">
+  <p:cSld name="Default">
+    <p:bg>
+      <p:bgPr>
+        <a:solidFill>
+          <a:srgbClr val="ffffff"/>
+        </a:solidFill>
+      </p:bgPr>
+    </p:bg>
+    <p:spTree>
+      <p:nvGrpSpPr>
+        <p:cNvPr id="1" name=""/>
+        <p:cNvGrpSpPr/>
+        <p:nvPr/>
+      </p:nvGrpSpPr>
+      <p:grpSpPr>
+        <a:xfrm>
+          <a:off x="0" y="0"/>
+          <a:ext cx="0" cy="0"/>
+          <a:chOff x="0" y="0"/>
+          <a:chExt cx="0" cy="0"/>
+        </a:xfrm>
+      </p:grpSpPr>
+      <p:sp>
+        <p:nvSpPr>
+          <p:cNvPr id="4" name="PlaceHolder 1"/>
+          <p:cNvSpPr>
+            <a:spLocks noGrp="1"/>
+          </p:cNvSpPr>
+          <p:nvPr>
+            <p:ph type="title"/>
+          </p:nvPr>
+        </p:nvSpPr>
+        <p:spPr>
+          <a:xfrm>
+            <a:off x="609480" y="273600"/>
+            <a:ext cx="10972440" cy="1144800"/>
+          </a:xfrm>
+          <a:prstGeom prst="rect">
+            <a:avLst/>
+          </a:prstGeom>
+          <a:noFill/>
+          <a:ln w="0">
+            <a:noFill/>
+          </a:ln>
+        </p:spPr>
+        <p:txBody>
+          <a:bodyPr lIns="0" rIns="0" tIns="0" bIns="0" anchor="ctr">
+            <a:noAutofit/>
+          </a:bodyPr>
+          <a:p>
+            <a:pPr indent="0" algn="ctr">
+              <a:buNone/>
+            </a:pPr>
+            <a:r>
+              <a:rPr b="0" lang="en-US" sz="4400" strike="noStrike" u="none">
+                <a:solidFill>
+                  <a:srgbClr val="000000"/>
+                </a:solidFill>
+                <a:effectLst/>
+                <a:uFillTx/>
+                <a:latin typeface="Arial"/>
+              </a:rPr>
+              <a:t>Click to edit the title text format</a:t>
+            </a:r>
+            <a:endParaRPr b="0" lang="en-US" sz="4400" strike="noStrike" u="none">
+              <a:solidFill>
+                <a:srgbClr val="000000"/>
+              </a:solidFill>
+              <a:effectLst/>
+              <a:uFillTx/>
+              <a:latin typeface="Arial"/>
+            </a:endParaRPr>
+          </a:p>
+        </p:txBody>
+      </p:sp>
+      <p:sp>
+        <p:nvSpPr>
+          <p:cNvPr id="5" name="PlaceHolder 2"/>
+          <p:cNvSpPr>
+            <a:spLocks noGrp="1"/>
+          </p:cNvSpPr>
+          <p:nvPr>
+            <p:ph type="body"/>
+          </p:nvPr>
+        </p:nvSpPr>
+        <p:spPr>
+          <a:xfrm>
+            <a:off x="609480" y="1604520"/>
+            <a:ext cx="10972440" cy="3977280"/>
+          </a:xfrm>
+          <a:prstGeom prst="rect">
+            <a:avLst/>
+          </a:prstGeom>
+          <a:noFill/>
+          <a:ln w="0">
+            <a:noFill/>
+          </a:ln>
+        </p:spPr>
+        <p:txBody>
+          <a:bodyPr lIns="0" rIns="0" tIns="0" bIns="0" anchor="t">
+            <a:normAutofit/>
+          </a:bodyPr>
+          <a:p>
+            <a:pPr marL="432000" indent="-324000">
+              <a:spcBef>
+                <a:spcPts val="1417"/>
+              </a:spcBef>
+              <a:buClr>
+                <a:srgbClr val="000000"/>
+              </a:buClr>
+              <a:buSzPct val="45000"/>
+              <a:buFont typeface="Wingdings" charset="2"/>
+              <a:buChar char=""/>
+            </a:pPr>
+            <a:r>
+              <a:rPr b="0" lang="en-US" sz="3200" strike="noStrike" u="none">
+                <a:solidFill>
+                  <a:srgbClr val="000000"/>
+                </a:solidFill>
+                <a:effectLst/>
+                <a:uFillTx/>
+                <a:latin typeface="Arial"/>
+              </a:rPr>
+              <a:t>Click to edit the outline text format</a:t>
+            </a:r>
+            <a:endParaRPr b="0" lang="en-US" sz="3200" strike="noStrike" u="none">
+              <a:solidFill>
+                <a:srgbClr val="000000"/>
+              </a:solidFill>
+              <a:effectLst/>
+              <a:uFillTx/>
+              <a:latin typeface="Arial"/>
+            </a:endParaRPr>
+          </a:p>
+          <a:p>
+            <a:pPr lvl="1" marL="864000" indent="-324000">
+              <a:spcBef>
+                <a:spcPts val="1134"/>
+              </a:spcBef>
+              <a:buClr>
+                <a:srgbClr val="000000"/>
+              </a:buClr>
+              <a:buSzPct val="75000"/>
+              <a:buFont typeface="Symbol" charset="2"/>
+              <a:buChar char=""/>
+            </a:pPr>
+            <a:r>
+              <a:rPr b="0" lang="en-US" sz="2800" strike="noStrike" u="none">
+                <a:solidFill>
+                  <a:srgbClr val="000000"/>
+                </a:solidFill>
+                <a:effectLst/>
+                <a:uFillTx/>
+                <a:latin typeface="Arial"/>
+              </a:rPr>
+              <a:t>Second Outline Level</a:t>
+            </a:r>
+            <a:endParaRPr b="0" lang="en-US" sz="2800" strike="noStrike" u="none">
+              <a:solidFill>
+                <a:srgbClr val="000000"/>
+              </a:solidFill>
+              <a:effectLst/>
+              <a:uFillTx/>
+              <a:latin typeface="Arial"/>
+            </a:endParaRPr>
+          </a:p>
+          <a:p>
+            <a:pPr lvl="2" marL="1296000" indent="-288000">
+              <a:spcBef>
+                <a:spcPts val="850"/>
+              </a:spcBef>
+              <a:buClr>
+                <a:srgbClr val="000000"/>
+              </a:buClr>
+              <a:buSzPct val="45000"/>
+              <a:buFont typeface="Wingdings" charset="2"/>
+              <a:buChar char=""/>
+            </a:pPr>
+            <a:r>
+              <a:rPr b="0" lang="en-US" sz="2400" strike="noStrike" u="none">
+                <a:solidFill>
+                  <a:srgbClr val="000000"/>
+                </a:solidFill>
+                <a:effectLst/>
+                <a:uFillTx/>
+                <a:latin typeface="Arial"/>
+              </a:rPr>
+              <a:t>Third Outline Level</a:t>
+            </a:r>
+            <a:endParaRPr b="0" lang="en-US" sz="2400" strike="noStrike" u="none">
+              <a:solidFill>
+                <a:srgbClr val="000000"/>
+              </a:solidFill>
+              <a:effectLst/>
+              <a:uFillTx/>
+              <a:latin typeface="Arial"/>
+            </a:endParaRPr>
+          </a:p>
+          <a:p>
+            <a:pPr lvl="3" marL="1728000" indent="-216000">
+              <a:spcBef>
+                <a:spcPts val="567"/>
+              </a:spcBef>
+              <a:buClr>
+                <a:srgbClr val="000000"/>
+              </a:buClr>
+              <a:buSzPct val="75000"/>
+              <a:buFont typeface="Symbol" charset="2"/>
+              <a:buChar char=""/>
+            </a:pPr>
+            <a:r>
+              <a:rPr b="0" lang="en-US" sz="2000" strike="noStrike" u="none">
+                <a:solidFill>
+                  <a:srgbClr val="000000"/>
+                </a:solidFill>
+                <a:effectLst/>
+                <a:uFillTx/>
+                <a:latin typeface="Arial"/>
+              </a:rPr>
+              <a:t>Fourth Outline Level</a:t>
+            </a:r>
+            <a:endParaRPr b="0" lang="en-US" sz="2000" strike="noStrike" u="none">
+              <a:solidFill>
+                <a:srgbClr val="000000"/>
+              </a:solidFill>
+              <a:effectLst/>
+              <a:uFillTx/>
+              <a:latin typeface="Arial"/>
+            </a:endParaRPr>
+          </a:p>
+          <a:p>
+            <a:pPr lvl="4" marL="2160000" indent="-216000">
+              <a:spcBef>
+                <a:spcPts val="283"/>
+              </a:spcBef>
+              <a:buClr>
+                <a:srgbClr val="000000"/>
+              </a:buClr>
+              <a:buSzPct val="45000"/>
+              <a:buFont typeface="Wingdings" charset="2"/>
+              <a:buChar char=""/>
+            </a:pPr>
+            <a:r>
+              <a:rPr b="0" lang="en-US" sz="2000" strike="noStrike" u="none">
+                <a:solidFill>
+                  <a:srgbClr val="000000"/>
+                </a:solidFill>
+                <a:effectLst/>
+                <a:uFillTx/>
+                <a:latin typeface="Arial"/>
+              </a:rPr>
+              <a:t>Fifth Outline Level</a:t>
+            </a:r>
+            <a:endParaRPr b="0" lang="en-US" sz="2000" strike="noStrike" u="none">
+              <a:solidFill>
+                <a:srgbClr val="000000"/>
+              </a:solidFill>
+              <a:effectLst/>
+              <a:uFillTx/>
+              <a:latin typeface="Arial"/>
+            </a:endParaRPr>
+          </a:p>
+          <a:p>
+            <a:pPr lvl="5" marL="2592000" indent="-216000">
+              <a:spcBef>
+                <a:spcPts val="283"/>
+              </a:spcBef>
+              <a:buClr>
+                <a:srgbClr val="000000"/>
+              </a:buClr>
+              <a:buSzPct val="45000"/>
+              <a:buFont typeface="Wingdings" charset="2"/>
+              <a:buChar char=""/>
+            </a:pPr>
+            <a:r>
+              <a:rPr b="0" lang="en-US" sz="2000" strike="noStrike" u="none">
+                <a:solidFill>
+                  <a:srgbClr val="000000"/>
+                </a:solidFill>
+                <a:effectLst/>
+                <a:uFillTx/>
+                <a:latin typeface="Arial"/>
+              </a:rPr>
+              <a:t>Sixth Outline Level</a:t>
+            </a:r>
+            <a:endParaRPr b="0" lang="en-US" sz="2000" strike="noStrike" u="none">
+              <a:solidFill>
+                <a:srgbClr val="000000"/>
+              </a:solidFill>
+              <a:effectLst/>
+              <a:uFillTx/>
+              <a:latin typeface="Arial"/>
+            </a:endParaRPr>
+          </a:p>
+          <a:p>
+            <a:pPr lvl="6" marL="3024000" indent="-216000">
+              <a:spcBef>
+                <a:spcPts val="283"/>
+              </a:spcBef>
+              <a:buClr>
+                <a:srgbClr val="000000"/>
+              </a:buClr>
+              <a:buSzPct val="45000"/>
+              <a:buFont typeface="Wingdings" charset="2"/>
+              <a:buChar char=""/>
+            </a:pPr>
+            <a:r>
+              <a:rPr b="0" lang="en-US" sz="2000" strike="noStrike" u="none">
+                <a:solidFill>
+                  <a:srgbClr val="000000"/>
+                </a:solidFill>
+                <a:effectLst/>
+                <a:uFillTx/>
+                <a:latin typeface="Arial"/>
+              </a:rPr>
+              <a:t>Seventh Outline Level</a:t>
+            </a:r>
+            <a:endParaRPr b="0" lang="en-US" sz="2000" strike="noStrike" u="none">
+              <a:solidFill>
+                <a:srgbClr val="000000"/>
+              </a:solidFill>
+              <a:effectLst/>
+              <a:uFillTx/>
+              <a:latin typeface="Arial"/>
+            </a:endParaRPr>
+          </a:p>
+        </p:txBody>
+      </p:sp>
+    </p:spTree>
+  </p:cSld>
+</p:sldLayout>
+</file>
+
+<file path=ppt/slideMasters/slideMaster1.xml><?xml version="1.0" encoding="utf-8"?>
+<p:sldMaster xmlns:a="http://schemas.openxmlformats.org/drawingml/2006/main" xmlns:p="http://schemas.openxmlformats.org/presentationml/2006/main" xmlns:r="http://schemas.openxmlformats.org/officeDocument/2006/relationships" xmlns:p14="http://schemas.microsoft.com/office/powerpoint/2010/main" xmlns:p15="http://schemas.microsoft.com/office/powerpoint/2012/main" xmlns:mc="http://schemas.openxmlformats.org/markup-compatibility/2006">
+  <p:cSld>
+    <p:spTree>
+      <p:nvGrpSpPr>
+        <p:cNvPr id="1" name=""/>
+        <p:cNvGrpSpPr/>
+        <p:nvPr/>
+      </p:nvGrpSpPr>
+      <p:grpSpPr>
+        <a:xfrm>
+          <a:off x="0" y="0"/>
+          <a:ext cx="0" cy="0"/>
+          <a:chOff x="0" y="0"/>
+          <a:chExt cx="0" cy="0"/>
+        </a:xfrm>
+      </p:grpSpPr>
+    </p:spTree>
+  </p:cSld>
+  <p:clrMap bg1="lt1" tx1="dk1" bg2="lt2" tx2="dk2" accent1="accent1" accent2="accent2" accent3="accent3" accent4="accent4" accent5="accent5" accent6="accent6" hlink="hlink" folHlink="folHlink"/>
   <p:sldLayoutIdLst>
     <p:sldLayoutId id="2147483649" r:id="rId2"/>
     <p:sldLayoutId id="2147483650" r:id="rId3"/>
@@ -2583,7 +2957,7 @@
       </p:grpSpPr>
       <p:sp>
         <p:nvSpPr>
-          <p:cNvPr id="10" name="PlaceHolder 1"/>
+          <p:cNvPr id="12" name="PlaceHolder 1"/>
           <p:cNvSpPr>
             <a:spLocks noGrp="1"/>
           </p:cNvSpPr>
@@ -2594,7 +2968,7 @@
         <p:spPr>
           <a:xfrm>
             <a:off x="609480" y="221040"/>
-            <a:ext cx="10972440" cy="1250280"/>
+            <a:ext cx="10972080" cy="1249920"/>
           </a:xfrm>
           <a:prstGeom prst="rect">
             <a:avLst/>
@@ -2610,66 +2984,149 @@
           </a:bodyPr>
           <a:p>
             <a:pPr indent="0" algn="ctr">
+              <a:lnSpc>
+                <a:spcPct val="100000"/>
+              </a:lnSpc>
               <a:buNone/>
+              <a:tabLst>
+                <a:tab algn="l" pos="0"/>
+              </a:tabLst>
             </a:pPr>
             <a:r>
-              <a:rPr b="0" lang="ru-RU" sz="4400" spc="-1" strike="noStrike">
-                <a:solidFill>
-                  <a:srgbClr val="000000"/>
-                </a:solidFill>
+              <a:rPr b="0" lang="ru-RU" sz="4400" strike="noStrike" u="none">
+                <a:solidFill>
+                  <a:srgbClr val="000000"/>
+                </a:solidFill>
+                <a:effectLst/>
+                <a:uFillTx/>
                 <a:latin typeface="Arial"/>
               </a:rPr>
               <a:t>Проект телеграмм бота-помощника по математике</a:t>
             </a:r>
-            <a:endParaRPr b="0" lang="ru-RU" sz="4400" spc="-1" strike="noStrike">
-              <a:solidFill>
-                <a:srgbClr val="000000"/>
-              </a:solidFill>
-              <a:latin typeface="Arial"/>
-            </a:endParaRPr>
-          </a:p>
-        </p:txBody>
-      </p:sp>
-      <p:sp>
-        <p:nvSpPr>
-          <p:cNvPr id="11" name=""/>
-          <p:cNvSpPr txBox="1"/>
+            <a:endParaRPr b="0" lang="en-US" sz="4400" strike="noStrike" u="none">
+              <a:solidFill>
+                <a:srgbClr val="000000"/>
+              </a:solidFill>
+              <a:effectLst/>
+              <a:uFillTx/>
+              <a:latin typeface="Arial"/>
+            </a:endParaRPr>
+          </a:p>
+        </p:txBody>
+      </p:sp>
+      <p:sp>
+        <p:nvSpPr>
+          <p:cNvPr id="13" name=""/>
+          <p:cNvSpPr/>
           <p:nvPr/>
         </p:nvSpPr>
         <p:spPr>
           <a:xfrm>
-            <a:off x="6480000" y="3060000"/>
-            <a:ext cx="5101920" cy="2521800"/>
-          </a:xfrm>
-          <a:prstGeom prst="rect">
-            <a:avLst/>
-          </a:prstGeom>
-          <a:noFill/>
-          <a:ln w="0">
-            <a:noFill/>
-          </a:ln>
-        </p:spPr>
+            <a:off x="5486400" y="3060000"/>
+            <a:ext cx="6095160" cy="2521440"/>
+          </a:xfrm>
+          <a:prstGeom prst="rect">
+            <a:avLst/>
+          </a:prstGeom>
+          <a:noFill/>
+          <a:ln w="0">
+            <a:noFill/>
+          </a:ln>
+        </p:spPr>
+        <p:style>
+          <a:lnRef idx="0"/>
+          <a:fillRef idx="0"/>
+          <a:effectRef idx="0"/>
+          <a:fontRef idx="minor"/>
+        </p:style>
         <p:txBody>
           <a:bodyPr lIns="0" rIns="0" tIns="0" bIns="0" anchor="ctr">
             <a:noAutofit/>
           </a:bodyPr>
           <a:p>
-            <a:pPr indent="0" algn="r">
-              <a:buNone/>
+            <a:pPr algn="r">
+              <a:lnSpc>
+                <a:spcPct val="100000"/>
+              </a:lnSpc>
+              <a:tabLst>
+                <a:tab algn="l" pos="0"/>
+              </a:tabLst>
             </a:pPr>
             <a:r>
-              <a:rPr b="0" lang="ru-RU" sz="3200" spc="-1" strike="noStrike">
-                <a:solidFill>
-                  <a:srgbClr val="000000"/>
-                </a:solidFill>
+              <a:rPr b="0" lang="ru-RU" sz="3200" strike="noStrike" u="none">
+                <a:solidFill>
+                  <a:srgbClr val="000000"/>
+                </a:solidFill>
+                <a:effectLst/>
+                <a:uFillTx/>
                 <a:latin typeface="Arial"/>
               </a:rPr>
-              <a:t>Работу выполнил ученик ГБОУ школы №1363 10Е класса Самарский Илья</a:t>
+              <a:t>Работу выполнил ученики ГБОУ школы №1363 10Е класса</a:t>
             </a:r>
-            <a:endParaRPr b="0" lang="ru-RU" sz="3200" spc="-1" strike="noStrike">
-              <a:solidFill>
-                <a:srgbClr val="000000"/>
-              </a:solidFill>
+            <a:endParaRPr b="0" lang="en-US" sz="3200" strike="noStrike" u="none">
+              <a:solidFill>
+                <a:srgbClr val="000000"/>
+              </a:solidFill>
+              <a:effectLst/>
+              <a:uFillTx/>
+              <a:latin typeface="Arial"/>
+            </a:endParaRPr>
+          </a:p>
+          <a:p>
+            <a:pPr algn="r">
+              <a:lnSpc>
+                <a:spcPct val="100000"/>
+              </a:lnSpc>
+              <a:tabLst>
+                <a:tab algn="l" pos="0"/>
+              </a:tabLst>
+            </a:pPr>
+            <a:r>
+              <a:rPr b="0" lang="ru-RU" sz="3200" strike="noStrike" u="none">
+                <a:solidFill>
+                  <a:srgbClr val="000000"/>
+                </a:solidFill>
+                <a:effectLst/>
+                <a:uFillTx/>
+                <a:latin typeface="Arial"/>
+              </a:rPr>
+              <a:t>Самарский Илья</a:t>
+            </a:r>
+            <a:endParaRPr b="0" lang="en-US" sz="3200" strike="noStrike" u="none">
+              <a:solidFill>
+                <a:srgbClr val="000000"/>
+              </a:solidFill>
+              <a:effectLst/>
+              <a:uFillTx/>
+              <a:latin typeface="Arial"/>
+            </a:endParaRPr>
+          </a:p>
+          <a:p>
+            <a:pPr algn="r">
+              <a:lnSpc>
+                <a:spcPct val="100000"/>
+              </a:lnSpc>
+              <a:tabLst>
+                <a:tab algn="l" pos="0"/>
+              </a:tabLst>
+            </a:pPr>
+            <a:r>
+              <a:rPr b="0" lang="ru-RU" sz="3200" strike="noStrike" u="none">
+                <a:solidFill>
+                  <a:srgbClr val="000000"/>
+                </a:solidFill>
+                <a:effectLst/>
+                <a:uFillTx/>
+                <a:latin typeface="Arial"/>
+              </a:rPr>
+              <a:t>Минаев Константин</a:t>
+            </a:r>
+            <a:endParaRPr b="0" lang="en-US" sz="3200" strike="noStrike" u="none">
+              <a:solidFill>
+                <a:srgbClr val="000000"/>
+              </a:solidFill>
+              <a:effectLst/>
+              <a:uFillTx/>
               <a:latin typeface="Arial"/>
             </a:endParaRPr>
           </a:p>
@@ -2707,7 +3164,7 @@
       </p:grpSpPr>
       <p:pic>
         <p:nvPicPr>
-          <p:cNvPr id="46" name="Image 0" descr="preencoded.png"/>
+          <p:cNvPr id="48" name="Image 0" descr="preencoded.png"/>
           <p:cNvPicPr/>
           <p:nvPr/>
         </p:nvPicPr>
@@ -2718,11 +3175,12 @@
         <p:spPr>
           <a:xfrm>
             <a:off x="0" y="0"/>
-            <a:ext cx="12191400" cy="6857280"/>
-          </a:xfrm>
-          <a:prstGeom prst="rect">
-            <a:avLst/>
-          </a:prstGeom>
+            <a:ext cx="12191040" cy="6856920"/>
+          </a:xfrm>
+          <a:prstGeom prst="rect">
+            <a:avLst/>
+          </a:prstGeom>
+          <a:noFill/>
           <a:ln w="0">
             <a:noFill/>
           </a:ln>
@@ -2730,14 +3188,14 @@
       </p:pic>
       <p:sp>
         <p:nvSpPr>
-          <p:cNvPr id="47" name="Text 0"/>
+          <p:cNvPr id="49" name="Text 0"/>
           <p:cNvSpPr/>
           <p:nvPr/>
         </p:nvSpPr>
         <p:spPr>
           <a:xfrm>
             <a:off x="1454760" y="750240"/>
-            <a:ext cx="10140840" cy="581040"/>
+            <a:ext cx="10140480" cy="580680"/>
           </a:xfrm>
           <a:prstGeom prst="rect">
             <a:avLst/>
@@ -2767,33 +3225,37 @@
               </a:tabLst>
             </a:pPr>
             <a:r>
-              <a:rPr b="1" lang="en-US" sz="2200" spc="-1" strike="noStrike">
-                <a:solidFill>
-                  <a:srgbClr val="000000"/>
-                </a:solidFill>
+              <a:rPr b="1" lang="en-US" sz="2200" strike="noStrike" u="none">
+                <a:solidFill>
+                  <a:srgbClr val="000000"/>
+                </a:solidFill>
+                <a:effectLst/>
+                <a:uFillTx/>
                 <a:latin typeface="Calibri"/>
               </a:rPr>
               <a:t>Требования к окружению</a:t>
             </a:r>
-            <a:endParaRPr b="0" lang="ru-RU" sz="2200" spc="-1" strike="noStrike">
-              <a:solidFill>
-                <a:srgbClr val="000000"/>
-              </a:solidFill>
-              <a:latin typeface="Arial"/>
-            </a:endParaRPr>
-          </a:p>
-        </p:txBody>
-      </p:sp>
-      <p:sp>
-        <p:nvSpPr>
-          <p:cNvPr id="48" name="Text 1"/>
+            <a:endParaRPr b="0" lang="en-US" sz="2200" strike="noStrike" u="none">
+              <a:solidFill>
+                <a:srgbClr val="000000"/>
+              </a:solidFill>
+              <a:effectLst/>
+              <a:uFillTx/>
+              <a:latin typeface="Arial"/>
+            </a:endParaRPr>
+          </a:p>
+        </p:txBody>
+      </p:sp>
+      <p:sp>
+        <p:nvSpPr>
+          <p:cNvPr id="50" name="Text 1"/>
           <p:cNvSpPr/>
           <p:nvPr/>
         </p:nvSpPr>
         <p:spPr>
           <a:xfrm>
             <a:off x="1454760" y="2078280"/>
-            <a:ext cx="9974520" cy="680760"/>
+            <a:ext cx="9974160" cy="680400"/>
           </a:xfrm>
           <a:prstGeom prst="rect">
             <a:avLst/>
@@ -2823,33 +3285,37 @@
               </a:tabLst>
             </a:pPr>
             <a:r>
-              <a:rPr b="0" lang="en-US" sz="1400" spc="-1" strike="noStrike">
-                <a:solidFill>
-                  <a:srgbClr val="000000"/>
-                </a:solidFill>
+              <a:rPr b="0" lang="en-US" sz="1400" strike="noStrike" u="none">
+                <a:solidFill>
+                  <a:srgbClr val="000000"/>
+                </a:solidFill>
+                <a:effectLst/>
+                <a:uFillTx/>
                 <a:latin typeface="Calibri"/>
               </a:rPr>
               <a:t>Для корректной работы Telegram-бота требуется Python версии 3. 8 и выше. Все необходимые зависимости указаны в файле requirements. txt.</a:t>
             </a:r>
-            <a:endParaRPr b="0" lang="ru-RU" sz="1400" spc="-1" strike="noStrike">
-              <a:solidFill>
-                <a:srgbClr val="000000"/>
-              </a:solidFill>
-              <a:latin typeface="Arial"/>
-            </a:endParaRPr>
-          </a:p>
-        </p:txBody>
-      </p:sp>
-      <p:sp>
-        <p:nvSpPr>
-          <p:cNvPr id="49" name="Text 2"/>
+            <a:endParaRPr b="0" lang="en-US" sz="1400" strike="noStrike" u="none">
+              <a:solidFill>
+                <a:srgbClr val="000000"/>
+              </a:solidFill>
+              <a:effectLst/>
+              <a:uFillTx/>
+              <a:latin typeface="Arial"/>
+            </a:endParaRPr>
+          </a:p>
+        </p:txBody>
+      </p:sp>
+      <p:sp>
+        <p:nvSpPr>
+          <p:cNvPr id="51" name="Text 2"/>
           <p:cNvSpPr/>
           <p:nvPr/>
         </p:nvSpPr>
         <p:spPr>
           <a:xfrm>
             <a:off x="1454760" y="3241800"/>
-            <a:ext cx="9974520" cy="680760"/>
+            <a:ext cx="9974160" cy="680400"/>
           </a:xfrm>
           <a:prstGeom prst="rect">
             <a:avLst/>
@@ -2879,18 +3345,22 @@
               </a:tabLst>
             </a:pPr>
             <a:r>
-              <a:rPr b="0" lang="en-US" sz="1400" spc="-1" strike="noStrike">
-                <a:solidFill>
-                  <a:srgbClr val="000000"/>
-                </a:solidFill>
+              <a:rPr b="0" lang="en-US" sz="1400" strike="noStrike" u="none">
+                <a:solidFill>
+                  <a:srgbClr val="000000"/>
+                </a:solidFill>
+                <a:effectLst/>
+                <a:uFillTx/>
                 <a:latin typeface="Calibri"/>
               </a:rPr>
               <a:t>Перед запуском бота необходимо установить зависимости с помощью команды pip install -r requirements. txt, создать файл. env с токеном бота, полученным у @BotFather, и запустить бота командой python bot. py.</a:t>
             </a:r>
-            <a:endParaRPr b="0" lang="ru-RU" sz="1400" spc="-1" strike="noStrike">
-              <a:solidFill>
-                <a:srgbClr val="000000"/>
-              </a:solidFill>
+            <a:endParaRPr b="0" lang="en-US" sz="1400" strike="noStrike" u="none">
+              <a:solidFill>
+                <a:srgbClr val="000000"/>
+              </a:solidFill>
+              <a:effectLst/>
+              <a:uFillTx/>
               <a:latin typeface="Arial"/>
             </a:endParaRPr>
           </a:p>
@@ -2928,7 +3398,7 @@
       </p:grpSpPr>
       <p:pic>
         <p:nvPicPr>
-          <p:cNvPr id="50" name="Image 0" descr="preencoded.png"/>
+          <p:cNvPr id="52" name="Image 0" descr="preencoded.png"/>
           <p:cNvPicPr/>
           <p:nvPr/>
         </p:nvPicPr>
@@ -2939,11 +3409,12 @@
         <p:spPr>
           <a:xfrm>
             <a:off x="48240" y="-17640"/>
-            <a:ext cx="12191400" cy="6857280"/>
-          </a:xfrm>
-          <a:prstGeom prst="rect">
-            <a:avLst/>
-          </a:prstGeom>
+            <a:ext cx="12191040" cy="6856920"/>
+          </a:xfrm>
+          <a:prstGeom prst="rect">
+            <a:avLst/>
+          </a:prstGeom>
+          <a:noFill/>
           <a:ln w="0">
             <a:noFill/>
           </a:ln>
@@ -2951,14 +3422,14 @@
       </p:pic>
       <p:sp>
         <p:nvSpPr>
-          <p:cNvPr id="51" name="Text 0"/>
+          <p:cNvPr id="53" name="Text 0"/>
           <p:cNvSpPr/>
           <p:nvPr/>
         </p:nvSpPr>
         <p:spPr>
           <a:xfrm>
             <a:off x="1454760" y="417600"/>
-            <a:ext cx="10140840" cy="581040"/>
+            <a:ext cx="10140480" cy="580680"/>
           </a:xfrm>
           <a:prstGeom prst="rect">
             <a:avLst/>
@@ -2988,33 +3459,37 @@
               </a:tabLst>
             </a:pPr>
             <a:r>
-              <a:rPr b="1" lang="en-US" sz="2200" spc="-1" strike="noStrike">
-                <a:solidFill>
-                  <a:srgbClr val="000000"/>
-                </a:solidFill>
+              <a:rPr b="1" lang="en-US" sz="2200" strike="noStrike" u="none">
+                <a:solidFill>
+                  <a:srgbClr val="000000"/>
+                </a:solidFill>
+                <a:effectLst/>
+                <a:uFillTx/>
                 <a:latin typeface="Calibri"/>
               </a:rPr>
               <a:t>Установка и запуск бота</a:t>
             </a:r>
-            <a:endParaRPr b="0" lang="ru-RU" sz="2200" spc="-1" strike="noStrike">
-              <a:solidFill>
-                <a:srgbClr val="000000"/>
-              </a:solidFill>
-              <a:latin typeface="Arial"/>
-            </a:endParaRPr>
-          </a:p>
-        </p:txBody>
-      </p:sp>
-      <p:sp>
-        <p:nvSpPr>
-          <p:cNvPr id="52" name="Text 1"/>
+            <a:endParaRPr b="0" lang="en-US" sz="2200" strike="noStrike" u="none">
+              <a:solidFill>
+                <a:srgbClr val="000000"/>
+              </a:solidFill>
+              <a:effectLst/>
+              <a:uFillTx/>
+              <a:latin typeface="Arial"/>
+            </a:endParaRPr>
+          </a:p>
+        </p:txBody>
+      </p:sp>
+      <p:sp>
+        <p:nvSpPr>
+          <p:cNvPr id="54" name="Text 1"/>
           <p:cNvSpPr/>
           <p:nvPr/>
         </p:nvSpPr>
         <p:spPr>
           <a:xfrm>
             <a:off x="1454760" y="2160000"/>
-            <a:ext cx="4155480" cy="1179720"/>
+            <a:ext cx="4155120" cy="1179360"/>
           </a:xfrm>
           <a:prstGeom prst="rect">
             <a:avLst/>
@@ -3044,34 +3519,38 @@
               </a:tabLst>
             </a:pPr>
             <a:r>
-              <a:rPr b="0" lang="en-US" sz="1400" spc="-1" strike="noStrike">
-                <a:solidFill>
-                  <a:srgbClr val="000000"/>
-                </a:solidFill>
+              <a:rPr b="0" lang="en-US" sz="1400" strike="noStrike" u="none">
+                <a:solidFill>
+                  <a:srgbClr val="000000"/>
+                </a:solidFill>
+                <a:effectLst/>
+                <a:uFillTx/>
                 <a:latin typeface="Calibri"/>
                 <a:ea typeface="Noto Sans CJK SC"/>
               </a:rPr>
               <a:t>Для установки бота вам необходимо выполнить несколько шагов: сначала установите зависимости, используя команду `pip install -r requirements.txt`. Затем создайте файл `. env` с токеном бота, который можно получить у `@BotFather` в Telegram. После этого запустите бота, введя команду `python bot. py` в терминале, и бот будет готов к использованию.</a:t>
             </a:r>
-            <a:endParaRPr b="0" lang="ru-RU" sz="1400" spc="-1" strike="noStrike">
-              <a:solidFill>
-                <a:srgbClr val="000000"/>
-              </a:solidFill>
-              <a:latin typeface="Arial"/>
-            </a:endParaRPr>
-          </a:p>
-        </p:txBody>
-      </p:sp>
-      <p:sp>
-        <p:nvSpPr>
-          <p:cNvPr id="53" name="Text 2"/>
+            <a:endParaRPr b="0" lang="en-US" sz="1400" strike="noStrike" u="none">
+              <a:solidFill>
+                <a:srgbClr val="000000"/>
+              </a:solidFill>
+              <a:effectLst/>
+              <a:uFillTx/>
+              <a:latin typeface="Arial"/>
+            </a:endParaRPr>
+          </a:p>
+        </p:txBody>
+      </p:sp>
+      <p:sp>
+        <p:nvSpPr>
+          <p:cNvPr id="55" name="Text 2"/>
           <p:cNvSpPr/>
           <p:nvPr/>
         </p:nvSpPr>
         <p:spPr>
           <a:xfrm>
             <a:off x="6858000" y="1662480"/>
-            <a:ext cx="4155480" cy="1678320"/>
+            <a:ext cx="4155120" cy="1677960"/>
           </a:xfrm>
           <a:prstGeom prst="rect">
             <a:avLst/>
@@ -3100,10 +3579,12 @@
                 <a:tab algn="l" pos="0"/>
               </a:tabLst>
             </a:pPr>
-            <a:endParaRPr b="0" lang="ru-RU" sz="1800" spc="-1" strike="noStrike">
-              <a:solidFill>
-                <a:srgbClr val="000000"/>
-              </a:solidFill>
+            <a:endParaRPr b="0" lang="ru-RU" sz="1800" strike="noStrike" u="none">
+              <a:solidFill>
+                <a:srgbClr val="000000"/>
+              </a:solidFill>
+              <a:effectLst/>
+              <a:uFillTx/>
               <a:latin typeface="Arial"/>
             </a:endParaRPr>
           </a:p>
@@ -3141,7 +3622,7 @@
       </p:grpSpPr>
       <p:pic>
         <p:nvPicPr>
-          <p:cNvPr id="54" name="Image 0" descr="preencoded.png"/>
+          <p:cNvPr id="56" name="Image 0" descr="preencoded.png"/>
           <p:cNvPicPr/>
           <p:nvPr/>
         </p:nvPicPr>
@@ -3152,11 +3633,12 @@
         <p:spPr>
           <a:xfrm>
             <a:off x="0" y="0"/>
-            <a:ext cx="12191400" cy="6857280"/>
-          </a:xfrm>
-          <a:prstGeom prst="rect">
-            <a:avLst/>
-          </a:prstGeom>
+            <a:ext cx="12191040" cy="6856920"/>
+          </a:xfrm>
+          <a:prstGeom prst="rect">
+            <a:avLst/>
+          </a:prstGeom>
+          <a:noFill/>
           <a:ln w="0">
             <a:noFill/>
           </a:ln>
@@ -3164,14 +3646,14 @@
       </p:pic>
       <p:sp>
         <p:nvSpPr>
-          <p:cNvPr id="55" name="Text 0"/>
+          <p:cNvPr id="57" name="Text 0"/>
           <p:cNvSpPr/>
           <p:nvPr/>
         </p:nvSpPr>
         <p:spPr>
           <a:xfrm>
             <a:off x="1247040" y="2080440"/>
-            <a:ext cx="10140840" cy="780840"/>
+            <a:ext cx="10140480" cy="780480"/>
           </a:xfrm>
           <a:prstGeom prst="rect">
             <a:avLst/>
@@ -3201,33 +3683,37 @@
               </a:tabLst>
             </a:pPr>
             <a:r>
-              <a:rPr b="1" lang="en-US" sz="3200" spc="-1" strike="noStrike">
-                <a:solidFill>
-                  <a:srgbClr val="000000"/>
-                </a:solidFill>
+              <a:rPr b="1" lang="en-US" sz="3200" strike="noStrike" u="none">
+                <a:solidFill>
+                  <a:srgbClr val="000000"/>
+                </a:solidFill>
+                <a:effectLst/>
+                <a:uFillTx/>
                 <a:latin typeface="Calibri"/>
               </a:rPr>
               <a:t>Спасибо за внимание!</a:t>
             </a:r>
-            <a:endParaRPr b="0" lang="ru-RU" sz="3200" spc="-1" strike="noStrike">
-              <a:solidFill>
-                <a:srgbClr val="000000"/>
-              </a:solidFill>
-              <a:latin typeface="Arial"/>
-            </a:endParaRPr>
-          </a:p>
-        </p:txBody>
-      </p:sp>
-      <p:sp>
-        <p:nvSpPr>
-          <p:cNvPr id="56" name="Text 1"/>
+            <a:endParaRPr b="0" lang="en-US" sz="3200" strike="noStrike" u="none">
+              <a:solidFill>
+                <a:srgbClr val="000000"/>
+              </a:solidFill>
+              <a:effectLst/>
+              <a:uFillTx/>
+              <a:latin typeface="Arial"/>
+            </a:endParaRPr>
+          </a:p>
+        </p:txBody>
+      </p:sp>
+      <p:sp>
+        <p:nvSpPr>
+          <p:cNvPr id="58" name="Text 1"/>
           <p:cNvSpPr/>
           <p:nvPr/>
         </p:nvSpPr>
         <p:spPr>
           <a:xfrm>
             <a:off x="1247040" y="3324960"/>
-            <a:ext cx="9974520" cy="930240"/>
+            <a:ext cx="9974160" cy="929880"/>
           </a:xfrm>
           <a:prstGeom prst="rect">
             <a:avLst/>
@@ -3257,18 +3743,22 @@
               </a:tabLst>
             </a:pPr>
             <a:r>
-              <a:rPr b="0" lang="en-US" sz="1400" spc="-1" strike="noStrike">
-                <a:solidFill>
-                  <a:srgbClr val="000000"/>
-                </a:solidFill>
+              <a:rPr b="0" lang="en-US" sz="1400" strike="noStrike" u="none">
+                <a:solidFill>
+                  <a:srgbClr val="000000"/>
+                </a:solidFill>
+                <a:effectLst/>
+                <a:uFillTx/>
                 <a:latin typeface="Calibri"/>
               </a:rPr>
               <a:t>Спасибо за внимание. В этой презентации мы рассказали о создании Telegram-бота для решения математических задач, его основных и дополнительных функциях. Мы также осветили технические детали, структуру проекта, требования к окружению и процесс установки и запуска бота.</a:t>
             </a:r>
-            <a:endParaRPr b="0" lang="ru-RU" sz="1400" spc="-1" strike="noStrike">
-              <a:solidFill>
-                <a:srgbClr val="000000"/>
-              </a:solidFill>
+            <a:endParaRPr b="0" lang="en-US" sz="1400" strike="noStrike" u="none">
+              <a:solidFill>
+                <a:srgbClr val="000000"/>
+              </a:solidFill>
+              <a:effectLst/>
+              <a:uFillTx/>
               <a:latin typeface="Arial"/>
             </a:endParaRPr>
           </a:p>
@@ -3306,7 +3796,7 @@
       </p:grpSpPr>
       <p:pic>
         <p:nvPicPr>
-          <p:cNvPr id="12" name="Image 0" descr="preencoded.png"/>
+          <p:cNvPr id="14" name="Image 0" descr="preencoded.png"/>
           <p:cNvPicPr/>
           <p:nvPr/>
         </p:nvPicPr>
@@ -3317,11 +3807,12 @@
         <p:spPr>
           <a:xfrm>
             <a:off x="0" y="0"/>
-            <a:ext cx="12191400" cy="6857280"/>
-          </a:xfrm>
-          <a:prstGeom prst="rect">
-            <a:avLst/>
-          </a:prstGeom>
+            <a:ext cx="12191040" cy="6856920"/>
+          </a:xfrm>
+          <a:prstGeom prst="rect">
+            <a:avLst/>
+          </a:prstGeom>
+          <a:noFill/>
           <a:ln w="0">
             <a:noFill/>
           </a:ln>
@@ -3329,14 +3820,14 @@
       </p:pic>
       <p:sp>
         <p:nvSpPr>
-          <p:cNvPr id="13" name="Text 0"/>
+          <p:cNvPr id="15" name="Text 0"/>
           <p:cNvSpPr/>
           <p:nvPr/>
         </p:nvSpPr>
         <p:spPr>
           <a:xfrm>
             <a:off x="831240" y="1248840"/>
-            <a:ext cx="5984280" cy="980280"/>
+            <a:ext cx="5983920" cy="979920"/>
           </a:xfrm>
           <a:prstGeom prst="rect">
             <a:avLst/>
@@ -3366,33 +3857,37 @@
               </a:tabLst>
             </a:pPr>
             <a:r>
-              <a:rPr b="1" lang="en-US" sz="2200" spc="-1" strike="noStrike">
-                <a:solidFill>
-                  <a:srgbClr val="000000"/>
-                </a:solidFill>
+              <a:rPr b="1" lang="en-US" sz="2200" strike="noStrike" u="none">
+                <a:solidFill>
+                  <a:srgbClr val="000000"/>
+                </a:solidFill>
+                <a:effectLst/>
+                <a:uFillTx/>
                 <a:latin typeface="Calibri"/>
               </a:rPr>
               <a:t>Мы создали Telegram-бота для решения математических задач</a:t>
             </a:r>
-            <a:endParaRPr b="0" lang="ru-RU" sz="2200" spc="-1" strike="noStrike">
-              <a:solidFill>
-                <a:srgbClr val="000000"/>
-              </a:solidFill>
-              <a:latin typeface="Arial"/>
-            </a:endParaRPr>
-          </a:p>
-        </p:txBody>
-      </p:sp>
-      <p:sp>
-        <p:nvSpPr>
-          <p:cNvPr id="14" name="Text 1"/>
+            <a:endParaRPr b="0" lang="en-US" sz="2200" strike="noStrike" u="none">
+              <a:solidFill>
+                <a:srgbClr val="000000"/>
+              </a:solidFill>
+              <a:effectLst/>
+              <a:uFillTx/>
+              <a:latin typeface="Arial"/>
+            </a:endParaRPr>
+          </a:p>
+        </p:txBody>
+      </p:sp>
+      <p:sp>
+        <p:nvSpPr>
+          <p:cNvPr id="16" name="Text 1"/>
           <p:cNvSpPr/>
           <p:nvPr/>
         </p:nvSpPr>
         <p:spPr>
           <a:xfrm>
             <a:off x="831240" y="2327400"/>
-            <a:ext cx="5818320" cy="1678320"/>
+            <a:ext cx="5817960" cy="1677960"/>
           </a:xfrm>
           <a:prstGeom prst="rect">
             <a:avLst/>
@@ -3422,18 +3917,22 @@
               </a:tabLst>
             </a:pPr>
             <a:r>
-              <a:rPr b="0" lang="en-US" sz="1400" spc="-1" strike="noStrike">
-                <a:solidFill>
-                  <a:srgbClr val="000000"/>
-                </a:solidFill>
+              <a:rPr b="0" lang="en-US" sz="1400" strike="noStrike" u="none">
+                <a:solidFill>
+                  <a:srgbClr val="000000"/>
+                </a:solidFill>
+                <a:effectLst/>
+                <a:uFillTx/>
                 <a:latin typeface="Calibri"/>
               </a:rPr>
               <a:t>В этой презентации мы представим наш Telegram-бот для решения математических задач. Рассмотрим его основные функции, включая решение уравнений, построение графиков функций и калькулятор. Также обсудим дополнительные возможности, технические детали проекта, структуру и требования к окружению, а также установку и запуск бота.</a:t>
             </a:r>
-            <a:endParaRPr b="0" lang="ru-RU" sz="1400" spc="-1" strike="noStrike">
-              <a:solidFill>
-                <a:srgbClr val="000000"/>
-              </a:solidFill>
+            <a:endParaRPr b="0" lang="en-US" sz="1400" strike="noStrike" u="none">
+              <a:solidFill>
+                <a:srgbClr val="000000"/>
+              </a:solidFill>
+              <a:effectLst/>
+              <a:uFillTx/>
               <a:latin typeface="Arial"/>
             </a:endParaRPr>
           </a:p>
@@ -3471,7 +3970,7 @@
       </p:grpSpPr>
       <p:pic>
         <p:nvPicPr>
-          <p:cNvPr id="15" name="Image 0" descr="preencoded.png"/>
+          <p:cNvPr id="17" name="Image 0" descr="preencoded.png"/>
           <p:cNvPicPr/>
           <p:nvPr/>
         </p:nvPicPr>
@@ -3482,11 +3981,12 @@
         <p:spPr>
           <a:xfrm>
             <a:off x="0" y="0"/>
-            <a:ext cx="12191400" cy="6857280"/>
-          </a:xfrm>
-          <a:prstGeom prst="rect">
-            <a:avLst/>
-          </a:prstGeom>
+            <a:ext cx="12191040" cy="6856920"/>
+          </a:xfrm>
+          <a:prstGeom prst="rect">
+            <a:avLst/>
+          </a:prstGeom>
+          <a:noFill/>
           <a:ln w="0">
             <a:noFill/>
           </a:ln>
@@ -3494,14 +3994,14 @@
       </p:pic>
       <p:sp>
         <p:nvSpPr>
-          <p:cNvPr id="16" name="Text 0"/>
+          <p:cNvPr id="18" name="Text 0"/>
           <p:cNvSpPr/>
           <p:nvPr/>
         </p:nvSpPr>
         <p:spPr>
           <a:xfrm>
             <a:off x="1454760" y="750240"/>
-            <a:ext cx="10140840" cy="581040"/>
+            <a:ext cx="10140480" cy="580680"/>
           </a:xfrm>
           <a:prstGeom prst="rect">
             <a:avLst/>
@@ -3531,33 +4031,37 @@
               </a:tabLst>
             </a:pPr>
             <a:r>
-              <a:rPr b="1" lang="en-US" sz="2200" spc="-1" strike="noStrike">
-                <a:solidFill>
-                  <a:srgbClr val="000000"/>
-                </a:solidFill>
+              <a:rPr b="1" lang="en-US" sz="2200" strike="noStrike" u="none">
+                <a:solidFill>
+                  <a:srgbClr val="000000"/>
+                </a:solidFill>
+                <a:effectLst/>
+                <a:uFillTx/>
                 <a:latin typeface="Calibri"/>
               </a:rPr>
               <a:t>Основные функции бота</a:t>
             </a:r>
-            <a:endParaRPr b="0" lang="ru-RU" sz="2200" spc="-1" strike="noStrike">
-              <a:solidFill>
-                <a:srgbClr val="000000"/>
-              </a:solidFill>
-              <a:latin typeface="Arial"/>
-            </a:endParaRPr>
-          </a:p>
-        </p:txBody>
-      </p:sp>
-      <p:sp>
-        <p:nvSpPr>
-          <p:cNvPr id="17" name="Text 1"/>
+            <a:endParaRPr b="0" lang="en-US" sz="2200" strike="noStrike" u="none">
+              <a:solidFill>
+                <a:srgbClr val="000000"/>
+              </a:solidFill>
+              <a:effectLst/>
+              <a:uFillTx/>
+              <a:latin typeface="Arial"/>
+            </a:endParaRPr>
+          </a:p>
+        </p:txBody>
+      </p:sp>
+      <p:sp>
+        <p:nvSpPr>
+          <p:cNvPr id="19" name="Text 1"/>
           <p:cNvSpPr/>
           <p:nvPr/>
         </p:nvSpPr>
         <p:spPr>
           <a:xfrm>
             <a:off x="1454760" y="2078280"/>
-            <a:ext cx="9974520" cy="680760"/>
+            <a:ext cx="9974160" cy="680400"/>
           </a:xfrm>
           <a:prstGeom prst="rect">
             <a:avLst/>
@@ -3587,33 +4091,37 @@
               </a:tabLst>
             </a:pPr>
             <a:r>
-              <a:rPr b="0" lang="en-US" sz="1400" spc="-1" strike="noStrike">
-                <a:solidFill>
-                  <a:srgbClr val="000000"/>
-                </a:solidFill>
+              <a:rPr b="0" lang="en-US" sz="1400" strike="noStrike" u="none">
+                <a:solidFill>
+                  <a:srgbClr val="000000"/>
+                </a:solidFill>
+                <a:effectLst/>
+                <a:uFillTx/>
                 <a:latin typeface="Calibri"/>
               </a:rPr>
               <a:t>Наш Telegram-бот способен решать разнообразные математические задачи, включая тригонометрические и логарифмические уравнения.</a:t>
             </a:r>
-            <a:endParaRPr b="0" lang="ru-RU" sz="1400" spc="-1" strike="noStrike">
-              <a:solidFill>
-                <a:srgbClr val="000000"/>
-              </a:solidFill>
-              <a:latin typeface="Arial"/>
-            </a:endParaRPr>
-          </a:p>
-        </p:txBody>
-      </p:sp>
-      <p:sp>
-        <p:nvSpPr>
-          <p:cNvPr id="18" name="Text 2"/>
+            <a:endParaRPr b="0" lang="en-US" sz="1400" strike="noStrike" u="none">
+              <a:solidFill>
+                <a:srgbClr val="000000"/>
+              </a:solidFill>
+              <a:effectLst/>
+              <a:uFillTx/>
+              <a:latin typeface="Arial"/>
+            </a:endParaRPr>
+          </a:p>
+        </p:txBody>
+      </p:sp>
+      <p:sp>
+        <p:nvSpPr>
+          <p:cNvPr id="20" name="Text 2"/>
           <p:cNvSpPr/>
           <p:nvPr/>
         </p:nvSpPr>
         <p:spPr>
           <a:xfrm>
             <a:off x="1454760" y="3241800"/>
-            <a:ext cx="9974520" cy="930240"/>
+            <a:ext cx="9974160" cy="929880"/>
           </a:xfrm>
           <a:prstGeom prst="rect">
             <a:avLst/>
@@ -3643,18 +4151,22 @@
               </a:tabLst>
             </a:pPr>
             <a:r>
-              <a:rPr b="0" lang="en-US" sz="1400" spc="-1" strike="noStrike">
-                <a:solidFill>
-                  <a:srgbClr val="000000"/>
-                </a:solidFill>
+              <a:rPr b="0" lang="en-US" sz="1400" strike="noStrike" u="none">
+                <a:solidFill>
+                  <a:srgbClr val="000000"/>
+                </a:solidFill>
+                <a:effectLst/>
+                <a:uFillTx/>
                 <a:latin typeface="Calibri"/>
               </a:rPr>
               <a:t>Он предоставляет возможность построения графиков различных функций, таких как линейные, квадратичные и экспоненциальные, а также работает как калькулятор с поддержкой основных математических операций. Кроме того, бот показывает текущее время в разных городах мира и собирает статистику использования.</a:t>
             </a:r>
-            <a:endParaRPr b="0" lang="ru-RU" sz="1400" spc="-1" strike="noStrike">
-              <a:solidFill>
-                <a:srgbClr val="000000"/>
-              </a:solidFill>
+            <a:endParaRPr b="0" lang="en-US" sz="1400" strike="noStrike" u="none">
+              <a:solidFill>
+                <a:srgbClr val="000000"/>
+              </a:solidFill>
+              <a:effectLst/>
+              <a:uFillTx/>
               <a:latin typeface="Arial"/>
             </a:endParaRPr>
           </a:p>
@@ -3692,7 +4204,7 @@
       </p:grpSpPr>
       <p:pic>
         <p:nvPicPr>
-          <p:cNvPr id="19" name="Image 0" descr="preencoded.png"/>
+          <p:cNvPr id="21" name="Image 0" descr="preencoded.png"/>
           <p:cNvPicPr/>
           <p:nvPr/>
         </p:nvPicPr>
@@ -3703,11 +4215,12 @@
         <p:spPr>
           <a:xfrm>
             <a:off x="0" y="0"/>
-            <a:ext cx="12191400" cy="6857280"/>
-          </a:xfrm>
-          <a:prstGeom prst="rect">
-            <a:avLst/>
-          </a:prstGeom>
+            <a:ext cx="12191040" cy="6856920"/>
+          </a:xfrm>
+          <a:prstGeom prst="rect">
+            <a:avLst/>
+          </a:prstGeom>
+          <a:noFill/>
           <a:ln w="0">
             <a:noFill/>
           </a:ln>
@@ -3715,14 +4228,14 @@
       </p:pic>
       <p:sp>
         <p:nvSpPr>
-          <p:cNvPr id="20" name="Text 0"/>
+          <p:cNvPr id="22" name="Text 0"/>
           <p:cNvSpPr/>
           <p:nvPr/>
         </p:nvSpPr>
         <p:spPr>
           <a:xfrm>
             <a:off x="415800" y="833400"/>
-            <a:ext cx="10140840" cy="581040"/>
+            <a:ext cx="10140480" cy="580680"/>
           </a:xfrm>
           <a:prstGeom prst="rect">
             <a:avLst/>
@@ -3752,33 +4265,37 @@
               </a:tabLst>
             </a:pPr>
             <a:r>
-              <a:rPr b="1" lang="en-US" sz="2200" spc="-1" strike="noStrike">
-                <a:solidFill>
-                  <a:srgbClr val="000000"/>
-                </a:solidFill>
+              <a:rPr b="1" lang="en-US" sz="2200" strike="noStrike" u="none">
+                <a:solidFill>
+                  <a:srgbClr val="000000"/>
+                </a:solidFill>
+                <a:effectLst/>
+                <a:uFillTx/>
                 <a:latin typeface="Calibri"/>
               </a:rPr>
               <a:t>Решение уравнений</a:t>
             </a:r>
-            <a:endParaRPr b="0" lang="ru-RU" sz="2200" spc="-1" strike="noStrike">
-              <a:solidFill>
-                <a:srgbClr val="000000"/>
-              </a:solidFill>
-              <a:latin typeface="Arial"/>
-            </a:endParaRPr>
-          </a:p>
-        </p:txBody>
-      </p:sp>
-      <p:sp>
-        <p:nvSpPr>
-          <p:cNvPr id="21" name="Text 1"/>
+            <a:endParaRPr b="0" lang="en-US" sz="2200" strike="noStrike" u="none">
+              <a:solidFill>
+                <a:srgbClr val="000000"/>
+              </a:solidFill>
+              <a:effectLst/>
+              <a:uFillTx/>
+              <a:latin typeface="Arial"/>
+            </a:endParaRPr>
+          </a:p>
+        </p:txBody>
+      </p:sp>
+      <p:sp>
+        <p:nvSpPr>
+          <p:cNvPr id="23" name="Text 1"/>
           <p:cNvSpPr/>
           <p:nvPr/>
         </p:nvSpPr>
         <p:spPr>
           <a:xfrm>
             <a:off x="415800" y="2078280"/>
-            <a:ext cx="3324240" cy="1179720"/>
+            <a:ext cx="3323880" cy="1179360"/>
           </a:xfrm>
           <a:prstGeom prst="rect">
             <a:avLst/>
@@ -3808,33 +4325,37 @@
               </a:tabLst>
             </a:pPr>
             <a:r>
-              <a:rPr b="0" lang="en-US" sz="1400" spc="-1" strike="noStrike">
-                <a:solidFill>
-                  <a:srgbClr val="000000"/>
-                </a:solidFill>
+              <a:rPr b="0" lang="en-US" sz="1400" strike="noStrike" u="none">
+                <a:solidFill>
+                  <a:srgbClr val="000000"/>
+                </a:solidFill>
+                <a:effectLst/>
+                <a:uFillTx/>
                 <a:latin typeface="Calibri"/>
               </a:rPr>
               <a:t>Наш Telegram-бот решает уравнения любой сложности, включая тригонометрические и логарифмические.</a:t>
             </a:r>
-            <a:endParaRPr b="0" lang="ru-RU" sz="1400" spc="-1" strike="noStrike">
-              <a:solidFill>
-                <a:srgbClr val="000000"/>
-              </a:solidFill>
-              <a:latin typeface="Arial"/>
-            </a:endParaRPr>
-          </a:p>
-        </p:txBody>
-      </p:sp>
-      <p:sp>
-        <p:nvSpPr>
-          <p:cNvPr id="22" name="Text 2"/>
+            <a:endParaRPr b="0" lang="en-US" sz="1400" strike="noStrike" u="none">
+              <a:solidFill>
+                <a:srgbClr val="000000"/>
+              </a:solidFill>
+              <a:effectLst/>
+              <a:uFillTx/>
+              <a:latin typeface="Arial"/>
+            </a:endParaRPr>
+          </a:p>
+        </p:txBody>
+      </p:sp>
+      <p:sp>
+        <p:nvSpPr>
+          <p:cNvPr id="24" name="Text 2"/>
           <p:cNvSpPr/>
           <p:nvPr/>
         </p:nvSpPr>
         <p:spPr>
           <a:xfrm>
             <a:off x="4572000" y="2078280"/>
-            <a:ext cx="3324240" cy="1429200"/>
+            <a:ext cx="3323880" cy="1428840"/>
           </a:xfrm>
           <a:prstGeom prst="rect">
             <a:avLst/>
@@ -3864,33 +4385,37 @@
               </a:tabLst>
             </a:pPr>
             <a:r>
-              <a:rPr b="0" lang="en-US" sz="1400" spc="-1" strike="noStrike">
-                <a:solidFill>
-                  <a:srgbClr val="000000"/>
-                </a:solidFill>
+              <a:rPr b="0" lang="en-US" sz="1400" strike="noStrike" u="none">
+                <a:solidFill>
+                  <a:srgbClr val="000000"/>
+                </a:solidFill>
+                <a:effectLst/>
+                <a:uFillTx/>
                 <a:latin typeface="Calibri"/>
               </a:rPr>
               <a:t>Он использует библиотеку sympy для обработки математических задач и обеспечивает эффективное взаимодействие благодаря интерактивным клавиатурам.</a:t>
             </a:r>
-            <a:endParaRPr b="0" lang="ru-RU" sz="1400" spc="-1" strike="noStrike">
-              <a:solidFill>
-                <a:srgbClr val="000000"/>
-              </a:solidFill>
-              <a:latin typeface="Arial"/>
-            </a:endParaRPr>
-          </a:p>
-        </p:txBody>
-      </p:sp>
-      <p:sp>
-        <p:nvSpPr>
-          <p:cNvPr id="23" name="Text 3"/>
+            <a:endParaRPr b="0" lang="en-US" sz="1400" strike="noStrike" u="none">
+              <a:solidFill>
+                <a:srgbClr val="000000"/>
+              </a:solidFill>
+              <a:effectLst/>
+              <a:uFillTx/>
+              <a:latin typeface="Arial"/>
+            </a:endParaRPr>
+          </a:p>
+        </p:txBody>
+      </p:sp>
+      <p:sp>
+        <p:nvSpPr>
+          <p:cNvPr id="25" name="Text 3"/>
           <p:cNvSpPr/>
           <p:nvPr/>
         </p:nvSpPr>
         <p:spPr>
           <a:xfrm>
             <a:off x="8728200" y="2078280"/>
-            <a:ext cx="3324240" cy="1429200"/>
+            <a:ext cx="3323880" cy="1428840"/>
           </a:xfrm>
           <a:prstGeom prst="rect">
             <a:avLst/>
@@ -3920,18 +4445,22 @@
               </a:tabLst>
             </a:pPr>
             <a:r>
-              <a:rPr b="0" lang="en-US" sz="1400" spc="-1" strike="noStrike">
-                <a:solidFill>
-                  <a:srgbClr val="000000"/>
-                </a:solidFill>
+              <a:rPr b="0" lang="en-US" sz="1400" strike="noStrike" u="none">
+                <a:solidFill>
+                  <a:srgbClr val="000000"/>
+                </a:solidFill>
+                <a:effectLst/>
+                <a:uFillTx/>
                 <a:latin typeface="Calibri"/>
               </a:rPr>
               <a:t>Бот позволяет быстро получать решения и удобен в использовании для решения математических задач в реальном времени.</a:t>
             </a:r>
-            <a:endParaRPr b="0" lang="ru-RU" sz="1400" spc="-1" strike="noStrike">
-              <a:solidFill>
-                <a:srgbClr val="000000"/>
-              </a:solidFill>
+            <a:endParaRPr b="0" lang="en-US" sz="1400" strike="noStrike" u="none">
+              <a:solidFill>
+                <a:srgbClr val="000000"/>
+              </a:solidFill>
+              <a:effectLst/>
+              <a:uFillTx/>
               <a:latin typeface="Arial"/>
             </a:endParaRPr>
           </a:p>
@@ -3969,7 +4498,7 @@
       </p:grpSpPr>
       <p:pic>
         <p:nvPicPr>
-          <p:cNvPr id="24" name="Image 0" descr="preencoded.png"/>
+          <p:cNvPr id="26" name="Image 0" descr="preencoded.png"/>
           <p:cNvPicPr/>
           <p:nvPr/>
         </p:nvPicPr>
@@ -3980,11 +4509,12 @@
         <p:spPr>
           <a:xfrm>
             <a:off x="0" y="0"/>
-            <a:ext cx="12191400" cy="6857280"/>
-          </a:xfrm>
-          <a:prstGeom prst="rect">
-            <a:avLst/>
-          </a:prstGeom>
+            <a:ext cx="12191040" cy="6856920"/>
+          </a:xfrm>
+          <a:prstGeom prst="rect">
+            <a:avLst/>
+          </a:prstGeom>
+          <a:noFill/>
           <a:ln w="0">
             <a:noFill/>
           </a:ln>
@@ -3992,14 +4522,14 @@
       </p:pic>
       <p:sp>
         <p:nvSpPr>
-          <p:cNvPr id="25" name="Text 0"/>
+          <p:cNvPr id="27" name="Text 0"/>
           <p:cNvSpPr/>
           <p:nvPr/>
         </p:nvSpPr>
         <p:spPr>
           <a:xfrm>
             <a:off x="1454760" y="750240"/>
-            <a:ext cx="10140840" cy="581040"/>
+            <a:ext cx="10140480" cy="580680"/>
           </a:xfrm>
           <a:prstGeom prst="rect">
             <a:avLst/>
@@ -4029,33 +4559,37 @@
               </a:tabLst>
             </a:pPr>
             <a:r>
-              <a:rPr b="1" lang="en-US" sz="2200" spc="-1" strike="noStrike">
-                <a:solidFill>
-                  <a:srgbClr val="000000"/>
-                </a:solidFill>
+              <a:rPr b="1" lang="en-US" sz="2200" strike="noStrike" u="none">
+                <a:solidFill>
+                  <a:srgbClr val="000000"/>
+                </a:solidFill>
+                <a:effectLst/>
+                <a:uFillTx/>
                 <a:latin typeface="Calibri"/>
               </a:rPr>
               <a:t>Построение графиков функций</a:t>
             </a:r>
-            <a:endParaRPr b="0" lang="ru-RU" sz="2200" spc="-1" strike="noStrike">
-              <a:solidFill>
-                <a:srgbClr val="000000"/>
-              </a:solidFill>
-              <a:latin typeface="Arial"/>
-            </a:endParaRPr>
-          </a:p>
-        </p:txBody>
-      </p:sp>
-      <p:sp>
-        <p:nvSpPr>
-          <p:cNvPr id="26" name="Text 1"/>
+            <a:endParaRPr b="0" lang="en-US" sz="2200" strike="noStrike" u="none">
+              <a:solidFill>
+                <a:srgbClr val="000000"/>
+              </a:solidFill>
+              <a:effectLst/>
+              <a:uFillTx/>
+              <a:latin typeface="Arial"/>
+            </a:endParaRPr>
+          </a:p>
+        </p:txBody>
+      </p:sp>
+      <p:sp>
+        <p:nvSpPr>
+          <p:cNvPr id="28" name="Text 1"/>
           <p:cNvSpPr/>
           <p:nvPr/>
         </p:nvSpPr>
         <p:spPr>
           <a:xfrm>
             <a:off x="1454760" y="2078280"/>
-            <a:ext cx="9974520" cy="680760"/>
+            <a:ext cx="9974160" cy="680400"/>
           </a:xfrm>
           <a:prstGeom prst="rect">
             <a:avLst/>
@@ -4085,33 +4619,37 @@
               </a:tabLst>
             </a:pPr>
             <a:r>
-              <a:rPr b="0" lang="en-US" sz="1400" spc="-1" strike="noStrike">
-                <a:solidFill>
-                  <a:srgbClr val="000000"/>
-                </a:solidFill>
+              <a:rPr b="0" lang="en-US" sz="1400" strike="noStrike" u="none">
+                <a:solidFill>
+                  <a:srgbClr val="000000"/>
+                </a:solidFill>
+                <a:effectLst/>
+                <a:uFillTx/>
                 <a:latin typeface="Calibri"/>
               </a:rPr>
               <a:t>Наш Telegram-бот позволяет строить графики различных функций, включая линейные, квадратичные, тригонометрические и экспоненциальные.</a:t>
             </a:r>
-            <a:endParaRPr b="0" lang="ru-RU" sz="1400" spc="-1" strike="noStrike">
-              <a:solidFill>
-                <a:srgbClr val="000000"/>
-              </a:solidFill>
-              <a:latin typeface="Arial"/>
-            </a:endParaRPr>
-          </a:p>
-        </p:txBody>
-      </p:sp>
-      <p:sp>
-        <p:nvSpPr>
-          <p:cNvPr id="27" name="Text 2"/>
+            <a:endParaRPr b="0" lang="en-US" sz="1400" strike="noStrike" u="none">
+              <a:solidFill>
+                <a:srgbClr val="000000"/>
+              </a:solidFill>
+              <a:effectLst/>
+              <a:uFillTx/>
+              <a:latin typeface="Arial"/>
+            </a:endParaRPr>
+          </a:p>
+        </p:txBody>
+      </p:sp>
+      <p:sp>
+        <p:nvSpPr>
+          <p:cNvPr id="29" name="Text 2"/>
           <p:cNvSpPr/>
           <p:nvPr/>
         </p:nvSpPr>
         <p:spPr>
           <a:xfrm>
             <a:off x="1454760" y="3241800"/>
-            <a:ext cx="9974520" cy="930240"/>
+            <a:ext cx="9974160" cy="929880"/>
           </a:xfrm>
           <a:prstGeom prst="rect">
             <a:avLst/>
@@ -4141,18 +4679,22 @@
               </a:tabLst>
             </a:pPr>
             <a:r>
-              <a:rPr b="0" lang="en-US" sz="1400" spc="-1" strike="noStrike">
-                <a:solidFill>
-                  <a:srgbClr val="000000"/>
-                </a:solidFill>
+              <a:rPr b="0" lang="en-US" sz="1400" strike="noStrike" u="none">
+                <a:solidFill>
+                  <a:srgbClr val="000000"/>
+                </a:solidFill>
+                <a:effectLst/>
+                <a:uFillTx/>
                 <a:latin typeface="Calibri"/>
               </a:rPr>
               <a:t>Для построения графиков используется библиотека matplotlib, которая обеспечивает высокую точность и качество визуализации. Бот обладает удобным интерфейсом с интерактивными клавиатурами, что упрощает процесс ввода функций и настройку параметров графиков.</a:t>
             </a:r>
-            <a:endParaRPr b="0" lang="ru-RU" sz="1400" spc="-1" strike="noStrike">
-              <a:solidFill>
-                <a:srgbClr val="000000"/>
-              </a:solidFill>
+            <a:endParaRPr b="0" lang="en-US" sz="1400" strike="noStrike" u="none">
+              <a:solidFill>
+                <a:srgbClr val="000000"/>
+              </a:solidFill>
+              <a:effectLst/>
+              <a:uFillTx/>
               <a:latin typeface="Arial"/>
             </a:endParaRPr>
           </a:p>
@@ -4190,7 +4732,7 @@
       </p:grpSpPr>
       <p:pic>
         <p:nvPicPr>
-          <p:cNvPr id="28" name="Image 0" descr="preencoded.png"/>
+          <p:cNvPr id="30" name="Image 0" descr="preencoded.png"/>
           <p:cNvPicPr/>
           <p:nvPr/>
         </p:nvPicPr>
@@ -4201,11 +4743,12 @@
         <p:spPr>
           <a:xfrm>
             <a:off x="0" y="0"/>
-            <a:ext cx="12191400" cy="6857280"/>
-          </a:xfrm>
-          <a:prstGeom prst="rect">
-            <a:avLst/>
-          </a:prstGeom>
+            <a:ext cx="12191040" cy="6856920"/>
+          </a:xfrm>
+          <a:prstGeom prst="rect">
+            <a:avLst/>
+          </a:prstGeom>
+          <a:noFill/>
           <a:ln w="0">
             <a:noFill/>
           </a:ln>
@@ -4213,14 +4756,14 @@
       </p:pic>
       <p:sp>
         <p:nvSpPr>
-          <p:cNvPr id="29" name="Text 0"/>
+          <p:cNvPr id="31" name="Text 0"/>
           <p:cNvSpPr/>
           <p:nvPr/>
         </p:nvSpPr>
         <p:spPr>
           <a:xfrm>
             <a:off x="415800" y="833400"/>
-            <a:ext cx="10140840" cy="581040"/>
+            <a:ext cx="10140480" cy="580680"/>
           </a:xfrm>
           <a:prstGeom prst="rect">
             <a:avLst/>
@@ -4250,33 +4793,37 @@
               </a:tabLst>
             </a:pPr>
             <a:r>
-              <a:rPr b="1" lang="en-US" sz="2200" spc="-1" strike="noStrike">
-                <a:solidFill>
-                  <a:srgbClr val="000000"/>
-                </a:solidFill>
+              <a:rPr b="1" lang="en-US" sz="2200" strike="noStrike" u="none">
+                <a:solidFill>
+                  <a:srgbClr val="000000"/>
+                </a:solidFill>
+                <a:effectLst/>
+                <a:uFillTx/>
                 <a:latin typeface="Calibri"/>
               </a:rPr>
               <a:t>Калькулятор</a:t>
             </a:r>
-            <a:endParaRPr b="0" lang="ru-RU" sz="2200" spc="-1" strike="noStrike">
-              <a:solidFill>
-                <a:srgbClr val="000000"/>
-              </a:solidFill>
-              <a:latin typeface="Arial"/>
-            </a:endParaRPr>
-          </a:p>
-        </p:txBody>
-      </p:sp>
-      <p:sp>
-        <p:nvSpPr>
-          <p:cNvPr id="30" name="Text 1"/>
+            <a:endParaRPr b="0" lang="en-US" sz="2200" strike="noStrike" u="none">
+              <a:solidFill>
+                <a:srgbClr val="000000"/>
+              </a:solidFill>
+              <a:effectLst/>
+              <a:uFillTx/>
+              <a:latin typeface="Arial"/>
+            </a:endParaRPr>
+          </a:p>
+        </p:txBody>
+      </p:sp>
+      <p:sp>
+        <p:nvSpPr>
+          <p:cNvPr id="32" name="Text 1"/>
           <p:cNvSpPr/>
           <p:nvPr/>
         </p:nvSpPr>
         <p:spPr>
           <a:xfrm>
             <a:off x="415800" y="2078280"/>
-            <a:ext cx="3324240" cy="1429200"/>
+            <a:ext cx="3323880" cy="1428840"/>
           </a:xfrm>
           <a:prstGeom prst="rect">
             <a:avLst/>
@@ -4306,33 +4853,37 @@
               </a:tabLst>
             </a:pPr>
             <a:r>
-              <a:rPr b="0" lang="en-US" sz="1400" spc="-1" strike="noStrike">
-                <a:solidFill>
-                  <a:srgbClr val="000000"/>
-                </a:solidFill>
+              <a:rPr b="0" lang="en-US" sz="1400" strike="noStrike" u="none">
+                <a:solidFill>
+                  <a:srgbClr val="000000"/>
+                </a:solidFill>
+                <a:effectLst/>
+                <a:uFillTx/>
                 <a:latin typeface="Calibri"/>
               </a:rPr>
               <a:t>Наш Telegram-бот предоставляет удобный инструмент для решения математических задач, включая уравнения любой сложности и построение графиков функций.</a:t>
             </a:r>
-            <a:endParaRPr b="0" lang="ru-RU" sz="1400" spc="-1" strike="noStrike">
-              <a:solidFill>
-                <a:srgbClr val="000000"/>
-              </a:solidFill>
-              <a:latin typeface="Arial"/>
-            </a:endParaRPr>
-          </a:p>
-        </p:txBody>
-      </p:sp>
-      <p:sp>
-        <p:nvSpPr>
-          <p:cNvPr id="31" name="Text 2"/>
+            <a:endParaRPr b="0" lang="en-US" sz="1400" strike="noStrike" u="none">
+              <a:solidFill>
+                <a:srgbClr val="000000"/>
+              </a:solidFill>
+              <a:effectLst/>
+              <a:uFillTx/>
+              <a:latin typeface="Arial"/>
+            </a:endParaRPr>
+          </a:p>
+        </p:txBody>
+      </p:sp>
+      <p:sp>
+        <p:nvSpPr>
+          <p:cNvPr id="33" name="Text 2"/>
           <p:cNvSpPr/>
           <p:nvPr/>
         </p:nvSpPr>
         <p:spPr>
           <a:xfrm>
             <a:off x="4572000" y="2078280"/>
-            <a:ext cx="3324240" cy="1179720"/>
+            <a:ext cx="3323880" cy="1179360"/>
           </a:xfrm>
           <a:prstGeom prst="rect">
             <a:avLst/>
@@ -4362,33 +4913,37 @@
               </a:tabLst>
             </a:pPr>
             <a:r>
-              <a:rPr b="0" lang="en-US" sz="1400" spc="-1" strike="noStrike">
-                <a:solidFill>
-                  <a:srgbClr val="000000"/>
-                </a:solidFill>
+              <a:rPr b="0" lang="en-US" sz="1400" strike="noStrike" u="none">
+                <a:solidFill>
+                  <a:srgbClr val="000000"/>
+                </a:solidFill>
+                <a:effectLst/>
+                <a:uFillTx/>
                 <a:latin typeface="Calibri"/>
               </a:rPr>
               <a:t>Благодаря интерактивным клавиатурам взаимодействие с ботом становится интуитивно понятным и комфортным.</a:t>
             </a:r>
-            <a:endParaRPr b="0" lang="ru-RU" sz="1400" spc="-1" strike="noStrike">
-              <a:solidFill>
-                <a:srgbClr val="000000"/>
-              </a:solidFill>
-              <a:latin typeface="Arial"/>
-            </a:endParaRPr>
-          </a:p>
-        </p:txBody>
-      </p:sp>
-      <p:sp>
-        <p:nvSpPr>
-          <p:cNvPr id="32" name="Text 3"/>
+            <a:endParaRPr b="0" lang="en-US" sz="1400" strike="noStrike" u="none">
+              <a:solidFill>
+                <a:srgbClr val="000000"/>
+              </a:solidFill>
+              <a:effectLst/>
+              <a:uFillTx/>
+              <a:latin typeface="Arial"/>
+            </a:endParaRPr>
+          </a:p>
+        </p:txBody>
+      </p:sp>
+      <p:sp>
+        <p:nvSpPr>
+          <p:cNvPr id="34" name="Text 3"/>
           <p:cNvSpPr/>
           <p:nvPr/>
         </p:nvSpPr>
         <p:spPr>
           <a:xfrm>
             <a:off x="8728200" y="2078280"/>
-            <a:ext cx="3324240" cy="1678320"/>
+            <a:ext cx="3323880" cy="1677960"/>
           </a:xfrm>
           <a:prstGeom prst="rect">
             <a:avLst/>
@@ -4418,18 +4973,22 @@
               </a:tabLst>
             </a:pPr>
             <a:r>
-              <a:rPr b="0" lang="en-US" sz="1400" spc="-1" strike="noStrike">
-                <a:solidFill>
-                  <a:srgbClr val="000000"/>
-                </a:solidFill>
+              <a:rPr b="0" lang="en-US" sz="1400" strike="noStrike" u="none">
+                <a:solidFill>
+                  <a:srgbClr val="000000"/>
+                </a:solidFill>
+                <a:effectLst/>
+                <a:uFillTx/>
                 <a:latin typeface="Calibri"/>
               </a:rPr>
               <a:t>Вы можете использовать его как калькулятор для вычислений с поддержкой основных математических функций, а также узнавать текущее время в разных городах мира.</a:t>
             </a:r>
-            <a:endParaRPr b="0" lang="ru-RU" sz="1400" spc="-1" strike="noStrike">
-              <a:solidFill>
-                <a:srgbClr val="000000"/>
-              </a:solidFill>
+            <a:endParaRPr b="0" lang="en-US" sz="1400" strike="noStrike" u="none">
+              <a:solidFill>
+                <a:srgbClr val="000000"/>
+              </a:solidFill>
+              <a:effectLst/>
+              <a:uFillTx/>
               <a:latin typeface="Arial"/>
             </a:endParaRPr>
           </a:p>
@@ -4467,7 +5026,7 @@
       </p:grpSpPr>
       <p:pic>
         <p:nvPicPr>
-          <p:cNvPr id="33" name="Image 0" descr="preencoded.png"/>
+          <p:cNvPr id="35" name="Image 0" descr="preencoded.png"/>
           <p:cNvPicPr/>
           <p:nvPr/>
         </p:nvPicPr>
@@ -4478,11 +5037,12 @@
         <p:spPr>
           <a:xfrm>
             <a:off x="0" y="0"/>
-            <a:ext cx="12191400" cy="6857280"/>
-          </a:xfrm>
-          <a:prstGeom prst="rect">
-            <a:avLst/>
-          </a:prstGeom>
+            <a:ext cx="12191040" cy="6856920"/>
+          </a:xfrm>
+          <a:prstGeom prst="rect">
+            <a:avLst/>
+          </a:prstGeom>
+          <a:noFill/>
           <a:ln w="0">
             <a:noFill/>
           </a:ln>
@@ -4490,14 +5050,14 @@
       </p:pic>
       <p:sp>
         <p:nvSpPr>
-          <p:cNvPr id="34" name="Text 0"/>
+          <p:cNvPr id="36" name="Text 0"/>
           <p:cNvSpPr/>
           <p:nvPr/>
         </p:nvSpPr>
         <p:spPr>
           <a:xfrm>
             <a:off x="1454760" y="417600"/>
-            <a:ext cx="10140840" cy="581040"/>
+            <a:ext cx="10140480" cy="580680"/>
           </a:xfrm>
           <a:prstGeom prst="rect">
             <a:avLst/>
@@ -4527,33 +5087,37 @@
               </a:tabLst>
             </a:pPr>
             <a:r>
-              <a:rPr b="1" lang="en-US" sz="2200" spc="-1" strike="noStrike">
-                <a:solidFill>
-                  <a:srgbClr val="000000"/>
-                </a:solidFill>
+              <a:rPr b="1" lang="en-US" sz="2200" strike="noStrike" u="none">
+                <a:solidFill>
+                  <a:srgbClr val="000000"/>
+                </a:solidFill>
+                <a:effectLst/>
+                <a:uFillTx/>
                 <a:latin typeface="Calibri"/>
               </a:rPr>
               <a:t>Дополнительные функции</a:t>
             </a:r>
-            <a:endParaRPr b="0" lang="ru-RU" sz="2200" spc="-1" strike="noStrike">
-              <a:solidFill>
-                <a:srgbClr val="000000"/>
-              </a:solidFill>
-              <a:latin typeface="Arial"/>
-            </a:endParaRPr>
-          </a:p>
-        </p:txBody>
-      </p:sp>
-      <p:sp>
-        <p:nvSpPr>
-          <p:cNvPr id="35" name="Text 1"/>
+            <a:endParaRPr b="0" lang="en-US" sz="2200" strike="noStrike" u="none">
+              <a:solidFill>
+                <a:srgbClr val="000000"/>
+              </a:solidFill>
+              <a:effectLst/>
+              <a:uFillTx/>
+              <a:latin typeface="Arial"/>
+            </a:endParaRPr>
+          </a:p>
+        </p:txBody>
+      </p:sp>
+      <p:sp>
+        <p:nvSpPr>
+          <p:cNvPr id="37" name="Text 1"/>
           <p:cNvSpPr/>
           <p:nvPr/>
         </p:nvSpPr>
         <p:spPr>
           <a:xfrm>
             <a:off x="1454760" y="1662480"/>
-            <a:ext cx="4155480" cy="1927800"/>
+            <a:ext cx="4155120" cy="1927440"/>
           </a:xfrm>
           <a:prstGeom prst="rect">
             <a:avLst/>
@@ -4583,33 +5147,37 @@
               </a:tabLst>
             </a:pPr>
             <a:r>
-              <a:rPr b="0" lang="en-US" sz="1400" spc="-1" strike="noStrike">
-                <a:solidFill>
-                  <a:srgbClr val="000000"/>
-                </a:solidFill>
+              <a:rPr b="0" lang="en-US" sz="1400" strike="noStrike" u="none">
+                <a:solidFill>
+                  <a:srgbClr val="000000"/>
+                </a:solidFill>
+                <a:effectLst/>
+                <a:uFillTx/>
                 <a:latin typeface="Calibri"/>
               </a:rPr>
               <a:t>Помимо основных функций, наш Telegram-бот предлагает возможность просмотра текущего времени в различных городах мира. Это делает его не только мощным инструментом для решения математических задач, но и удобным помощником в повседневной жизни.</a:t>
             </a:r>
-            <a:endParaRPr b="0" lang="ru-RU" sz="1400" spc="-1" strike="noStrike">
-              <a:solidFill>
-                <a:srgbClr val="000000"/>
-              </a:solidFill>
-              <a:latin typeface="Arial"/>
-            </a:endParaRPr>
-          </a:p>
-        </p:txBody>
-      </p:sp>
-      <p:sp>
-        <p:nvSpPr>
-          <p:cNvPr id="36" name="Text 2"/>
+            <a:endParaRPr b="0" lang="en-US" sz="1400" strike="noStrike" u="none">
+              <a:solidFill>
+                <a:srgbClr val="000000"/>
+              </a:solidFill>
+              <a:effectLst/>
+              <a:uFillTx/>
+              <a:latin typeface="Arial"/>
+            </a:endParaRPr>
+          </a:p>
+        </p:txBody>
+      </p:sp>
+      <p:sp>
+        <p:nvSpPr>
+          <p:cNvPr id="38" name="Text 2"/>
           <p:cNvSpPr/>
           <p:nvPr/>
         </p:nvSpPr>
         <p:spPr>
           <a:xfrm>
             <a:off x="6858000" y="1662480"/>
-            <a:ext cx="4155480" cy="1179720"/>
+            <a:ext cx="4155120" cy="1179360"/>
           </a:xfrm>
           <a:prstGeom prst="rect">
             <a:avLst/>
@@ -4639,18 +5207,22 @@
               </a:tabLst>
             </a:pPr>
             <a:r>
-              <a:rPr b="0" lang="en-US" sz="1400" spc="-1" strike="noStrike">
-                <a:solidFill>
-                  <a:srgbClr val="000000"/>
-                </a:solidFill>
+              <a:rPr b="0" lang="en-US" sz="1400" strike="noStrike" u="none">
+                <a:solidFill>
+                  <a:srgbClr val="000000"/>
+                </a:solidFill>
+                <a:effectLst/>
+                <a:uFillTx/>
                 <a:latin typeface="Calibri"/>
               </a:rPr>
               <a:t>Кроме того, бот собирает статистику использования, что позволяет оценить его популярность и выявить возможные улучшения.</a:t>
             </a:r>
-            <a:endParaRPr b="0" lang="ru-RU" sz="1400" spc="-1" strike="noStrike">
-              <a:solidFill>
-                <a:srgbClr val="000000"/>
-              </a:solidFill>
+            <a:endParaRPr b="0" lang="en-US" sz="1400" strike="noStrike" u="none">
+              <a:solidFill>
+                <a:srgbClr val="000000"/>
+              </a:solidFill>
+              <a:effectLst/>
+              <a:uFillTx/>
               <a:latin typeface="Arial"/>
             </a:endParaRPr>
           </a:p>
@@ -4688,7 +5260,7 @@
       </p:grpSpPr>
       <p:pic>
         <p:nvPicPr>
-          <p:cNvPr id="37" name="Image 0" descr="preencoded.png"/>
+          <p:cNvPr id="39" name="Image 0" descr="preencoded.png"/>
           <p:cNvPicPr/>
           <p:nvPr/>
         </p:nvPicPr>
@@ -4699,11 +5271,12 @@
         <p:spPr>
           <a:xfrm>
             <a:off x="0" y="0"/>
-            <a:ext cx="12191400" cy="6857280"/>
-          </a:xfrm>
-          <a:prstGeom prst="rect">
-            <a:avLst/>
-          </a:prstGeom>
+            <a:ext cx="12191040" cy="6856920"/>
+          </a:xfrm>
+          <a:prstGeom prst="rect">
+            <a:avLst/>
+          </a:prstGeom>
+          <a:noFill/>
           <a:ln w="0">
             <a:noFill/>
           </a:ln>
@@ -4711,14 +5284,14 @@
       </p:pic>
       <p:sp>
         <p:nvSpPr>
-          <p:cNvPr id="38" name="Text 0"/>
+          <p:cNvPr id="40" name="Text 0"/>
           <p:cNvSpPr/>
           <p:nvPr/>
         </p:nvSpPr>
         <p:spPr>
           <a:xfrm>
             <a:off x="1454760" y="417600"/>
-            <a:ext cx="10140840" cy="581040"/>
+            <a:ext cx="10140480" cy="580680"/>
           </a:xfrm>
           <a:prstGeom prst="rect">
             <a:avLst/>
@@ -4748,33 +5321,37 @@
               </a:tabLst>
             </a:pPr>
             <a:r>
-              <a:rPr b="1" lang="en-US" sz="2200" spc="-1" strike="noStrike">
-                <a:solidFill>
-                  <a:srgbClr val="000000"/>
-                </a:solidFill>
+              <a:rPr b="1" lang="en-US" sz="2200" strike="noStrike" u="none">
+                <a:solidFill>
+                  <a:srgbClr val="000000"/>
+                </a:solidFill>
+                <a:effectLst/>
+                <a:uFillTx/>
                 <a:latin typeface="Calibri"/>
               </a:rPr>
               <a:t>Технические детали</a:t>
             </a:r>
-            <a:endParaRPr b="0" lang="ru-RU" sz="2200" spc="-1" strike="noStrike">
-              <a:solidFill>
-                <a:srgbClr val="000000"/>
-              </a:solidFill>
-              <a:latin typeface="Arial"/>
-            </a:endParaRPr>
-          </a:p>
-        </p:txBody>
-      </p:sp>
-      <p:sp>
-        <p:nvSpPr>
-          <p:cNvPr id="39" name="Text 1"/>
+            <a:endParaRPr b="0" lang="en-US" sz="2200" strike="noStrike" u="none">
+              <a:solidFill>
+                <a:srgbClr val="000000"/>
+              </a:solidFill>
+              <a:effectLst/>
+              <a:uFillTx/>
+              <a:latin typeface="Arial"/>
+            </a:endParaRPr>
+          </a:p>
+        </p:txBody>
+      </p:sp>
+      <p:sp>
+        <p:nvSpPr>
+          <p:cNvPr id="41" name="Text 1"/>
           <p:cNvSpPr/>
           <p:nvPr/>
         </p:nvSpPr>
         <p:spPr>
           <a:xfrm>
             <a:off x="1454760" y="1662480"/>
-            <a:ext cx="6649560" cy="930240"/>
+            <a:ext cx="6649200" cy="929880"/>
           </a:xfrm>
           <a:prstGeom prst="rect">
             <a:avLst/>
@@ -4804,33 +5381,37 @@
               </a:tabLst>
             </a:pPr>
             <a:r>
-              <a:rPr b="0" lang="en-US" sz="1400" spc="-1" strike="noStrike">
-                <a:solidFill>
-                  <a:srgbClr val="000000"/>
-                </a:solidFill>
+              <a:rPr b="0" lang="en-US" sz="1400" strike="noStrike" u="none">
+                <a:solidFill>
+                  <a:srgbClr val="000000"/>
+                </a:solidFill>
+                <a:effectLst/>
+                <a:uFillTx/>
                 <a:latin typeface="Calibri"/>
               </a:rPr>
               <a:t>Наш Telegram-бот для решения математических задач написан на языке программирования Python с использованием библиотеки python-telegram-bot для взаимодействия с Telegram API.</a:t>
             </a:r>
-            <a:endParaRPr b="0" lang="ru-RU" sz="1400" spc="-1" strike="noStrike">
-              <a:solidFill>
-                <a:srgbClr val="000000"/>
-              </a:solidFill>
-              <a:latin typeface="Arial"/>
-            </a:endParaRPr>
-          </a:p>
-        </p:txBody>
-      </p:sp>
-      <p:sp>
-        <p:nvSpPr>
-          <p:cNvPr id="40" name="Text 2"/>
+            <a:endParaRPr b="0" lang="en-US" sz="1400" strike="noStrike" u="none">
+              <a:solidFill>
+                <a:srgbClr val="000000"/>
+              </a:solidFill>
+              <a:effectLst/>
+              <a:uFillTx/>
+              <a:latin typeface="Arial"/>
+            </a:endParaRPr>
+          </a:p>
+        </p:txBody>
+      </p:sp>
+      <p:sp>
+        <p:nvSpPr>
+          <p:cNvPr id="42" name="Text 2"/>
           <p:cNvSpPr/>
           <p:nvPr/>
         </p:nvSpPr>
         <p:spPr>
           <a:xfrm>
             <a:off x="1454760" y="2909520"/>
-            <a:ext cx="6649560" cy="930240"/>
+            <a:ext cx="6649200" cy="929880"/>
           </a:xfrm>
           <a:prstGeom prst="rect">
             <a:avLst/>
@@ -4860,33 +5441,37 @@
               </a:tabLst>
             </a:pPr>
             <a:r>
-              <a:rPr b="0" lang="en-US" sz="1400" spc="-1" strike="noStrike">
-                <a:solidFill>
-                  <a:srgbClr val="000000"/>
-                </a:solidFill>
+              <a:rPr b="0" lang="en-US" sz="1400" strike="noStrike" u="none">
+                <a:solidFill>
+                  <a:srgbClr val="000000"/>
+                </a:solidFill>
+                <a:effectLst/>
+                <a:uFillTx/>
                 <a:latin typeface="Calibri"/>
               </a:rPr>
               <a:t>Для реализации функций бота применяются библиотеки sympy для решения уравнений, matplotlib для построения графиков и numpy для вычислений.</a:t>
             </a:r>
-            <a:endParaRPr b="0" lang="ru-RU" sz="1400" spc="-1" strike="noStrike">
-              <a:solidFill>
-                <a:srgbClr val="000000"/>
-              </a:solidFill>
-              <a:latin typeface="Arial"/>
-            </a:endParaRPr>
-          </a:p>
-        </p:txBody>
-      </p:sp>
-      <p:sp>
-        <p:nvSpPr>
-          <p:cNvPr id="41" name="Text 3"/>
+            <a:endParaRPr b="0" lang="en-US" sz="1400" strike="noStrike" u="none">
+              <a:solidFill>
+                <a:srgbClr val="000000"/>
+              </a:solidFill>
+              <a:effectLst/>
+              <a:uFillTx/>
+              <a:latin typeface="Arial"/>
+            </a:endParaRPr>
+          </a:p>
+        </p:txBody>
+      </p:sp>
+      <p:sp>
+        <p:nvSpPr>
+          <p:cNvPr id="43" name="Text 3"/>
           <p:cNvSpPr/>
           <p:nvPr/>
         </p:nvSpPr>
         <p:spPr>
           <a:xfrm>
             <a:off x="1454760" y="3840480"/>
-            <a:ext cx="6649560" cy="930240"/>
+            <a:ext cx="6649200" cy="929880"/>
           </a:xfrm>
           <a:prstGeom prst="rect">
             <a:avLst/>
@@ -4916,18 +5501,22 @@
               </a:tabLst>
             </a:pPr>
             <a:r>
-              <a:rPr b="0" lang="en-US" sz="1400" spc="-1" strike="noStrike">
-                <a:solidFill>
-                  <a:srgbClr val="000000"/>
-                </a:solidFill>
+              <a:rPr b="0" lang="en-US" sz="1400" strike="noStrike" u="none">
+                <a:solidFill>
+                  <a:srgbClr val="000000"/>
+                </a:solidFill>
+                <a:effectLst/>
+                <a:uFillTx/>
                 <a:latin typeface="Calibri"/>
               </a:rPr>
               <a:t>Структура проекта включает файлы для настройки бота, обработчики сообщений, контейнеры для сервисов и вспомогательные функции, что обеспечивает его гибкость и расширяемость.</a:t>
             </a:r>
-            <a:endParaRPr b="0" lang="ru-RU" sz="1400" spc="-1" strike="noStrike">
-              <a:solidFill>
-                <a:srgbClr val="000000"/>
-              </a:solidFill>
+            <a:endParaRPr b="0" lang="en-US" sz="1400" strike="noStrike" u="none">
+              <a:solidFill>
+                <a:srgbClr val="000000"/>
+              </a:solidFill>
+              <a:effectLst/>
+              <a:uFillTx/>
               <a:latin typeface="Arial"/>
             </a:endParaRPr>
           </a:p>
@@ -4965,7 +5554,7 @@
       </p:grpSpPr>
       <p:pic>
         <p:nvPicPr>
-          <p:cNvPr id="42" name="Image 0" descr="preencoded.png"/>
+          <p:cNvPr id="44" name="Image 0" descr="preencoded.png"/>
           <p:cNvPicPr/>
           <p:nvPr/>
         </p:nvPicPr>
@@ -4976,11 +5565,12 @@
         <p:spPr>
           <a:xfrm>
             <a:off x="0" y="0"/>
-            <a:ext cx="12191400" cy="6857280"/>
-          </a:xfrm>
-          <a:prstGeom prst="rect">
-            <a:avLst/>
-          </a:prstGeom>
+            <a:ext cx="12191040" cy="6856920"/>
+          </a:xfrm>
+          <a:prstGeom prst="rect">
+            <a:avLst/>
+          </a:prstGeom>
+          <a:noFill/>
           <a:ln w="0">
             <a:noFill/>
           </a:ln>
@@ -4988,14 +5578,14 @@
       </p:pic>
       <p:sp>
         <p:nvSpPr>
-          <p:cNvPr id="43" name="Text 0"/>
+          <p:cNvPr id="45" name="Text 0"/>
           <p:cNvSpPr/>
           <p:nvPr/>
         </p:nvSpPr>
         <p:spPr>
           <a:xfrm>
             <a:off x="1454760" y="417600"/>
-            <a:ext cx="10140840" cy="581040"/>
+            <a:ext cx="10140480" cy="580680"/>
           </a:xfrm>
           <a:prstGeom prst="rect">
             <a:avLst/>
@@ -5025,33 +5615,37 @@
               </a:tabLst>
             </a:pPr>
             <a:r>
-              <a:rPr b="1" lang="en-US" sz="2200" spc="-1" strike="noStrike">
-                <a:solidFill>
-                  <a:srgbClr val="000000"/>
-                </a:solidFill>
+              <a:rPr b="1" lang="en-US" sz="2200" strike="noStrike" u="none">
+                <a:solidFill>
+                  <a:srgbClr val="000000"/>
+                </a:solidFill>
+                <a:effectLst/>
+                <a:uFillTx/>
                 <a:latin typeface="Calibri"/>
               </a:rPr>
               <a:t>Структура проекта</a:t>
             </a:r>
-            <a:endParaRPr b="0" lang="ru-RU" sz="2200" spc="-1" strike="noStrike">
-              <a:solidFill>
-                <a:srgbClr val="000000"/>
-              </a:solidFill>
-              <a:latin typeface="Arial"/>
-            </a:endParaRPr>
-          </a:p>
-        </p:txBody>
-      </p:sp>
-      <p:sp>
-        <p:nvSpPr>
-          <p:cNvPr id="44" name="Text 1"/>
+            <a:endParaRPr b="0" lang="en-US" sz="2200" strike="noStrike" u="none">
+              <a:solidFill>
+                <a:srgbClr val="000000"/>
+              </a:solidFill>
+              <a:effectLst/>
+              <a:uFillTx/>
+              <a:latin typeface="Arial"/>
+            </a:endParaRPr>
+          </a:p>
+        </p:txBody>
+      </p:sp>
+      <p:sp>
+        <p:nvSpPr>
+          <p:cNvPr id="46" name="Text 1"/>
           <p:cNvSpPr/>
           <p:nvPr/>
         </p:nvSpPr>
         <p:spPr>
           <a:xfrm>
             <a:off x="1454760" y="1662480"/>
-            <a:ext cx="4155480" cy="1429200"/>
+            <a:ext cx="4155120" cy="1428840"/>
           </a:xfrm>
           <a:prstGeom prst="rect">
             <a:avLst/>
@@ -5081,33 +5675,37 @@
               </a:tabLst>
             </a:pPr>
             <a:r>
-              <a:rPr b="0" lang="en-US" sz="1400" spc="-1" strike="noStrike">
-                <a:solidFill>
-                  <a:srgbClr val="000000"/>
-                </a:solidFill>
+              <a:rPr b="0" lang="en-US" sz="1400" strike="noStrike" u="none">
+                <a:solidFill>
+                  <a:srgbClr val="000000"/>
+                </a:solidFill>
+                <a:effectLst/>
+                <a:uFillTx/>
                 <a:latin typeface="Calibri"/>
               </a:rPr>
               <a:t>Проект включает в себя несколько ключевых компонентов: точку входа для запуска бота (bot. py), основной класс бота с настройками (bot_instance. py), обработчики сообщений и команд (handlers.</a:t>
             </a:r>
-            <a:endParaRPr b="0" lang="ru-RU" sz="1400" spc="-1" strike="noStrike">
-              <a:solidFill>
-                <a:srgbClr val="000000"/>
-              </a:solidFill>
-              <a:latin typeface="Arial"/>
-            </a:endParaRPr>
-          </a:p>
-        </p:txBody>
-      </p:sp>
-      <p:sp>
-        <p:nvSpPr>
-          <p:cNvPr id="45" name="Text 2"/>
+            <a:endParaRPr b="0" lang="en-US" sz="1400" strike="noStrike" u="none">
+              <a:solidFill>
+                <a:srgbClr val="000000"/>
+              </a:solidFill>
+              <a:effectLst/>
+              <a:uFillTx/>
+              <a:latin typeface="Arial"/>
+            </a:endParaRPr>
+          </a:p>
+        </p:txBody>
+      </p:sp>
+      <p:sp>
+        <p:nvSpPr>
+          <p:cNvPr id="47" name="Text 2"/>
           <p:cNvSpPr/>
           <p:nvPr/>
         </p:nvSpPr>
         <p:spPr>
           <a:xfrm>
             <a:off x="6858000" y="1662480"/>
-            <a:ext cx="4155480" cy="2426760"/>
+            <a:ext cx="4155120" cy="2426400"/>
           </a:xfrm>
           <a:prstGeom prst="rect">
             <a:avLst/>
@@ -5137,18 +5735,22 @@
               </a:tabLst>
             </a:pPr>
             <a:r>
-              <a:rPr b="0" lang="en-US" sz="1400" spc="-1" strike="noStrike">
-                <a:solidFill>
-                  <a:srgbClr val="000000"/>
-                </a:solidFill>
+              <a:rPr b="0" lang="en-US" sz="1400" strike="noStrike" u="none">
+                <a:solidFill>
+                  <a:srgbClr val="000000"/>
+                </a:solidFill>
+                <a:effectLst/>
+                <a:uFillTx/>
                 <a:latin typeface="Calibri"/>
               </a:rPr>
               <a:t>py) и контейнеры для сервисов, таких как калькулятор, построитель графиков и решатель уравнений (services. py). Для управления процессами используется process_manager. py, а для создания клавиатур — keyboards. py. Конфигурация бота хранится в config. py, взаимодействие с базой данных SQLite для статистики осуществляется через database. py.</a:t>
             </a:r>
-            <a:endParaRPr b="0" lang="ru-RU" sz="1400" spc="-1" strike="noStrike">
-              <a:solidFill>
-                <a:srgbClr val="000000"/>
-              </a:solidFill>
+            <a:endParaRPr b="0" lang="en-US" sz="1400" strike="noStrike" u="none">
+              <a:solidFill>
+                <a:srgbClr val="000000"/>
+              </a:solidFill>
+              <a:effectLst/>
+              <a:uFillTx/>
               <a:latin typeface="Arial"/>
             </a:endParaRPr>
           </a:p>
@@ -5339,7 +5941,7 @@
 </a:theme>
 </file>
 
-<file path=ppt/theme/theme2.xml><?xml version="1.0" encoding="utf-8"?>
+<file path=ppt/theme/theme3.xml><?xml version="1.0" encoding="utf-8"?>
 <a:theme xmlns:a="http://schemas.openxmlformats.org/drawingml/2006/main" xmlns:r="http://schemas.openxmlformats.org/officeDocument/2006/relationships" name="Office Theme">
   <a:themeElements>
     <a:clrScheme name="LibreOffice">

</xml_diff>

<commit_message>
fix/015: Fixed information bot
</commit_message>
<xml_diff>
--- a/project_telegram_bot.pptx
+++ b/project_telegram_bot.pptx
@@ -376,7 +376,7 @@
             <a:pPr indent="0" algn="r">
               <a:buNone/>
             </a:pPr>
-            <a:fld id="{9C9440B4-58AF-4641-845D-F076EC485E8C}" type="slidenum">
+            <a:fld id="{8239BB78-47F8-4CBA-AA67-BA5B7ACD4ECF}" type="slidenum">
               <a:rPr b="0" lang="en-US" sz="1400" strike="noStrike" u="none">
                 <a:solidFill>
                   <a:srgbClr val="000000"/>
@@ -434,7 +434,7 @@
         <p:spPr>
           <a:xfrm>
             <a:off x="685800" y="1143000"/>
-            <a:ext cx="5485320" cy="3085200"/>
+            <a:ext cx="5484960" cy="3084840"/>
           </a:xfrm>
           <a:prstGeom prst="rect">
             <a:avLst/>
@@ -457,7 +457,7 @@
         <p:spPr>
           <a:xfrm>
             <a:off x="685800" y="4400640"/>
-            <a:ext cx="5485320" cy="3599280"/>
+            <a:ext cx="5484960" cy="3598920"/>
           </a:xfrm>
           <a:prstGeom prst="rect">
             <a:avLst/>
@@ -499,7 +499,7 @@
         <p:spPr>
           <a:xfrm>
             <a:off x="3884760" y="8685360"/>
-            <a:ext cx="2970720" cy="457560"/>
+            <a:ext cx="2970360" cy="457200"/>
           </a:xfrm>
           <a:prstGeom prst="rect">
             <a:avLst/>
@@ -543,7 +543,7 @@
                 <a:tab algn="l" pos="0"/>
               </a:tabLst>
             </a:pPr>
-            <a:fld id="{57547114-9431-4222-AFA4-0AF0C087ACAB}" type="slidenum">
+            <a:fld id="{802ED112-2F75-4415-825E-713D000B2A4D}" type="slidenum">
               <a:rPr b="0" lang="en-US" sz="1200" strike="noStrike" u="none">
                 <a:solidFill>
                   <a:schemeClr val="dk1"/>
@@ -601,7 +601,7 @@
         <p:spPr>
           <a:xfrm>
             <a:off x="685800" y="1143000"/>
-            <a:ext cx="5485320" cy="3085200"/>
+            <a:ext cx="5484960" cy="3084840"/>
           </a:xfrm>
           <a:prstGeom prst="rect">
             <a:avLst/>
@@ -624,7 +624,7 @@
         <p:spPr>
           <a:xfrm>
             <a:off x="685800" y="4400640"/>
-            <a:ext cx="5485320" cy="3599280"/>
+            <a:ext cx="5484960" cy="3598920"/>
           </a:xfrm>
           <a:prstGeom prst="rect">
             <a:avLst/>
@@ -666,7 +666,7 @@
         <p:spPr>
           <a:xfrm>
             <a:off x="3884760" y="8685360"/>
-            <a:ext cx="2970720" cy="457560"/>
+            <a:ext cx="2970360" cy="457200"/>
           </a:xfrm>
           <a:prstGeom prst="rect">
             <a:avLst/>
@@ -710,7 +710,7 @@
                 <a:tab algn="l" pos="0"/>
               </a:tabLst>
             </a:pPr>
-            <a:fld id="{84E5E8D2-8C37-499B-9ED7-C92DDB556C1E}" type="slidenum">
+            <a:fld id="{548BAE7E-9F84-4750-95CA-92C186010D44}" type="slidenum">
               <a:rPr b="0" lang="en-US" sz="1200" strike="noStrike" u="none">
                 <a:solidFill>
                   <a:schemeClr val="dk1"/>
@@ -768,7 +768,7 @@
         <p:spPr>
           <a:xfrm>
             <a:off x="685800" y="1143000"/>
-            <a:ext cx="5485320" cy="3085200"/>
+            <a:ext cx="5484960" cy="3084840"/>
           </a:xfrm>
           <a:prstGeom prst="rect">
             <a:avLst/>
@@ -791,7 +791,7 @@
         <p:spPr>
           <a:xfrm>
             <a:off x="685800" y="4400640"/>
-            <a:ext cx="5485320" cy="3599280"/>
+            <a:ext cx="5484960" cy="3598920"/>
           </a:xfrm>
           <a:prstGeom prst="rect">
             <a:avLst/>
@@ -833,7 +833,7 @@
         <p:spPr>
           <a:xfrm>
             <a:off x="3884760" y="8685360"/>
-            <a:ext cx="2970720" cy="457560"/>
+            <a:ext cx="2970360" cy="457200"/>
           </a:xfrm>
           <a:prstGeom prst="rect">
             <a:avLst/>
@@ -877,7 +877,7 @@
                 <a:tab algn="l" pos="0"/>
               </a:tabLst>
             </a:pPr>
-            <a:fld id="{F3E41F84-E231-4D2B-9BCD-74B2E8E80681}" type="slidenum">
+            <a:fld id="{8B3A1CB8-4F10-4B3B-B128-4F21A43F9ACE}" type="slidenum">
               <a:rPr b="0" lang="en-US" sz="1200" strike="noStrike" u="none">
                 <a:solidFill>
                   <a:schemeClr val="dk1"/>
@@ -935,7 +935,7 @@
         <p:spPr>
           <a:xfrm>
             <a:off x="685800" y="1143000"/>
-            <a:ext cx="5485320" cy="3085200"/>
+            <a:ext cx="5484960" cy="3084840"/>
           </a:xfrm>
           <a:prstGeom prst="rect">
             <a:avLst/>
@@ -958,7 +958,7 @@
         <p:spPr>
           <a:xfrm>
             <a:off x="685800" y="4400640"/>
-            <a:ext cx="5485320" cy="3599280"/>
+            <a:ext cx="5484960" cy="3598920"/>
           </a:xfrm>
           <a:prstGeom prst="rect">
             <a:avLst/>
@@ -1000,7 +1000,7 @@
         <p:spPr>
           <a:xfrm>
             <a:off x="3884760" y="8685360"/>
-            <a:ext cx="2970720" cy="457560"/>
+            <a:ext cx="2970360" cy="457200"/>
           </a:xfrm>
           <a:prstGeom prst="rect">
             <a:avLst/>
@@ -1044,7 +1044,7 @@
                 <a:tab algn="l" pos="0"/>
               </a:tabLst>
             </a:pPr>
-            <a:fld id="{893F54A9-8656-4E38-AC86-DF94D520CC35}" type="slidenum">
+            <a:fld id="{853AD8B9-509F-4D3D-87B9-37D39EEA5D1C}" type="slidenum">
               <a:rPr b="0" lang="en-US" sz="1200" strike="noStrike" u="none">
                 <a:solidFill>
                   <a:schemeClr val="dk1"/>
@@ -1102,7 +1102,7 @@
         <p:spPr>
           <a:xfrm>
             <a:off x="685800" y="1143000"/>
-            <a:ext cx="5485320" cy="3085200"/>
+            <a:ext cx="5484960" cy="3084840"/>
           </a:xfrm>
           <a:prstGeom prst="rect">
             <a:avLst/>
@@ -1125,7 +1125,7 @@
         <p:spPr>
           <a:xfrm>
             <a:off x="685800" y="4400640"/>
-            <a:ext cx="5485320" cy="3599280"/>
+            <a:ext cx="5484960" cy="3598920"/>
           </a:xfrm>
           <a:prstGeom prst="rect">
             <a:avLst/>
@@ -1167,7 +1167,7 @@
         <p:spPr>
           <a:xfrm>
             <a:off x="3884760" y="8685360"/>
-            <a:ext cx="2970720" cy="457560"/>
+            <a:ext cx="2970360" cy="457200"/>
           </a:xfrm>
           <a:prstGeom prst="rect">
             <a:avLst/>
@@ -1211,7 +1211,7 @@
                 <a:tab algn="l" pos="0"/>
               </a:tabLst>
             </a:pPr>
-            <a:fld id="{32F2DBE6-BE28-48D7-A09B-D09E81E6538F}" type="slidenum">
+            <a:fld id="{1159DD87-0628-4FA3-B970-BF490FBC149A}" type="slidenum">
               <a:rPr b="0" lang="en-US" sz="1200" strike="noStrike" u="none">
                 <a:solidFill>
                   <a:schemeClr val="dk1"/>
@@ -1269,7 +1269,7 @@
         <p:spPr>
           <a:xfrm>
             <a:off x="685800" y="1143000"/>
-            <a:ext cx="5485320" cy="3085200"/>
+            <a:ext cx="5484960" cy="3084840"/>
           </a:xfrm>
           <a:prstGeom prst="rect">
             <a:avLst/>
@@ -1292,7 +1292,7 @@
         <p:spPr>
           <a:xfrm>
             <a:off x="685800" y="4400640"/>
-            <a:ext cx="5485320" cy="3599280"/>
+            <a:ext cx="5484960" cy="3598920"/>
           </a:xfrm>
           <a:prstGeom prst="rect">
             <a:avLst/>
@@ -1334,7 +1334,7 @@
         <p:spPr>
           <a:xfrm>
             <a:off x="3884760" y="8685360"/>
-            <a:ext cx="2970720" cy="457560"/>
+            <a:ext cx="2970360" cy="457200"/>
           </a:xfrm>
           <a:prstGeom prst="rect">
             <a:avLst/>
@@ -1378,7 +1378,7 @@
                 <a:tab algn="l" pos="0"/>
               </a:tabLst>
             </a:pPr>
-            <a:fld id="{70EA9421-E2B7-4AEF-9774-81F0543348C8}" type="slidenum">
+            <a:fld id="{D3090A89-5848-4273-8745-F723DB1CAFEB}" type="slidenum">
               <a:rPr b="0" lang="en-US" sz="1200" strike="noStrike" u="none">
                 <a:solidFill>
                   <a:schemeClr val="dk1"/>
@@ -1436,7 +1436,7 @@
         <p:spPr>
           <a:xfrm>
             <a:off x="685800" y="1143000"/>
-            <a:ext cx="5485320" cy="3085200"/>
+            <a:ext cx="5484960" cy="3084840"/>
           </a:xfrm>
           <a:prstGeom prst="rect">
             <a:avLst/>
@@ -1459,7 +1459,7 @@
         <p:spPr>
           <a:xfrm>
             <a:off x="685800" y="4400640"/>
-            <a:ext cx="5485320" cy="3599280"/>
+            <a:ext cx="5484960" cy="3598920"/>
           </a:xfrm>
           <a:prstGeom prst="rect">
             <a:avLst/>
@@ -1501,7 +1501,7 @@
         <p:spPr>
           <a:xfrm>
             <a:off x="3884760" y="8685360"/>
-            <a:ext cx="2970720" cy="457560"/>
+            <a:ext cx="2970360" cy="457200"/>
           </a:xfrm>
           <a:prstGeom prst="rect">
             <a:avLst/>
@@ -1545,7 +1545,7 @@
                 <a:tab algn="l" pos="0"/>
               </a:tabLst>
             </a:pPr>
-            <a:fld id="{144AC486-9056-45C8-8AEE-AF952DA87AB5}" type="slidenum">
+            <a:fld id="{A70CE3ED-58F8-473C-B63B-63CD7C335AB6}" type="slidenum">
               <a:rPr b="0" lang="en-US" sz="1200" strike="noStrike" u="none">
                 <a:solidFill>
                   <a:schemeClr val="dk1"/>
@@ -1603,7 +1603,7 @@
         <p:spPr>
           <a:xfrm>
             <a:off x="685800" y="1143000"/>
-            <a:ext cx="5485320" cy="3085200"/>
+            <a:ext cx="5484960" cy="3084840"/>
           </a:xfrm>
           <a:prstGeom prst="rect">
             <a:avLst/>
@@ -1626,7 +1626,7 @@
         <p:spPr>
           <a:xfrm>
             <a:off x="685800" y="4400640"/>
-            <a:ext cx="5485320" cy="3599280"/>
+            <a:ext cx="5484960" cy="3598920"/>
           </a:xfrm>
           <a:prstGeom prst="rect">
             <a:avLst/>
@@ -1668,7 +1668,7 @@
         <p:spPr>
           <a:xfrm>
             <a:off x="3884760" y="8685360"/>
-            <a:ext cx="2970720" cy="457560"/>
+            <a:ext cx="2970360" cy="457200"/>
           </a:xfrm>
           <a:prstGeom prst="rect">
             <a:avLst/>
@@ -1712,7 +1712,7 @@
                 <a:tab algn="l" pos="0"/>
               </a:tabLst>
             </a:pPr>
-            <a:fld id="{F6E4B865-35C8-4996-9D2C-AA5F5F0E0A09}" type="slidenum">
+            <a:fld id="{1971FBD3-9345-4EF3-B111-F5F99785DEEE}" type="slidenum">
               <a:rPr b="0" lang="en-US" sz="1200" strike="noStrike" u="none">
                 <a:solidFill>
                   <a:schemeClr val="dk1"/>
@@ -1770,7 +1770,7 @@
         <p:spPr>
           <a:xfrm>
             <a:off x="685800" y="1143000"/>
-            <a:ext cx="5485320" cy="3085200"/>
+            <a:ext cx="5484960" cy="3084840"/>
           </a:xfrm>
           <a:prstGeom prst="rect">
             <a:avLst/>
@@ -1793,7 +1793,7 @@
         <p:spPr>
           <a:xfrm>
             <a:off x="685800" y="4400640"/>
-            <a:ext cx="5485320" cy="3599280"/>
+            <a:ext cx="5484960" cy="3598920"/>
           </a:xfrm>
           <a:prstGeom prst="rect">
             <a:avLst/>
@@ -1835,7 +1835,7 @@
         <p:spPr>
           <a:xfrm>
             <a:off x="3884760" y="8685360"/>
-            <a:ext cx="2970720" cy="457560"/>
+            <a:ext cx="2970360" cy="457200"/>
           </a:xfrm>
           <a:prstGeom prst="rect">
             <a:avLst/>
@@ -1879,7 +1879,7 @@
                 <a:tab algn="l" pos="0"/>
               </a:tabLst>
             </a:pPr>
-            <a:fld id="{443F9FF4-36FF-4BC6-BDD3-CEFE9E844009}" type="slidenum">
+            <a:fld id="{58B07C24-D6E5-413B-8373-EB4C81F29BD9}" type="slidenum">
               <a:rPr b="0" lang="en-US" sz="1200" strike="noStrike" u="none">
                 <a:solidFill>
                   <a:schemeClr val="dk1"/>
@@ -1937,7 +1937,7 @@
         <p:spPr>
           <a:xfrm>
             <a:off x="685800" y="1143000"/>
-            <a:ext cx="5485320" cy="3085200"/>
+            <a:ext cx="5484960" cy="3084840"/>
           </a:xfrm>
           <a:prstGeom prst="rect">
             <a:avLst/>
@@ -1960,7 +1960,7 @@
         <p:spPr>
           <a:xfrm>
             <a:off x="685800" y="4400640"/>
-            <a:ext cx="5485320" cy="3599280"/>
+            <a:ext cx="5484960" cy="3598920"/>
           </a:xfrm>
           <a:prstGeom prst="rect">
             <a:avLst/>
@@ -2002,7 +2002,7 @@
         <p:spPr>
           <a:xfrm>
             <a:off x="3884760" y="8685360"/>
-            <a:ext cx="2970720" cy="457560"/>
+            <a:ext cx="2970360" cy="457200"/>
           </a:xfrm>
           <a:prstGeom prst="rect">
             <a:avLst/>
@@ -2046,7 +2046,7 @@
                 <a:tab algn="l" pos="0"/>
               </a:tabLst>
             </a:pPr>
-            <a:fld id="{8C542693-0494-4C80-973E-1013ADCE8DFF}" type="slidenum">
+            <a:fld id="{F041A6A3-90E2-449E-973E-1D6807311C94}" type="slidenum">
               <a:rPr b="0" lang="en-US" sz="1200" strike="noStrike" u="none">
                 <a:solidFill>
                   <a:schemeClr val="dk1"/>
@@ -2104,7 +2104,7 @@
         <p:spPr>
           <a:xfrm>
             <a:off x="685800" y="1143000"/>
-            <a:ext cx="5485320" cy="3085200"/>
+            <a:ext cx="5484960" cy="3084840"/>
           </a:xfrm>
           <a:prstGeom prst="rect">
             <a:avLst/>
@@ -2127,7 +2127,7 @@
         <p:spPr>
           <a:xfrm>
             <a:off x="685800" y="4400640"/>
-            <a:ext cx="5485320" cy="3599280"/>
+            <a:ext cx="5484960" cy="3598920"/>
           </a:xfrm>
           <a:prstGeom prst="rect">
             <a:avLst/>
@@ -2169,7 +2169,7 @@
         <p:spPr>
           <a:xfrm>
             <a:off x="3884760" y="8685360"/>
-            <a:ext cx="2970720" cy="457560"/>
+            <a:ext cx="2970360" cy="457200"/>
           </a:xfrm>
           <a:prstGeom prst="rect">
             <a:avLst/>
@@ -2213,7 +2213,7 @@
                 <a:tab algn="l" pos="0"/>
               </a:tabLst>
             </a:pPr>
-            <a:fld id="{815891F7-0999-406E-BE31-FFDE76C63E59}" type="slidenum">
+            <a:fld id="{4C8E7BE6-B903-42A7-A877-7CC96B274718}" type="slidenum">
               <a:rPr b="0" lang="en-US" sz="1200" strike="noStrike" u="none">
                 <a:solidFill>
                   <a:schemeClr val="dk1"/>
@@ -2278,7 +2278,7 @@
         <p:spPr>
           <a:xfrm>
             <a:off x="609480" y="221040"/>
-            <a:ext cx="10972080" cy="1249920"/>
+            <a:ext cx="10971720" cy="1249560"/>
           </a:xfrm>
           <a:prstGeom prst="rect">
             <a:avLst/>
@@ -2294,7 +2294,13 @@
           </a:bodyPr>
           <a:p>
             <a:pPr indent="0">
+              <a:lnSpc>
+                <a:spcPct val="100000"/>
+              </a:lnSpc>
               <a:buNone/>
+              <a:tabLst>
+                <a:tab algn="l" pos="0"/>
+              </a:tabLst>
             </a:pPr>
             <a:r>
               <a:rPr b="0" lang="en-US" sz="1800" strike="noStrike" u="none">
@@ -2331,7 +2337,7 @@
         <p:spPr>
           <a:xfrm>
             <a:off x="609480" y="1604520"/>
-            <a:ext cx="10972440" cy="3977280"/>
+            <a:ext cx="10972080" cy="3976920"/>
           </a:xfrm>
           <a:prstGeom prst="rect">
             <a:avLst/>
@@ -2347,6 +2353,9 @@
           </a:bodyPr>
           <a:p>
             <a:pPr marL="432000" indent="-324000">
+              <a:lnSpc>
+                <a:spcPct val="100000"/>
+              </a:lnSpc>
               <a:spcBef>
                 <a:spcPts val="1417"/>
               </a:spcBef>
@@ -2379,6 +2388,9 @@
           </a:p>
           <a:p>
             <a:pPr lvl="1" marL="864000" indent="-324000">
+              <a:lnSpc>
+                <a:spcPct val="100000"/>
+              </a:lnSpc>
               <a:spcBef>
                 <a:spcPts val="1134"/>
               </a:spcBef>
@@ -2411,6 +2423,9 @@
           </a:p>
           <a:p>
             <a:pPr lvl="2" marL="1296000" indent="-288000">
+              <a:lnSpc>
+                <a:spcPct val="100000"/>
+              </a:lnSpc>
               <a:spcBef>
                 <a:spcPts val="850"/>
               </a:spcBef>
@@ -2443,6 +2458,9 @@
           </a:p>
           <a:p>
             <a:pPr lvl="3" marL="1728000" indent="-216000">
+              <a:lnSpc>
+                <a:spcPct val="100000"/>
+              </a:lnSpc>
               <a:spcBef>
                 <a:spcPts val="567"/>
               </a:spcBef>
@@ -2475,6 +2493,9 @@
           </a:p>
           <a:p>
             <a:pPr lvl="4" marL="2160000" indent="-216000">
+              <a:lnSpc>
+                <a:spcPct val="100000"/>
+              </a:lnSpc>
               <a:spcBef>
                 <a:spcPts val="283"/>
               </a:spcBef>
@@ -2507,6 +2528,9 @@
           </a:p>
           <a:p>
             <a:pPr lvl="5" marL="2592000" indent="-216000">
+              <a:lnSpc>
+                <a:spcPct val="100000"/>
+              </a:lnSpc>
               <a:spcBef>
                 <a:spcPts val="283"/>
               </a:spcBef>
@@ -2539,6 +2563,9 @@
           </a:p>
           <a:p>
             <a:pPr lvl="6" marL="3024000" indent="-216000">
+              <a:lnSpc>
+                <a:spcPct val="100000"/>
+              </a:lnSpc>
               <a:spcBef>
                 <a:spcPts val="283"/>
               </a:spcBef>
@@ -2613,7 +2640,7 @@
         <p:spPr>
           <a:xfrm>
             <a:off x="609480" y="273600"/>
-            <a:ext cx="10972440" cy="1144800"/>
+            <a:ext cx="10972080" cy="1144440"/>
           </a:xfrm>
           <a:prstGeom prst="rect">
             <a:avLst/>
@@ -2629,7 +2656,13 @@
           </a:bodyPr>
           <a:p>
             <a:pPr indent="0" algn="ctr">
+              <a:lnSpc>
+                <a:spcPct val="100000"/>
+              </a:lnSpc>
               <a:buNone/>
+              <a:tabLst>
+                <a:tab algn="l" pos="0"/>
+              </a:tabLst>
             </a:pPr>
             <a:r>
               <a:rPr b="0" lang="en-US" sz="4400" strike="noStrike" u="none">
@@ -2666,7 +2699,7 @@
         <p:spPr>
           <a:xfrm>
             <a:off x="609480" y="1604520"/>
-            <a:ext cx="10972440" cy="3977280"/>
+            <a:ext cx="10972080" cy="3976920"/>
           </a:xfrm>
           <a:prstGeom prst="rect">
             <a:avLst/>
@@ -2682,6 +2715,9 @@
           </a:bodyPr>
           <a:p>
             <a:pPr marL="432000" indent="-324000">
+              <a:lnSpc>
+                <a:spcPct val="100000"/>
+              </a:lnSpc>
               <a:spcBef>
                 <a:spcPts val="1417"/>
               </a:spcBef>
@@ -2714,6 +2750,9 @@
           </a:p>
           <a:p>
             <a:pPr lvl="1" marL="864000" indent="-324000">
+              <a:lnSpc>
+                <a:spcPct val="100000"/>
+              </a:lnSpc>
               <a:spcBef>
                 <a:spcPts val="1134"/>
               </a:spcBef>
@@ -2746,6 +2785,9 @@
           </a:p>
           <a:p>
             <a:pPr lvl="2" marL="1296000" indent="-288000">
+              <a:lnSpc>
+                <a:spcPct val="100000"/>
+              </a:lnSpc>
               <a:spcBef>
                 <a:spcPts val="850"/>
               </a:spcBef>
@@ -2778,6 +2820,9 @@
           </a:p>
           <a:p>
             <a:pPr lvl="3" marL="1728000" indent="-216000">
+              <a:lnSpc>
+                <a:spcPct val="100000"/>
+              </a:lnSpc>
               <a:spcBef>
                 <a:spcPts val="567"/>
               </a:spcBef>
@@ -2810,6 +2855,9 @@
           </a:p>
           <a:p>
             <a:pPr lvl="4" marL="2160000" indent="-216000">
+              <a:lnSpc>
+                <a:spcPct val="100000"/>
+              </a:lnSpc>
               <a:spcBef>
                 <a:spcPts val="283"/>
               </a:spcBef>
@@ -2842,6 +2890,9 @@
           </a:p>
           <a:p>
             <a:pPr lvl="5" marL="2592000" indent="-216000">
+              <a:lnSpc>
+                <a:spcPct val="100000"/>
+              </a:lnSpc>
               <a:spcBef>
                 <a:spcPts val="283"/>
               </a:spcBef>
@@ -2874,6 +2925,9 @@
           </a:p>
           <a:p>
             <a:pPr lvl="6" marL="3024000" indent="-216000">
+              <a:lnSpc>
+                <a:spcPct val="100000"/>
+              </a:lnSpc>
               <a:spcBef>
                 <a:spcPts val="283"/>
               </a:spcBef>
@@ -2968,7 +3022,7 @@
         <p:spPr>
           <a:xfrm>
             <a:off x="609480" y="221040"/>
-            <a:ext cx="10972080" cy="1249920"/>
+            <a:ext cx="10971720" cy="1249560"/>
           </a:xfrm>
           <a:prstGeom prst="rect">
             <a:avLst/>
@@ -3023,7 +3077,7 @@
         <p:spPr>
           <a:xfrm>
             <a:off x="5486400" y="3060000"/>
-            <a:ext cx="6095160" cy="2521440"/>
+            <a:ext cx="6094800" cy="2521080"/>
           </a:xfrm>
           <a:prstGeom prst="rect">
             <a:avLst/>
@@ -3091,35 +3145,6 @@
                 <a:latin typeface="Arial"/>
               </a:rPr>
               <a:t>Самарский Илья</a:t>
-            </a:r>
-            <a:endParaRPr b="0" lang="en-US" sz="3200" strike="noStrike" u="none">
-              <a:solidFill>
-                <a:srgbClr val="000000"/>
-              </a:solidFill>
-              <a:effectLst/>
-              <a:uFillTx/>
-              <a:latin typeface="Arial"/>
-            </a:endParaRPr>
-          </a:p>
-          <a:p>
-            <a:pPr algn="r">
-              <a:lnSpc>
-                <a:spcPct val="100000"/>
-              </a:lnSpc>
-              <a:tabLst>
-                <a:tab algn="l" pos="0"/>
-              </a:tabLst>
-            </a:pPr>
-            <a:r>
-              <a:rPr b="0" lang="ru-RU" sz="3200" strike="noStrike" u="none">
-                <a:solidFill>
-                  <a:srgbClr val="000000"/>
-                </a:solidFill>
-                <a:effectLst/>
-                <a:uFillTx/>
-                <a:latin typeface="Arial"/>
-              </a:rPr>
-              <a:t>Минаев Константин</a:t>
             </a:r>
             <a:endParaRPr b="0" lang="en-US" sz="3200" strike="noStrike" u="none">
               <a:solidFill>
@@ -3175,7 +3200,7 @@
         <p:spPr>
           <a:xfrm>
             <a:off x="0" y="0"/>
-            <a:ext cx="12191040" cy="6856920"/>
+            <a:ext cx="12190680" cy="6856560"/>
           </a:xfrm>
           <a:prstGeom prst="rect">
             <a:avLst/>
@@ -3195,7 +3220,7 @@
         <p:spPr>
           <a:xfrm>
             <a:off x="1454760" y="750240"/>
-            <a:ext cx="10140480" cy="580680"/>
+            <a:ext cx="10140120" cy="580320"/>
           </a:xfrm>
           <a:prstGeom prst="rect">
             <a:avLst/>
@@ -3255,7 +3280,7 @@
         <p:spPr>
           <a:xfrm>
             <a:off x="1454760" y="2078280"/>
-            <a:ext cx="9974160" cy="680400"/>
+            <a:ext cx="9973800" cy="680040"/>
           </a:xfrm>
           <a:prstGeom prst="rect">
             <a:avLst/>
@@ -3315,7 +3340,7 @@
         <p:spPr>
           <a:xfrm>
             <a:off x="1454760" y="3241800"/>
-            <a:ext cx="9974160" cy="680400"/>
+            <a:ext cx="9973800" cy="680040"/>
           </a:xfrm>
           <a:prstGeom prst="rect">
             <a:avLst/>
@@ -3409,7 +3434,7 @@
         <p:spPr>
           <a:xfrm>
             <a:off x="48240" y="-17640"/>
-            <a:ext cx="12191040" cy="6856920"/>
+            <a:ext cx="12190680" cy="6856560"/>
           </a:xfrm>
           <a:prstGeom prst="rect">
             <a:avLst/>
@@ -3429,7 +3454,7 @@
         <p:spPr>
           <a:xfrm>
             <a:off x="1454760" y="417600"/>
-            <a:ext cx="10140480" cy="580680"/>
+            <a:ext cx="10140120" cy="580320"/>
           </a:xfrm>
           <a:prstGeom prst="rect">
             <a:avLst/>
@@ -3489,7 +3514,7 @@
         <p:spPr>
           <a:xfrm>
             <a:off x="1454760" y="2160000"/>
-            <a:ext cx="4155120" cy="1179360"/>
+            <a:ext cx="4154760" cy="1179000"/>
           </a:xfrm>
           <a:prstGeom prst="rect">
             <a:avLst/>
@@ -3550,7 +3575,7 @@
         <p:spPr>
           <a:xfrm>
             <a:off x="6858000" y="1662480"/>
-            <a:ext cx="4155120" cy="1677960"/>
+            <a:ext cx="4154760" cy="1677600"/>
           </a:xfrm>
           <a:prstGeom prst="rect">
             <a:avLst/>
@@ -3633,7 +3658,7 @@
         <p:spPr>
           <a:xfrm>
             <a:off x="0" y="0"/>
-            <a:ext cx="12191040" cy="6856920"/>
+            <a:ext cx="12190680" cy="6856560"/>
           </a:xfrm>
           <a:prstGeom prst="rect">
             <a:avLst/>
@@ -3653,7 +3678,7 @@
         <p:spPr>
           <a:xfrm>
             <a:off x="1247040" y="2080440"/>
-            <a:ext cx="10140480" cy="780480"/>
+            <a:ext cx="10140120" cy="780120"/>
           </a:xfrm>
           <a:prstGeom prst="rect">
             <a:avLst/>
@@ -3713,7 +3738,7 @@
         <p:spPr>
           <a:xfrm>
             <a:off x="1247040" y="3324960"/>
-            <a:ext cx="9974160" cy="929880"/>
+            <a:ext cx="9973800" cy="929520"/>
           </a:xfrm>
           <a:prstGeom prst="rect">
             <a:avLst/>
@@ -3807,7 +3832,7 @@
         <p:spPr>
           <a:xfrm>
             <a:off x="0" y="0"/>
-            <a:ext cx="12191040" cy="6856920"/>
+            <a:ext cx="12190680" cy="6856560"/>
           </a:xfrm>
           <a:prstGeom prst="rect">
             <a:avLst/>
@@ -3827,7 +3852,7 @@
         <p:spPr>
           <a:xfrm>
             <a:off x="831240" y="1248840"/>
-            <a:ext cx="5983920" cy="979920"/>
+            <a:ext cx="5983560" cy="979560"/>
           </a:xfrm>
           <a:prstGeom prst="rect">
             <a:avLst/>
@@ -3887,7 +3912,7 @@
         <p:spPr>
           <a:xfrm>
             <a:off x="831240" y="2327400"/>
-            <a:ext cx="5817960" cy="1677960"/>
+            <a:ext cx="5817600" cy="1677600"/>
           </a:xfrm>
           <a:prstGeom prst="rect">
             <a:avLst/>
@@ -3981,7 +4006,7 @@
         <p:spPr>
           <a:xfrm>
             <a:off x="0" y="0"/>
-            <a:ext cx="12191040" cy="6856920"/>
+            <a:ext cx="12190680" cy="6856560"/>
           </a:xfrm>
           <a:prstGeom prst="rect">
             <a:avLst/>
@@ -4001,7 +4026,7 @@
         <p:spPr>
           <a:xfrm>
             <a:off x="1454760" y="750240"/>
-            <a:ext cx="10140480" cy="580680"/>
+            <a:ext cx="10140120" cy="580320"/>
           </a:xfrm>
           <a:prstGeom prst="rect">
             <a:avLst/>
@@ -4061,7 +4086,7 @@
         <p:spPr>
           <a:xfrm>
             <a:off x="1454760" y="2078280"/>
-            <a:ext cx="9974160" cy="680400"/>
+            <a:ext cx="9973800" cy="680040"/>
           </a:xfrm>
           <a:prstGeom prst="rect">
             <a:avLst/>
@@ -4121,7 +4146,7 @@
         <p:spPr>
           <a:xfrm>
             <a:off x="1454760" y="3241800"/>
-            <a:ext cx="9974160" cy="929880"/>
+            <a:ext cx="9973800" cy="929520"/>
           </a:xfrm>
           <a:prstGeom prst="rect">
             <a:avLst/>
@@ -4215,7 +4240,7 @@
         <p:spPr>
           <a:xfrm>
             <a:off x="0" y="0"/>
-            <a:ext cx="12191040" cy="6856920"/>
+            <a:ext cx="12190680" cy="6856560"/>
           </a:xfrm>
           <a:prstGeom prst="rect">
             <a:avLst/>
@@ -4235,7 +4260,7 @@
         <p:spPr>
           <a:xfrm>
             <a:off x="415800" y="833400"/>
-            <a:ext cx="10140480" cy="580680"/>
+            <a:ext cx="10140120" cy="580320"/>
           </a:xfrm>
           <a:prstGeom prst="rect">
             <a:avLst/>
@@ -4295,7 +4320,7 @@
         <p:spPr>
           <a:xfrm>
             <a:off x="415800" y="2078280"/>
-            <a:ext cx="3323880" cy="1179360"/>
+            <a:ext cx="3323520" cy="1179000"/>
           </a:xfrm>
           <a:prstGeom prst="rect">
             <a:avLst/>
@@ -4355,7 +4380,7 @@
         <p:spPr>
           <a:xfrm>
             <a:off x="4572000" y="2078280"/>
-            <a:ext cx="3323880" cy="1428840"/>
+            <a:ext cx="3323520" cy="1428480"/>
           </a:xfrm>
           <a:prstGeom prst="rect">
             <a:avLst/>
@@ -4415,7 +4440,7 @@
         <p:spPr>
           <a:xfrm>
             <a:off x="8728200" y="2078280"/>
-            <a:ext cx="3323880" cy="1428840"/>
+            <a:ext cx="3323520" cy="1428480"/>
           </a:xfrm>
           <a:prstGeom prst="rect">
             <a:avLst/>
@@ -4509,7 +4534,7 @@
         <p:spPr>
           <a:xfrm>
             <a:off x="0" y="0"/>
-            <a:ext cx="12191040" cy="6856920"/>
+            <a:ext cx="12190680" cy="6856560"/>
           </a:xfrm>
           <a:prstGeom prst="rect">
             <a:avLst/>
@@ -4529,7 +4554,7 @@
         <p:spPr>
           <a:xfrm>
             <a:off x="1454760" y="750240"/>
-            <a:ext cx="10140480" cy="580680"/>
+            <a:ext cx="10140120" cy="580320"/>
           </a:xfrm>
           <a:prstGeom prst="rect">
             <a:avLst/>
@@ -4589,7 +4614,7 @@
         <p:spPr>
           <a:xfrm>
             <a:off x="1454760" y="2078280"/>
-            <a:ext cx="9974160" cy="680400"/>
+            <a:ext cx="9973800" cy="680040"/>
           </a:xfrm>
           <a:prstGeom prst="rect">
             <a:avLst/>
@@ -4649,7 +4674,7 @@
         <p:spPr>
           <a:xfrm>
             <a:off x="1454760" y="3241800"/>
-            <a:ext cx="9974160" cy="929880"/>
+            <a:ext cx="9973800" cy="929520"/>
           </a:xfrm>
           <a:prstGeom prst="rect">
             <a:avLst/>
@@ -4743,7 +4768,7 @@
         <p:spPr>
           <a:xfrm>
             <a:off x="0" y="0"/>
-            <a:ext cx="12191040" cy="6856920"/>
+            <a:ext cx="12190680" cy="6856560"/>
           </a:xfrm>
           <a:prstGeom prst="rect">
             <a:avLst/>
@@ -4763,7 +4788,7 @@
         <p:spPr>
           <a:xfrm>
             <a:off x="415800" y="833400"/>
-            <a:ext cx="10140480" cy="580680"/>
+            <a:ext cx="10140120" cy="580320"/>
           </a:xfrm>
           <a:prstGeom prst="rect">
             <a:avLst/>
@@ -4823,7 +4848,7 @@
         <p:spPr>
           <a:xfrm>
             <a:off x="415800" y="2078280"/>
-            <a:ext cx="3323880" cy="1428840"/>
+            <a:ext cx="3323520" cy="1428480"/>
           </a:xfrm>
           <a:prstGeom prst="rect">
             <a:avLst/>
@@ -4883,7 +4908,7 @@
         <p:spPr>
           <a:xfrm>
             <a:off x="4572000" y="2078280"/>
-            <a:ext cx="3323880" cy="1179360"/>
+            <a:ext cx="3323520" cy="1179000"/>
           </a:xfrm>
           <a:prstGeom prst="rect">
             <a:avLst/>
@@ -4943,7 +4968,7 @@
         <p:spPr>
           <a:xfrm>
             <a:off x="8728200" y="2078280"/>
-            <a:ext cx="3323880" cy="1677960"/>
+            <a:ext cx="3323520" cy="1677600"/>
           </a:xfrm>
           <a:prstGeom prst="rect">
             <a:avLst/>
@@ -5037,7 +5062,7 @@
         <p:spPr>
           <a:xfrm>
             <a:off x="0" y="0"/>
-            <a:ext cx="12191040" cy="6856920"/>
+            <a:ext cx="12190680" cy="6856560"/>
           </a:xfrm>
           <a:prstGeom prst="rect">
             <a:avLst/>
@@ -5057,7 +5082,7 @@
         <p:spPr>
           <a:xfrm>
             <a:off x="1454760" y="417600"/>
-            <a:ext cx="10140480" cy="580680"/>
+            <a:ext cx="10140120" cy="580320"/>
           </a:xfrm>
           <a:prstGeom prst="rect">
             <a:avLst/>
@@ -5117,7 +5142,7 @@
         <p:spPr>
           <a:xfrm>
             <a:off x="1454760" y="1662480"/>
-            <a:ext cx="4155120" cy="1927440"/>
+            <a:ext cx="4154760" cy="1927080"/>
           </a:xfrm>
           <a:prstGeom prst="rect">
             <a:avLst/>
@@ -5177,7 +5202,7 @@
         <p:spPr>
           <a:xfrm>
             <a:off x="6858000" y="1662480"/>
-            <a:ext cx="4155120" cy="1179360"/>
+            <a:ext cx="4154760" cy="1179000"/>
           </a:xfrm>
           <a:prstGeom prst="rect">
             <a:avLst/>
@@ -5271,7 +5296,7 @@
         <p:spPr>
           <a:xfrm>
             <a:off x="0" y="0"/>
-            <a:ext cx="12191040" cy="6856920"/>
+            <a:ext cx="12190680" cy="6856560"/>
           </a:xfrm>
           <a:prstGeom prst="rect">
             <a:avLst/>
@@ -5291,7 +5316,7 @@
         <p:spPr>
           <a:xfrm>
             <a:off x="1454760" y="417600"/>
-            <a:ext cx="10140480" cy="580680"/>
+            <a:ext cx="10140120" cy="580320"/>
           </a:xfrm>
           <a:prstGeom prst="rect">
             <a:avLst/>
@@ -5351,7 +5376,7 @@
         <p:spPr>
           <a:xfrm>
             <a:off x="1454760" y="1662480"/>
-            <a:ext cx="6649200" cy="929880"/>
+            <a:ext cx="6648840" cy="929520"/>
           </a:xfrm>
           <a:prstGeom prst="rect">
             <a:avLst/>
@@ -5411,7 +5436,7 @@
         <p:spPr>
           <a:xfrm>
             <a:off x="1454760" y="2909520"/>
-            <a:ext cx="6649200" cy="929880"/>
+            <a:ext cx="6648840" cy="929520"/>
           </a:xfrm>
           <a:prstGeom prst="rect">
             <a:avLst/>
@@ -5471,7 +5496,7 @@
         <p:spPr>
           <a:xfrm>
             <a:off x="1454760" y="3840480"/>
-            <a:ext cx="6649200" cy="929880"/>
+            <a:ext cx="6648840" cy="929520"/>
           </a:xfrm>
           <a:prstGeom prst="rect">
             <a:avLst/>
@@ -5565,7 +5590,7 @@
         <p:spPr>
           <a:xfrm>
             <a:off x="0" y="0"/>
-            <a:ext cx="12191040" cy="6856920"/>
+            <a:ext cx="12190680" cy="6856560"/>
           </a:xfrm>
           <a:prstGeom prst="rect">
             <a:avLst/>
@@ -5585,7 +5610,7 @@
         <p:spPr>
           <a:xfrm>
             <a:off x="1454760" y="417600"/>
-            <a:ext cx="10140480" cy="580680"/>
+            <a:ext cx="10140120" cy="580320"/>
           </a:xfrm>
           <a:prstGeom prst="rect">
             <a:avLst/>
@@ -5645,7 +5670,7 @@
         <p:spPr>
           <a:xfrm>
             <a:off x="1454760" y="1662480"/>
-            <a:ext cx="4155120" cy="1428840"/>
+            <a:ext cx="4154760" cy="1428480"/>
           </a:xfrm>
           <a:prstGeom prst="rect">
             <a:avLst/>
@@ -5705,7 +5730,7 @@
         <p:spPr>
           <a:xfrm>
             <a:off x="6858000" y="1662480"/>
-            <a:ext cx="4155120" cy="2426400"/>
+            <a:ext cx="4154760" cy="2426040"/>
           </a:xfrm>
           <a:prstGeom prst="rect">
             <a:avLst/>

</xml_diff>